<commit_message>
add more to presentation, add feature importance plot
</commit_message>
<xml_diff>
--- a/report/presentation.pptx
+++ b/report/presentation.pptx
@@ -5,23 +5,29 @@
     <p:sldMasterId id="2147483648" r:id="rId1"/>
   </p:sldMasterIdLst>
   <p:notesMasterIdLst>
-    <p:notesMasterId r:id="rId13"/>
+    <p:notesMasterId r:id="rId19"/>
   </p:notesMasterIdLst>
   <p:handoutMasterIdLst>
-    <p:handoutMasterId r:id="rId14"/>
+    <p:handoutMasterId r:id="rId20"/>
   </p:handoutMasterIdLst>
   <p:sldIdLst>
     <p:sldId id="256" r:id="rId2"/>
     <p:sldId id="257" r:id="rId3"/>
     <p:sldId id="260" r:id="rId4"/>
     <p:sldId id="261" r:id="rId5"/>
-    <p:sldId id="263" r:id="rId6"/>
-    <p:sldId id="265" r:id="rId7"/>
-    <p:sldId id="267" r:id="rId8"/>
-    <p:sldId id="266" r:id="rId9"/>
-    <p:sldId id="264" r:id="rId10"/>
-    <p:sldId id="268" r:id="rId11"/>
-    <p:sldId id="269" r:id="rId12"/>
+    <p:sldId id="276" r:id="rId6"/>
+    <p:sldId id="263" r:id="rId7"/>
+    <p:sldId id="265" r:id="rId8"/>
+    <p:sldId id="267" r:id="rId9"/>
+    <p:sldId id="266" r:id="rId10"/>
+    <p:sldId id="272" r:id="rId11"/>
+    <p:sldId id="264" r:id="rId12"/>
+    <p:sldId id="270" r:id="rId13"/>
+    <p:sldId id="268" r:id="rId14"/>
+    <p:sldId id="269" r:id="rId15"/>
+    <p:sldId id="273" r:id="rId16"/>
+    <p:sldId id="274" r:id="rId17"/>
+    <p:sldId id="277" r:id="rId18"/>
   </p:sldIdLst>
   <p:sldSz cx="9144000" cy="6858000" type="screen4x3"/>
   <p:notesSz cx="6858000" cy="9144000"/>
@@ -205,7 +211,7 @@
           <a:p>
             <a:fld id="{DE6D1952-4C8C-594A-8D47-CC3EBD31CD69}" type="datetimeFigureOut">
               <a:rPr lang="en-US" smtClean="0"/>
-              <a:t>2/26/18</a:t>
+              <a:t>2/28/18</a:t>
             </a:fld>
             <a:endParaRPr lang="en-US"/>
           </a:p>
@@ -371,7 +377,7 @@
           <a:p>
             <a:fld id="{5AE82BA9-193E-D440-8A2C-9653656F2AE3}" type="datetimeFigureOut">
               <a:rPr lang="en-US" smtClean="0"/>
-              <a:t>2/26/18</a:t>
+              <a:t>2/28/18</a:t>
             </a:fld>
             <a:endParaRPr lang="en-US"/>
           </a:p>
@@ -953,7 +959,7 @@
             <a:fld id="{B362BA78-8688-C546-A03A-2A39F84C0B58}" type="datetime1">
               <a:rPr lang="en-US" smtClean="0"/>
               <a:pPr/>
-              <a:t>2/26/18</a:t>
+              <a:t>2/28/18</a:t>
             </a:fld>
             <a:endParaRPr lang="en-US"/>
           </a:p>
@@ -1175,7 +1181,7 @@
             <a:fld id="{EF5B9135-15EF-DE46-84CC-16626B0FAF7F}" type="datetime1">
               <a:rPr lang="en-US" smtClean="0"/>
               <a:pPr/>
-              <a:t>2/26/18</a:t>
+              <a:t>2/28/18</a:t>
             </a:fld>
             <a:endParaRPr lang="en-US"/>
           </a:p>
@@ -1425,7 +1431,7 @@
           <a:p>
             <a:fld id="{99477ADD-011F-3541-9724-9C7FC92455D5}" type="datetime1">
               <a:rPr lang="en-US" smtClean="0"/>
-              <a:t>2/26/18</a:t>
+              <a:t>2/28/18</a:t>
             </a:fld>
             <a:endParaRPr lang="en-US"/>
           </a:p>
@@ -1539,7 +1545,7 @@
             <a:fld id="{D3421027-4EC0-9C48-8CFB-B8A3104CB056}" type="datetime1">
               <a:rPr lang="en-US" smtClean="0"/>
               <a:pPr/>
-              <a:t>2/26/18</a:t>
+              <a:t>2/28/18</a:t>
             </a:fld>
             <a:endParaRPr lang="en-US"/>
           </a:p>
@@ -1807,7 +1813,7 @@
           <a:p>
             <a:fld id="{FA5DAB8B-8178-D047-869E-5A62AF236443}" type="datetime1">
               <a:rPr lang="en-US" smtClean="0"/>
-              <a:t>2/26/18</a:t>
+              <a:t>2/28/18</a:t>
             </a:fld>
             <a:endParaRPr lang="en-US" dirty="0"/>
           </a:p>
@@ -2023,7 +2029,7 @@
             <a:fld id="{B9AB8213-A564-3C44-8CA0-968996562138}" type="datetime1">
               <a:rPr lang="en-US" smtClean="0"/>
               <a:pPr/>
-              <a:t>2/26/18</a:t>
+              <a:t>2/28/18</a:t>
             </a:fld>
             <a:endParaRPr lang="en-US"/>
           </a:p>
@@ -2294,7 +2300,7 @@
             <a:fld id="{0A83DA12-03A5-114A-ABAE-78CD6BB6AC19}" type="datetime1">
               <a:rPr lang="en-US" smtClean="0"/>
               <a:pPr/>
-              <a:t>2/26/18</a:t>
+              <a:t>2/28/18</a:t>
             </a:fld>
             <a:endParaRPr lang="en-US"/>
           </a:p>
@@ -2628,7 +2634,7 @@
             <a:fld id="{1FFF386F-14E4-954A-9EC2-E277FFD66D49}" type="datetime1">
               <a:rPr lang="en-US" smtClean="0"/>
               <a:pPr/>
-              <a:t>2/26/18</a:t>
+              <a:t>2/28/18</a:t>
             </a:fld>
             <a:endParaRPr lang="en-US"/>
           </a:p>
@@ -3100,7 +3106,7 @@
             <a:fld id="{D8FFCF06-3344-8345-BEA6-DDAEFCC6ECCE}" type="datetime1">
               <a:rPr lang="en-US" smtClean="0"/>
               <a:pPr/>
-              <a:t>2/26/18</a:t>
+              <a:t>2/28/18</a:t>
             </a:fld>
             <a:endParaRPr lang="en-US"/>
           </a:p>
@@ -3244,7 +3250,7 @@
             <a:fld id="{84C6D879-35D4-554E-9D6D-93E8130AA922}" type="datetime1">
               <a:rPr lang="en-US" smtClean="0"/>
               <a:pPr/>
-              <a:t>2/26/18</a:t>
+              <a:t>2/28/18</a:t>
             </a:fld>
             <a:endParaRPr lang="en-US"/>
           </a:p>
@@ -3555,7 +3561,7 @@
             <a:fld id="{AB182AE3-760A-8E44-AB65-03A533386DFC}" type="datetime1">
               <a:rPr lang="en-US" smtClean="0"/>
               <a:pPr/>
-              <a:t>2/26/18</a:t>
+              <a:t>2/28/18</a:t>
             </a:fld>
             <a:endParaRPr lang="en-US"/>
           </a:p>
@@ -3811,7 +3817,7 @@
           <a:p>
             <a:fld id="{D98C176C-065F-124D-AAA4-94F2B7A2EC7C}" type="datetime1">
               <a:rPr lang="en-US" smtClean="0"/>
-              <a:t>2/26/18</a:t>
+              <a:t>2/28/18</a:t>
             </a:fld>
             <a:endParaRPr lang="en-US"/>
           </a:p>
@@ -4642,6 +4648,330 @@
         </p:nvSpPr>
         <p:spPr>
           <a:xfrm>
+            <a:off x="184727" y="32328"/>
+            <a:ext cx="8001000" cy="868217"/>
+          </a:xfrm>
+        </p:spPr>
+        <p:txBody>
+          <a:bodyPr>
+            <a:normAutofit/>
+          </a:bodyPr>
+          <a:lstStyle/>
+          <a:p>
+            <a:pPr algn="l"/>
+            <a:r>
+              <a:rPr lang="en-US" sz="2400" b="1" dirty="0" smtClean="0"/>
+              <a:t>Our goals</a:t>
+            </a:r>
+            <a:endParaRPr lang="en-US" sz="2400" b="1" dirty="0"/>
+          </a:p>
+        </p:txBody>
+      </p:sp>
+      <p:sp>
+        <p:nvSpPr>
+          <p:cNvPr id="4" name="Slide Number Placeholder 3"/>
+          <p:cNvSpPr>
+            <a:spLocks noGrp="1"/>
+          </p:cNvSpPr>
+          <p:nvPr>
+            <p:ph type="sldNum" sz="quarter" idx="12"/>
+          </p:nvPr>
+        </p:nvSpPr>
+        <p:spPr/>
+        <p:txBody>
+          <a:bodyPr/>
+          <a:lstStyle/>
+          <a:p>
+            <a:fld id="{106E12CD-FCB1-464E-A775-0B83FDDACE03}" type="slidenum">
+              <a:rPr lang="en-US" smtClean="0"/>
+              <a:pPr/>
+              <a:t>9</a:t>
+            </a:fld>
+            <a:endParaRPr lang="en-US" dirty="0"/>
+          </a:p>
+        </p:txBody>
+      </p:sp>
+      <p:sp>
+        <p:nvSpPr>
+          <p:cNvPr id="7" name="Subtitle 2"/>
+          <p:cNvSpPr>
+            <a:spLocks noGrp="1"/>
+          </p:cNvSpPr>
+          <p:nvPr>
+            <p:ph type="subTitle" idx="1"/>
+          </p:nvPr>
+        </p:nvSpPr>
+        <p:spPr>
+          <a:xfrm>
+            <a:off x="309416" y="743527"/>
+            <a:ext cx="8834583" cy="4140200"/>
+          </a:xfrm>
+        </p:spPr>
+        <p:txBody>
+          <a:bodyPr>
+            <a:normAutofit/>
+          </a:bodyPr>
+          <a:lstStyle/>
+          <a:p>
+            <a:pPr marL="457200" indent="-457200" algn="l">
+              <a:buFont typeface="Arial"/>
+              <a:buChar char="•"/>
+            </a:pPr>
+            <a:r>
+              <a:rPr lang="en-US" sz="2000" dirty="0" smtClean="0">
+                <a:solidFill>
+                  <a:schemeClr val="tx1"/>
+                </a:solidFill>
+              </a:rPr>
+              <a:t>Compare 3 models: who performs the best?</a:t>
+            </a:r>
+          </a:p>
+          <a:p>
+            <a:pPr marL="914400" lvl="1" indent="-457200" algn="l">
+              <a:buFont typeface="+mj-lt"/>
+              <a:buAutoNum type="arabicPeriod"/>
+            </a:pPr>
+            <a:r>
+              <a:rPr lang="en-US" sz="1600" dirty="0" smtClean="0">
+                <a:solidFill>
+                  <a:schemeClr val="tx1"/>
+                </a:solidFill>
+              </a:rPr>
+              <a:t>Facebook’s hybrid boosted tree/linear model, modified so that the linear model is actually a Lasso penalized regression model</a:t>
+            </a:r>
+          </a:p>
+          <a:p>
+            <a:pPr marL="914400" lvl="1" indent="-457200" algn="l">
+              <a:buFont typeface="+mj-lt"/>
+              <a:buAutoNum type="arabicPeriod"/>
+            </a:pPr>
+            <a:r>
+              <a:rPr lang="en-US" sz="1600" dirty="0" smtClean="0">
+                <a:solidFill>
+                  <a:schemeClr val="tx1"/>
+                </a:solidFill>
+              </a:rPr>
+              <a:t>A regular Lasso penalized regression model</a:t>
+            </a:r>
+          </a:p>
+          <a:p>
+            <a:pPr marL="914400" lvl="1" indent="-457200" algn="l">
+              <a:buFont typeface="+mj-lt"/>
+              <a:buAutoNum type="arabicPeriod"/>
+            </a:pPr>
+            <a:r>
+              <a:rPr lang="en-US" sz="1600" dirty="0" smtClean="0">
+                <a:solidFill>
+                  <a:schemeClr val="tx1"/>
+                </a:solidFill>
+              </a:rPr>
+              <a:t>A regular boosted tree model</a:t>
+            </a:r>
+            <a:endParaRPr lang="en-US" sz="1600" dirty="0" smtClean="0">
+              <a:solidFill>
+                <a:schemeClr val="tx1"/>
+              </a:solidFill>
+            </a:endParaRPr>
+          </a:p>
+          <a:p>
+            <a:pPr marL="914400" lvl="1" indent="-457200" algn="l">
+              <a:buFont typeface="Arial"/>
+              <a:buChar char="•"/>
+            </a:pPr>
+            <a:endParaRPr lang="en-US" sz="1600" dirty="0" smtClean="0">
+              <a:solidFill>
+                <a:schemeClr val="tx1"/>
+              </a:solidFill>
+            </a:endParaRPr>
+          </a:p>
+          <a:p>
+            <a:pPr marL="457200" indent="-457200" algn="l">
+              <a:buFont typeface="Arial"/>
+              <a:buChar char="•"/>
+            </a:pPr>
+            <a:r>
+              <a:rPr lang="en-US" sz="2000" dirty="0" smtClean="0">
+                <a:solidFill>
+                  <a:schemeClr val="tx1"/>
+                </a:solidFill>
+              </a:rPr>
+              <a:t>Explore benefits of the hybrid model:</a:t>
+            </a:r>
+          </a:p>
+          <a:p>
+            <a:pPr marL="914400" lvl="1" indent="-457200" algn="l">
+              <a:buFont typeface="Arial"/>
+              <a:buChar char="•"/>
+            </a:pPr>
+            <a:r>
+              <a:rPr lang="en-US" sz="1600" dirty="0" smtClean="0">
+                <a:solidFill>
+                  <a:schemeClr val="tx1"/>
+                </a:solidFill>
+              </a:rPr>
+              <a:t>The features in the hybrid model become actual decision rules. If we use a Lasso model for feature selection, what are the most important rules learned?</a:t>
+            </a:r>
+          </a:p>
+        </p:txBody>
+      </p:sp>
+    </p:spTree>
+    <p:extLst>
+      <p:ext uri="{BB962C8B-B14F-4D97-AF65-F5344CB8AC3E}">
+        <p14:creationId xmlns:p14="http://schemas.microsoft.com/office/powerpoint/2010/main" val="1076810062"/>
+      </p:ext>
+    </p:extLst>
+  </p:cSld>
+  <p:clrMapOvr>
+    <a:masterClrMapping/>
+  </p:clrMapOvr>
+</p:sld>
+</file>
+
+<file path=ppt/slides/slide11.xml><?xml version="1.0" encoding="utf-8"?>
+<p:sld xmlns:a="http://schemas.openxmlformats.org/drawingml/2006/main" xmlns:r="http://schemas.openxmlformats.org/officeDocument/2006/relationships" xmlns:p="http://schemas.openxmlformats.org/presentationml/2006/main">
+  <p:cSld>
+    <p:spTree>
+      <p:nvGrpSpPr>
+        <p:cNvPr id="1" name=""/>
+        <p:cNvGrpSpPr/>
+        <p:nvPr/>
+      </p:nvGrpSpPr>
+      <p:grpSpPr>
+        <a:xfrm>
+          <a:off x="0" y="0"/>
+          <a:ext cx="0" cy="0"/>
+          <a:chOff x="0" y="0"/>
+          <a:chExt cx="0" cy="0"/>
+        </a:xfrm>
+      </p:grpSpPr>
+      <p:sp>
+        <p:nvSpPr>
+          <p:cNvPr id="2" name="Title 1"/>
+          <p:cNvSpPr>
+            <a:spLocks noGrp="1"/>
+          </p:cNvSpPr>
+          <p:nvPr>
+            <p:ph type="title"/>
+          </p:nvPr>
+        </p:nvSpPr>
+        <p:spPr>
+          <a:xfrm>
+            <a:off x="0" y="0"/>
+            <a:ext cx="9144000" cy="5943600"/>
+          </a:xfrm>
+        </p:spPr>
+        <p:txBody>
+          <a:bodyPr/>
+          <a:lstStyle/>
+          <a:p>
+            <a:r>
+              <a:rPr lang="en-US" dirty="0" smtClean="0"/>
+              <a:t>Online learning</a:t>
+            </a:r>
+            <a:endParaRPr lang="en-US" dirty="0"/>
+          </a:p>
+        </p:txBody>
+      </p:sp>
+    </p:spTree>
+    <p:extLst>
+      <p:ext uri="{BB962C8B-B14F-4D97-AF65-F5344CB8AC3E}">
+        <p14:creationId xmlns:p14="http://schemas.microsoft.com/office/powerpoint/2010/main" val="4133557557"/>
+      </p:ext>
+    </p:extLst>
+  </p:cSld>
+  <p:clrMapOvr>
+    <a:masterClrMapping/>
+  </p:clrMapOvr>
+</p:sld>
+</file>
+
+<file path=ppt/slides/slide12.xml><?xml version="1.0" encoding="utf-8"?>
+<p:sld xmlns:a="http://schemas.openxmlformats.org/drawingml/2006/main" xmlns:r="http://schemas.openxmlformats.org/officeDocument/2006/relationships" xmlns:p="http://schemas.openxmlformats.org/presentationml/2006/main">
+  <p:cSld>
+    <p:spTree>
+      <p:nvGrpSpPr>
+        <p:cNvPr id="1" name=""/>
+        <p:cNvGrpSpPr/>
+        <p:nvPr/>
+      </p:nvGrpSpPr>
+      <p:grpSpPr>
+        <a:xfrm>
+          <a:off x="0" y="0"/>
+          <a:ext cx="0" cy="0"/>
+          <a:chOff x="0" y="0"/>
+          <a:chExt cx="0" cy="0"/>
+        </a:xfrm>
+      </p:grpSpPr>
+      <p:sp>
+        <p:nvSpPr>
+          <p:cNvPr id="2" name="Title 1"/>
+          <p:cNvSpPr>
+            <a:spLocks noGrp="1"/>
+          </p:cNvSpPr>
+          <p:nvPr>
+            <p:ph type="title"/>
+          </p:nvPr>
+        </p:nvSpPr>
+        <p:spPr>
+          <a:xfrm>
+            <a:off x="0" y="0"/>
+            <a:ext cx="9144000" cy="5943600"/>
+          </a:xfrm>
+        </p:spPr>
+        <p:txBody>
+          <a:bodyPr/>
+          <a:lstStyle/>
+          <a:p>
+            <a:r>
+              <a:rPr lang="en-US" dirty="0" smtClean="0"/>
+              <a:t>Data preprocessing</a:t>
+            </a:r>
+            <a:endParaRPr lang="en-US" dirty="0"/>
+          </a:p>
+        </p:txBody>
+      </p:sp>
+    </p:spTree>
+    <p:extLst>
+      <p:ext uri="{BB962C8B-B14F-4D97-AF65-F5344CB8AC3E}">
+        <p14:creationId xmlns:p14="http://schemas.microsoft.com/office/powerpoint/2010/main" val="1127324524"/>
+      </p:ext>
+    </p:extLst>
+  </p:cSld>
+  <p:clrMapOvr>
+    <a:masterClrMapping/>
+  </p:clrMapOvr>
+</p:sld>
+</file>
+
+<file path=ppt/slides/slide13.xml><?xml version="1.0" encoding="utf-8"?>
+<p:sld xmlns:a="http://schemas.openxmlformats.org/drawingml/2006/main" xmlns:r="http://schemas.openxmlformats.org/officeDocument/2006/relationships" xmlns:p="http://schemas.openxmlformats.org/presentationml/2006/main">
+  <p:cSld>
+    <p:spTree>
+      <p:nvGrpSpPr>
+        <p:cNvPr id="1" name=""/>
+        <p:cNvGrpSpPr/>
+        <p:nvPr/>
+      </p:nvGrpSpPr>
+      <p:grpSpPr>
+        <a:xfrm>
+          <a:off x="0" y="0"/>
+          <a:ext cx="0" cy="0"/>
+          <a:chOff x="0" y="0"/>
+          <a:chExt cx="0" cy="0"/>
+        </a:xfrm>
+      </p:grpSpPr>
+      <p:sp>
+        <p:nvSpPr>
+          <p:cNvPr id="2" name="Title 1"/>
+          <p:cNvSpPr>
+            <a:spLocks noGrp="1"/>
+          </p:cNvSpPr>
+          <p:nvPr>
+            <p:ph type="ctrTitle"/>
+          </p:nvPr>
+        </p:nvSpPr>
+        <p:spPr>
+          <a:xfrm>
             <a:off x="184727" y="32327"/>
             <a:ext cx="8001000" cy="983673"/>
           </a:xfrm>
@@ -4728,7 +5058,7 @@
             <a:fld id="{106E12CD-FCB1-464E-A775-0B83FDDACE03}" type="slidenum">
               <a:rPr lang="en-US" smtClean="0"/>
               <a:pPr/>
-              <a:t>9</a:t>
+              <a:t>12</a:t>
             </a:fld>
             <a:endParaRPr lang="en-US" dirty="0"/>
           </a:p>
@@ -5205,7 +5535,7 @@
 </p:sld>
 </file>
 
-<file path=ppt/slides/slide11.xml><?xml version="1.0" encoding="utf-8"?>
+<file path=ppt/slides/slide14.xml><?xml version="1.0" encoding="utf-8"?>
 <p:sld xmlns:a="http://schemas.openxmlformats.org/drawingml/2006/main" xmlns:r="http://schemas.openxmlformats.org/officeDocument/2006/relationships" xmlns:p="http://schemas.openxmlformats.org/presentationml/2006/main">
   <p:cSld>
     <p:spTree>
@@ -5320,7 +5650,7 @@
             <a:fld id="{106E12CD-FCB1-464E-A775-0B83FDDACE03}" type="slidenum">
               <a:rPr lang="en-US" smtClean="0"/>
               <a:pPr/>
-              <a:t>10</a:t>
+              <a:t>13</a:t>
             </a:fld>
             <a:endParaRPr lang="en-US" dirty="0"/>
           </a:p>
@@ -5742,8 +6072,8 @@
         </p:nvSpPr>
         <p:spPr>
           <a:xfrm>
-            <a:off x="309417" y="4317999"/>
-            <a:ext cx="7968674" cy="1593273"/>
+            <a:off x="309417" y="4053883"/>
+            <a:ext cx="7968674" cy="2169118"/>
           </a:xfrm>
           <a:prstGeom prst="rect">
             <a:avLst/>
@@ -5946,12 +6276,12 @@
               <a:t>Hour turned into hour of day, day of week quantitative </a:t>
             </a:r>
             <a:r>
-              <a:rPr lang="en-US" sz="2000" dirty="0" err="1" smtClean="0">
+              <a:rPr lang="en-US" sz="2000" dirty="0" smtClean="0">
                 <a:solidFill>
                   <a:schemeClr val="tx1"/>
                 </a:solidFill>
               </a:rPr>
-              <a:t>vars</a:t>
+              <a:t>variables.</a:t>
             </a:r>
             <a:endParaRPr lang="en-US" sz="2000" dirty="0" smtClean="0">
               <a:solidFill>
@@ -5973,28 +6303,42 @@
               <a:t>Continuous </a:t>
             </a:r>
             <a:r>
-              <a:rPr lang="en-US" sz="2000" dirty="0" err="1" smtClean="0">
+              <a:rPr lang="en-US" sz="2000" dirty="0" smtClean="0">
                 <a:solidFill>
                   <a:schemeClr val="tx1"/>
                 </a:solidFill>
               </a:rPr>
-              <a:t>vars</a:t>
-            </a:r>
-            <a:r>
-              <a:rPr lang="en-US" sz="2000">
+              <a:t>variables </a:t>
+            </a:r>
+            <a:r>
+              <a:rPr lang="en-US" sz="2000" dirty="0" smtClean="0">
                 <a:solidFill>
                   <a:schemeClr val="tx1"/>
                 </a:solidFill>
               </a:rPr>
-              <a:t> </a:t>
-            </a:r>
-            <a:r>
-              <a:rPr lang="en-US" sz="2000" smtClean="0">
+              <a:t>were </a:t>
+            </a:r>
+            <a:r>
+              <a:rPr lang="en-US" sz="2000" dirty="0" smtClean="0">
                 <a:solidFill>
                   <a:schemeClr val="tx1"/>
                 </a:solidFill>
               </a:rPr>
-              <a:t>were standardized</a:t>
+              <a:t>standardized.</a:t>
+            </a:r>
+          </a:p>
+          <a:p>
+            <a:pPr marL="342900" indent="-342900" algn="l">
+              <a:buFontTx/>
+              <a:buChar char="-"/>
+            </a:pPr>
+            <a:r>
+              <a:rPr lang="en-US" sz="2000" dirty="0" smtClean="0">
+                <a:solidFill>
+                  <a:schemeClr val="tx1"/>
+                </a:solidFill>
+              </a:rPr>
+              <a:t>Remaining categorical variables were one-hot-encoded.</a:t>
             </a:r>
             <a:endParaRPr lang="en-US" sz="2000" dirty="0" smtClean="0">
               <a:solidFill>
@@ -6002,12 +6346,636 @@
               </a:solidFill>
             </a:endParaRPr>
           </a:p>
+          <a:p>
+            <a:pPr marL="342900" indent="-342900" algn="l">
+              <a:buFontTx/>
+              <a:buChar char="-"/>
+            </a:pPr>
+            <a:r>
+              <a:rPr lang="en-US" sz="2000" dirty="0" smtClean="0">
+                <a:solidFill>
+                  <a:schemeClr val="tx1"/>
+                </a:solidFill>
+              </a:rPr>
+              <a:t>For plain Lasso model, the “C20” variable’s missing data was imputed with its mean.</a:t>
+            </a:r>
+            <a:endParaRPr lang="en-US" sz="2000" dirty="0" smtClean="0">
+              <a:solidFill>
+                <a:schemeClr val="tx1"/>
+              </a:solidFill>
+            </a:endParaRPr>
+          </a:p>
         </p:txBody>
       </p:sp>
     </p:spTree>
     <p:extLst>
       <p:ext uri="{BB962C8B-B14F-4D97-AF65-F5344CB8AC3E}">
         <p14:creationId xmlns:p14="http://schemas.microsoft.com/office/powerpoint/2010/main" val="3129975431"/>
+      </p:ext>
+    </p:extLst>
+  </p:cSld>
+  <p:clrMapOvr>
+    <a:masterClrMapping/>
+  </p:clrMapOvr>
+</p:sld>
+</file>
+
+<file path=ppt/slides/slide15.xml><?xml version="1.0" encoding="utf-8"?>
+<p:sld xmlns:a="http://schemas.openxmlformats.org/drawingml/2006/main" xmlns:r="http://schemas.openxmlformats.org/officeDocument/2006/relationships" xmlns:p="http://schemas.openxmlformats.org/presentationml/2006/main">
+  <p:cSld>
+    <p:spTree>
+      <p:nvGrpSpPr>
+        <p:cNvPr id="1" name=""/>
+        <p:cNvGrpSpPr/>
+        <p:nvPr/>
+      </p:nvGrpSpPr>
+      <p:grpSpPr>
+        <a:xfrm>
+          <a:off x="0" y="0"/>
+          <a:ext cx="0" cy="0"/>
+          <a:chOff x="0" y="0"/>
+          <a:chExt cx="0" cy="0"/>
+        </a:xfrm>
+      </p:grpSpPr>
+      <p:sp>
+        <p:nvSpPr>
+          <p:cNvPr id="2" name="Title 1"/>
+          <p:cNvSpPr>
+            <a:spLocks noGrp="1"/>
+          </p:cNvSpPr>
+          <p:nvPr>
+            <p:ph type="ctrTitle"/>
+          </p:nvPr>
+        </p:nvSpPr>
+        <p:spPr>
+          <a:xfrm>
+            <a:off x="184727" y="32327"/>
+            <a:ext cx="8001000" cy="983673"/>
+          </a:xfrm>
+        </p:spPr>
+        <p:txBody>
+          <a:bodyPr>
+            <a:normAutofit/>
+          </a:bodyPr>
+          <a:lstStyle/>
+          <a:p>
+            <a:pPr algn="l"/>
+            <a:r>
+              <a:rPr lang="en-US" sz="3200" b="1" dirty="0" smtClean="0"/>
+              <a:t>Results of preprocessing, embedding </a:t>
+            </a:r>
+            <a:endParaRPr lang="en-US" sz="3200" b="1" dirty="0"/>
+          </a:p>
+        </p:txBody>
+      </p:sp>
+      <p:sp>
+        <p:nvSpPr>
+          <p:cNvPr id="4" name="Slide Number Placeholder 3"/>
+          <p:cNvSpPr>
+            <a:spLocks noGrp="1"/>
+          </p:cNvSpPr>
+          <p:nvPr>
+            <p:ph type="sldNum" sz="quarter" idx="12"/>
+          </p:nvPr>
+        </p:nvSpPr>
+        <p:spPr/>
+        <p:txBody>
+          <a:bodyPr/>
+          <a:lstStyle/>
+          <a:p>
+            <a:fld id="{106E12CD-FCB1-464E-A775-0B83FDDACE03}" type="slidenum">
+              <a:rPr lang="en-US" smtClean="0"/>
+              <a:pPr/>
+              <a:t>14</a:t>
+            </a:fld>
+            <a:endParaRPr lang="en-US" dirty="0"/>
+          </a:p>
+        </p:txBody>
+      </p:sp>
+      <p:sp>
+        <p:nvSpPr>
+          <p:cNvPr id="31" name="Subtitle 2"/>
+          <p:cNvSpPr txBox="1">
+            <a:spLocks/>
+          </p:cNvSpPr>
+          <p:nvPr/>
+        </p:nvSpPr>
+        <p:spPr>
+          <a:xfrm>
+            <a:off x="217052" y="821154"/>
+            <a:ext cx="8753765" cy="4893845"/>
+          </a:xfrm>
+          <a:prstGeom prst="rect">
+            <a:avLst/>
+          </a:prstGeom>
+        </p:spPr>
+        <p:txBody>
+          <a:bodyPr vert="horz" lIns="91440" tIns="45720" rIns="91440" bIns="45720" rtlCol="0">
+            <a:normAutofit/>
+          </a:bodyPr>
+          <a:lstStyle>
+            <a:lvl1pPr marL="0" indent="0" algn="ctr" defTabSz="457200" rtl="0" eaLnBrk="1" latinLnBrk="0" hangingPunct="1">
+              <a:spcBef>
+                <a:spcPct val="20000"/>
+              </a:spcBef>
+              <a:buFont typeface="Arial"/>
+              <a:buNone/>
+              <a:defRPr sz="3200" kern="1200">
+                <a:solidFill>
+                  <a:schemeClr val="tx1">
+                    <a:tint val="75000"/>
+                  </a:schemeClr>
+                </a:solidFill>
+                <a:latin typeface="Arial"/>
+                <a:ea typeface="+mn-ea"/>
+                <a:cs typeface="+mn-cs"/>
+              </a:defRPr>
+            </a:lvl1pPr>
+            <a:lvl2pPr marL="457200" indent="0" algn="ctr" defTabSz="457200" rtl="0" eaLnBrk="1" latinLnBrk="0" hangingPunct="1">
+              <a:spcBef>
+                <a:spcPct val="20000"/>
+              </a:spcBef>
+              <a:buFont typeface="Arial"/>
+              <a:buNone/>
+              <a:defRPr sz="2800" kern="1200">
+                <a:solidFill>
+                  <a:schemeClr val="tx1">
+                    <a:tint val="75000"/>
+                  </a:schemeClr>
+                </a:solidFill>
+                <a:latin typeface="Arial"/>
+                <a:ea typeface="+mn-ea"/>
+                <a:cs typeface="+mn-cs"/>
+              </a:defRPr>
+            </a:lvl2pPr>
+            <a:lvl3pPr marL="914400" indent="0" algn="ctr" defTabSz="457200" rtl="0" eaLnBrk="1" latinLnBrk="0" hangingPunct="1">
+              <a:spcBef>
+                <a:spcPct val="20000"/>
+              </a:spcBef>
+              <a:buFont typeface="Arial"/>
+              <a:buNone/>
+              <a:defRPr sz="2400" kern="1200">
+                <a:solidFill>
+                  <a:schemeClr val="tx1">
+                    <a:tint val="75000"/>
+                  </a:schemeClr>
+                </a:solidFill>
+                <a:latin typeface="Arial"/>
+                <a:ea typeface="+mn-ea"/>
+                <a:cs typeface="+mn-cs"/>
+              </a:defRPr>
+            </a:lvl3pPr>
+            <a:lvl4pPr marL="1371600" indent="0" algn="ctr" defTabSz="457200" rtl="0" eaLnBrk="1" latinLnBrk="0" hangingPunct="1">
+              <a:spcBef>
+                <a:spcPct val="20000"/>
+              </a:spcBef>
+              <a:buFont typeface="Arial"/>
+              <a:buNone/>
+              <a:defRPr sz="2000" kern="1200">
+                <a:solidFill>
+                  <a:schemeClr val="tx1">
+                    <a:tint val="75000"/>
+                  </a:schemeClr>
+                </a:solidFill>
+                <a:latin typeface="Arial"/>
+                <a:ea typeface="+mn-ea"/>
+                <a:cs typeface="+mn-cs"/>
+              </a:defRPr>
+            </a:lvl4pPr>
+            <a:lvl5pPr marL="1828800" indent="0" algn="ctr" defTabSz="457200" rtl="0" eaLnBrk="1" latinLnBrk="0" hangingPunct="1">
+              <a:spcBef>
+                <a:spcPct val="20000"/>
+              </a:spcBef>
+              <a:buFont typeface="Arial"/>
+              <a:buNone/>
+              <a:defRPr sz="2000" kern="1200">
+                <a:solidFill>
+                  <a:schemeClr val="tx1">
+                    <a:tint val="75000"/>
+                  </a:schemeClr>
+                </a:solidFill>
+                <a:latin typeface="Arial"/>
+                <a:ea typeface="+mn-ea"/>
+                <a:cs typeface="+mn-cs"/>
+              </a:defRPr>
+            </a:lvl5pPr>
+            <a:lvl6pPr marL="2286000" indent="0" algn="ctr" defTabSz="457200" rtl="0" eaLnBrk="1" latinLnBrk="0" hangingPunct="1">
+              <a:spcBef>
+                <a:spcPct val="20000"/>
+              </a:spcBef>
+              <a:buFont typeface="Arial"/>
+              <a:buNone/>
+              <a:defRPr sz="2000" kern="1200">
+                <a:solidFill>
+                  <a:schemeClr val="tx1">
+                    <a:tint val="75000"/>
+                  </a:schemeClr>
+                </a:solidFill>
+                <a:latin typeface="+mn-lt"/>
+                <a:ea typeface="+mn-ea"/>
+                <a:cs typeface="+mn-cs"/>
+              </a:defRPr>
+            </a:lvl6pPr>
+            <a:lvl7pPr marL="2743200" indent="0" algn="ctr" defTabSz="457200" rtl="0" eaLnBrk="1" latinLnBrk="0" hangingPunct="1">
+              <a:spcBef>
+                <a:spcPct val="20000"/>
+              </a:spcBef>
+              <a:buFont typeface="Arial"/>
+              <a:buNone/>
+              <a:defRPr sz="2000" kern="1200">
+                <a:solidFill>
+                  <a:schemeClr val="tx1">
+                    <a:tint val="75000"/>
+                  </a:schemeClr>
+                </a:solidFill>
+                <a:latin typeface="+mn-lt"/>
+                <a:ea typeface="+mn-ea"/>
+                <a:cs typeface="+mn-cs"/>
+              </a:defRPr>
+            </a:lvl7pPr>
+            <a:lvl8pPr marL="3200400" indent="0" algn="ctr" defTabSz="457200" rtl="0" eaLnBrk="1" latinLnBrk="0" hangingPunct="1">
+              <a:spcBef>
+                <a:spcPct val="20000"/>
+              </a:spcBef>
+              <a:buFont typeface="Arial"/>
+              <a:buNone/>
+              <a:defRPr sz="2000" kern="1200">
+                <a:solidFill>
+                  <a:schemeClr val="tx1">
+                    <a:tint val="75000"/>
+                  </a:schemeClr>
+                </a:solidFill>
+                <a:latin typeface="+mn-lt"/>
+                <a:ea typeface="+mn-ea"/>
+                <a:cs typeface="+mn-cs"/>
+              </a:defRPr>
+            </a:lvl8pPr>
+            <a:lvl9pPr marL="3657600" indent="0" algn="ctr" defTabSz="457200" rtl="0" eaLnBrk="1" latinLnBrk="0" hangingPunct="1">
+              <a:spcBef>
+                <a:spcPct val="20000"/>
+              </a:spcBef>
+              <a:buFont typeface="Arial"/>
+              <a:buNone/>
+              <a:defRPr sz="2000" kern="1200">
+                <a:solidFill>
+                  <a:schemeClr val="tx1">
+                    <a:tint val="75000"/>
+                  </a:schemeClr>
+                </a:solidFill>
+                <a:latin typeface="+mn-lt"/>
+                <a:ea typeface="+mn-ea"/>
+                <a:cs typeface="+mn-cs"/>
+              </a:defRPr>
+            </a:lvl9pPr>
+          </a:lstStyle>
+          <a:p>
+            <a:pPr algn="l"/>
+            <a:endParaRPr lang="en-US" sz="2000" dirty="0" smtClean="0">
+              <a:solidFill>
+                <a:schemeClr val="tx1"/>
+              </a:solidFill>
+            </a:endParaRPr>
+          </a:p>
+          <a:p>
+            <a:pPr algn="l"/>
+            <a:endParaRPr lang="en-US" sz="2000" dirty="0">
+              <a:solidFill>
+                <a:schemeClr val="tx1"/>
+              </a:solidFill>
+            </a:endParaRPr>
+          </a:p>
+          <a:p>
+            <a:pPr algn="l"/>
+            <a:endParaRPr lang="en-US" sz="2000" dirty="0" smtClean="0">
+              <a:solidFill>
+                <a:schemeClr val="tx1"/>
+              </a:solidFill>
+            </a:endParaRPr>
+          </a:p>
+          <a:p>
+            <a:pPr algn="l"/>
+            <a:endParaRPr lang="en-US" sz="2000" dirty="0">
+              <a:solidFill>
+                <a:schemeClr val="tx1"/>
+              </a:solidFill>
+            </a:endParaRPr>
+          </a:p>
+          <a:p>
+            <a:pPr algn="l"/>
+            <a:endParaRPr lang="en-US" sz="2000" dirty="0" smtClean="0">
+              <a:solidFill>
+                <a:schemeClr val="tx1"/>
+              </a:solidFill>
+            </a:endParaRPr>
+          </a:p>
+          <a:p>
+            <a:pPr algn="l"/>
+            <a:endParaRPr lang="en-US" sz="2000" dirty="0">
+              <a:solidFill>
+                <a:schemeClr val="tx1"/>
+              </a:solidFill>
+            </a:endParaRPr>
+          </a:p>
+          <a:p>
+            <a:pPr algn="l"/>
+            <a:r>
+              <a:rPr lang="en-US" sz="2000" dirty="0" smtClean="0">
+                <a:solidFill>
+                  <a:schemeClr val="tx1"/>
+                </a:solidFill>
+              </a:rPr>
+              <a:t>Plain, preprocessed dataset:</a:t>
+            </a:r>
+            <a:endParaRPr lang="en-US" sz="2000" dirty="0" smtClean="0">
+              <a:solidFill>
+                <a:schemeClr val="tx1"/>
+              </a:solidFill>
+            </a:endParaRPr>
+          </a:p>
+          <a:p>
+            <a:pPr marL="342900" indent="-342900" algn="l">
+              <a:buFontTx/>
+              <a:buChar char="-"/>
+            </a:pPr>
+            <a:r>
+              <a:rPr lang="en-US" sz="2000" dirty="0" smtClean="0">
+                <a:solidFill>
+                  <a:schemeClr val="tx1"/>
+                </a:solidFill>
+              </a:rPr>
+              <a:t>Training set: 300,000 x 89</a:t>
+            </a:r>
+          </a:p>
+          <a:p>
+            <a:pPr marL="342900" indent="-342900" algn="l">
+              <a:buFontTx/>
+              <a:buChar char="-"/>
+            </a:pPr>
+            <a:r>
+              <a:rPr lang="en-US" sz="2000" dirty="0" smtClean="0">
+                <a:solidFill>
+                  <a:schemeClr val="tx1"/>
+                </a:solidFill>
+              </a:rPr>
+              <a:t>Test set: 200,000 x 89</a:t>
+            </a:r>
+          </a:p>
+          <a:p>
+            <a:pPr algn="l"/>
+            <a:endParaRPr lang="en-US" sz="2000" dirty="0" smtClean="0">
+              <a:solidFill>
+                <a:schemeClr val="tx1"/>
+              </a:solidFill>
+            </a:endParaRPr>
+          </a:p>
+          <a:p>
+            <a:pPr algn="l"/>
+            <a:r>
+              <a:rPr lang="en-US" sz="2000" dirty="0" smtClean="0">
+                <a:solidFill>
+                  <a:schemeClr val="tx1"/>
+                </a:solidFill>
+              </a:rPr>
+              <a:t>Embedded dataset:</a:t>
+            </a:r>
+          </a:p>
+          <a:p>
+            <a:pPr marL="342900" indent="-342900" algn="l">
+              <a:buFontTx/>
+              <a:buChar char="-"/>
+            </a:pPr>
+            <a:r>
+              <a:rPr lang="en-US" sz="2000" dirty="0">
+                <a:solidFill>
+                  <a:schemeClr val="tx1"/>
+                </a:solidFill>
+              </a:rPr>
+              <a:t>Training set: 300,000 </a:t>
+            </a:r>
+            <a:r>
+              <a:rPr lang="en-US" sz="2000" dirty="0" smtClean="0">
+                <a:solidFill>
+                  <a:schemeClr val="tx1"/>
+                </a:solidFill>
+              </a:rPr>
+              <a:t>x 4908 </a:t>
+            </a:r>
+            <a:endParaRPr lang="en-US" sz="2000" dirty="0">
+              <a:solidFill>
+                <a:schemeClr val="tx1"/>
+              </a:solidFill>
+            </a:endParaRPr>
+          </a:p>
+          <a:p>
+            <a:pPr marL="342900" indent="-342900" algn="l">
+              <a:buFontTx/>
+              <a:buChar char="-"/>
+            </a:pPr>
+            <a:r>
+              <a:rPr lang="en-US" sz="2000" dirty="0">
+                <a:solidFill>
+                  <a:schemeClr val="tx1"/>
+                </a:solidFill>
+              </a:rPr>
+              <a:t>Test set: 200,000 x </a:t>
+            </a:r>
+            <a:r>
+              <a:rPr lang="en-US" sz="2000" dirty="0" smtClean="0">
+                <a:solidFill>
+                  <a:schemeClr val="tx1"/>
+                </a:solidFill>
+              </a:rPr>
+              <a:t>4908</a:t>
+            </a:r>
+            <a:endParaRPr lang="en-US" sz="2000" dirty="0">
+              <a:solidFill>
+                <a:schemeClr val="tx1"/>
+              </a:solidFill>
+            </a:endParaRPr>
+          </a:p>
+        </p:txBody>
+      </p:sp>
+    </p:spTree>
+    <p:extLst>
+      <p:ext uri="{BB962C8B-B14F-4D97-AF65-F5344CB8AC3E}">
+        <p14:creationId xmlns:p14="http://schemas.microsoft.com/office/powerpoint/2010/main" val="1685951735"/>
+      </p:ext>
+    </p:extLst>
+  </p:cSld>
+  <p:clrMapOvr>
+    <a:masterClrMapping/>
+  </p:clrMapOvr>
+</p:sld>
+</file>
+
+<file path=ppt/slides/slide16.xml><?xml version="1.0" encoding="utf-8"?>
+<p:sld xmlns:a="http://schemas.openxmlformats.org/drawingml/2006/main" xmlns:r="http://schemas.openxmlformats.org/officeDocument/2006/relationships" xmlns:p="http://schemas.openxmlformats.org/presentationml/2006/main">
+  <p:cSld>
+    <p:spTree>
+      <p:nvGrpSpPr>
+        <p:cNvPr id="1" name=""/>
+        <p:cNvGrpSpPr/>
+        <p:nvPr/>
+      </p:nvGrpSpPr>
+      <p:grpSpPr>
+        <a:xfrm>
+          <a:off x="0" y="0"/>
+          <a:ext cx="0" cy="0"/>
+          <a:chOff x="0" y="0"/>
+          <a:chExt cx="0" cy="0"/>
+        </a:xfrm>
+      </p:grpSpPr>
+      <p:sp>
+        <p:nvSpPr>
+          <p:cNvPr id="2" name="Title 1"/>
+          <p:cNvSpPr>
+            <a:spLocks noGrp="1"/>
+          </p:cNvSpPr>
+          <p:nvPr>
+            <p:ph type="title"/>
+          </p:nvPr>
+        </p:nvSpPr>
+        <p:spPr>
+          <a:xfrm>
+            <a:off x="0" y="0"/>
+            <a:ext cx="9144000" cy="5943600"/>
+          </a:xfrm>
+        </p:spPr>
+        <p:txBody>
+          <a:bodyPr/>
+          <a:lstStyle/>
+          <a:p>
+            <a:r>
+              <a:rPr lang="en-US" dirty="0" smtClean="0"/>
+              <a:t>Results</a:t>
+            </a:r>
+            <a:endParaRPr lang="en-US" dirty="0"/>
+          </a:p>
+        </p:txBody>
+      </p:sp>
+    </p:spTree>
+    <p:extLst>
+      <p:ext uri="{BB962C8B-B14F-4D97-AF65-F5344CB8AC3E}">
+        <p14:creationId xmlns:p14="http://schemas.microsoft.com/office/powerpoint/2010/main" val="4136664160"/>
+      </p:ext>
+    </p:extLst>
+  </p:cSld>
+  <p:clrMapOvr>
+    <a:masterClrMapping/>
+  </p:clrMapOvr>
+</p:sld>
+</file>
+
+<file path=ppt/slides/slide17.xml><?xml version="1.0" encoding="utf-8"?>
+<p:sld xmlns:a="http://schemas.openxmlformats.org/drawingml/2006/main" xmlns:r="http://schemas.openxmlformats.org/officeDocument/2006/relationships" xmlns:p="http://schemas.openxmlformats.org/presentationml/2006/main">
+  <p:cSld>
+    <p:spTree>
+      <p:nvGrpSpPr>
+        <p:cNvPr id="1" name=""/>
+        <p:cNvGrpSpPr/>
+        <p:nvPr/>
+      </p:nvGrpSpPr>
+      <p:grpSpPr>
+        <a:xfrm>
+          <a:off x="0" y="0"/>
+          <a:ext cx="0" cy="0"/>
+          <a:chOff x="0" y="0"/>
+          <a:chExt cx="0" cy="0"/>
+        </a:xfrm>
+      </p:grpSpPr>
+      <p:sp>
+        <p:nvSpPr>
+          <p:cNvPr id="2" name="Title 1"/>
+          <p:cNvSpPr>
+            <a:spLocks noGrp="1"/>
+          </p:cNvSpPr>
+          <p:nvPr>
+            <p:ph type="ctrTitle"/>
+          </p:nvPr>
+        </p:nvSpPr>
+        <p:spPr>
+          <a:xfrm>
+            <a:off x="184727" y="32327"/>
+            <a:ext cx="8001000" cy="983673"/>
+          </a:xfrm>
+        </p:spPr>
+        <p:txBody>
+          <a:bodyPr>
+            <a:normAutofit/>
+          </a:bodyPr>
+          <a:lstStyle/>
+          <a:p>
+            <a:pPr algn="l"/>
+            <a:r>
+              <a:rPr lang="en-US" sz="3200" b="1" dirty="0" err="1" smtClean="0"/>
+              <a:t>Xgboost</a:t>
+            </a:r>
+            <a:r>
+              <a:rPr lang="en-US" sz="3200" b="1" dirty="0" smtClean="0"/>
+              <a:t>: feature importance plot</a:t>
+            </a:r>
+            <a:endParaRPr lang="en-US" sz="3200" b="1" dirty="0"/>
+          </a:p>
+        </p:txBody>
+      </p:sp>
+      <p:sp>
+        <p:nvSpPr>
+          <p:cNvPr id="4" name="Slide Number Placeholder 3"/>
+          <p:cNvSpPr>
+            <a:spLocks noGrp="1"/>
+          </p:cNvSpPr>
+          <p:nvPr>
+            <p:ph type="sldNum" sz="quarter" idx="12"/>
+          </p:nvPr>
+        </p:nvSpPr>
+        <p:spPr/>
+        <p:txBody>
+          <a:bodyPr/>
+          <a:lstStyle/>
+          <a:p>
+            <a:fld id="{106E12CD-FCB1-464E-A775-0B83FDDACE03}" type="slidenum">
+              <a:rPr lang="en-US" smtClean="0"/>
+              <a:pPr/>
+              <a:t>16</a:t>
+            </a:fld>
+            <a:endParaRPr lang="en-US" dirty="0"/>
+          </a:p>
+        </p:txBody>
+      </p:sp>
+      <p:pic>
+        <p:nvPicPr>
+          <p:cNvPr id="7" name="Picture 6" descr="xgb_feature_importance.png"/>
+          <p:cNvPicPr>
+            <a:picLocks noChangeAspect="1"/>
+          </p:cNvPicPr>
+          <p:nvPr/>
+        </p:nvPicPr>
+        <p:blipFill>
+          <a:blip r:embed="rId2">
+            <a:extLst>
+              <a:ext uri="{28A0092B-C50C-407E-A947-70E740481C1C}">
+                <a14:useLocalDpi xmlns:a14="http://schemas.microsoft.com/office/drawing/2010/main" val="0"/>
+              </a:ext>
+            </a:extLst>
+          </a:blip>
+          <a:stretch>
+            <a:fillRect/>
+          </a:stretch>
+        </p:blipFill>
+        <p:spPr>
+          <a:xfrm>
+            <a:off x="1339274" y="805925"/>
+            <a:ext cx="6557818" cy="5550425"/>
+          </a:xfrm>
+          <a:prstGeom prst="rect">
+            <a:avLst/>
+          </a:prstGeom>
+        </p:spPr>
+      </p:pic>
+    </p:spTree>
+    <p:extLst>
+      <p:ext uri="{BB962C8B-B14F-4D97-AF65-F5344CB8AC3E}">
+        <p14:creationId xmlns:p14="http://schemas.microsoft.com/office/powerpoint/2010/main" val="2081112436"/>
       </p:ext>
     </p:extLst>
   </p:cSld>
@@ -6495,23 +7463,50 @@
             <a:spLocks noGrp="1"/>
           </p:cNvSpPr>
           <p:nvPr>
-            <p:ph type="title"/>
+            <p:ph type="ctrTitle"/>
           </p:nvPr>
         </p:nvSpPr>
         <p:spPr>
           <a:xfrm>
-            <a:off x="0" y="0"/>
-            <a:ext cx="9144000" cy="5943600"/>
+            <a:off x="184727" y="32328"/>
+            <a:ext cx="8001000" cy="925946"/>
           </a:xfrm>
         </p:spPr>
         <p:txBody>
+          <a:bodyPr>
+            <a:normAutofit/>
+          </a:bodyPr>
+          <a:lstStyle/>
+          <a:p>
+            <a:pPr algn="l"/>
+            <a:r>
+              <a:rPr lang="en-US" sz="3200" b="1" dirty="0" smtClean="0"/>
+              <a:t>The data</a:t>
+            </a:r>
+            <a:endParaRPr lang="en-US" sz="3200" b="1" dirty="0"/>
+          </a:p>
+        </p:txBody>
+      </p:sp>
+      <p:sp>
+        <p:nvSpPr>
+          <p:cNvPr id="4" name="Slide Number Placeholder 3"/>
+          <p:cNvSpPr>
+            <a:spLocks noGrp="1"/>
+          </p:cNvSpPr>
+          <p:nvPr>
+            <p:ph type="sldNum" sz="quarter" idx="12"/>
+          </p:nvPr>
+        </p:nvSpPr>
+        <p:spPr/>
+        <p:txBody>
           <a:bodyPr/>
           <a:lstStyle/>
           <a:p>
-            <a:r>
-              <a:rPr lang="en-US" dirty="0" smtClean="0"/>
-              <a:t>The models</a:t>
-            </a:r>
+            <a:fld id="{106E12CD-FCB1-464E-A775-0B83FDDACE03}" type="slidenum">
+              <a:rPr lang="en-US" smtClean="0"/>
+              <a:pPr/>
+              <a:t>4</a:t>
+            </a:fld>
             <a:endParaRPr lang="en-US" dirty="0"/>
           </a:p>
         </p:txBody>
@@ -6519,7 +7514,7 @@
     </p:spTree>
     <p:extLst>
       <p:ext uri="{BB962C8B-B14F-4D97-AF65-F5344CB8AC3E}">
-        <p14:creationId xmlns:p14="http://schemas.microsoft.com/office/powerpoint/2010/main" val="3290994532"/>
+        <p14:creationId xmlns:p14="http://schemas.microsoft.com/office/powerpoint/2010/main" val="1220049788"/>
       </p:ext>
     </p:extLst>
   </p:cSld>
@@ -6553,6 +7548,64 @@
             <a:spLocks noGrp="1"/>
           </p:cNvSpPr>
           <p:nvPr>
+            <p:ph type="title"/>
+          </p:nvPr>
+        </p:nvSpPr>
+        <p:spPr>
+          <a:xfrm>
+            <a:off x="0" y="0"/>
+            <a:ext cx="9144000" cy="5943600"/>
+          </a:xfrm>
+        </p:spPr>
+        <p:txBody>
+          <a:bodyPr/>
+          <a:lstStyle/>
+          <a:p>
+            <a:r>
+              <a:rPr lang="en-US" dirty="0" smtClean="0"/>
+              <a:t>The models</a:t>
+            </a:r>
+            <a:endParaRPr lang="en-US" dirty="0"/>
+          </a:p>
+        </p:txBody>
+      </p:sp>
+    </p:spTree>
+    <p:extLst>
+      <p:ext uri="{BB962C8B-B14F-4D97-AF65-F5344CB8AC3E}">
+        <p14:creationId xmlns:p14="http://schemas.microsoft.com/office/powerpoint/2010/main" val="3290994532"/>
+      </p:ext>
+    </p:extLst>
+  </p:cSld>
+  <p:clrMapOvr>
+    <a:masterClrMapping/>
+  </p:clrMapOvr>
+</p:sld>
+</file>
+
+<file path=ppt/slides/slide7.xml><?xml version="1.0" encoding="utf-8"?>
+<p:sld xmlns:a="http://schemas.openxmlformats.org/drawingml/2006/main" xmlns:r="http://schemas.openxmlformats.org/officeDocument/2006/relationships" xmlns:p="http://schemas.openxmlformats.org/presentationml/2006/main">
+  <p:cSld>
+    <p:spTree>
+      <p:nvGrpSpPr>
+        <p:cNvPr id="1" name=""/>
+        <p:cNvGrpSpPr/>
+        <p:nvPr/>
+      </p:nvGrpSpPr>
+      <p:grpSpPr>
+        <a:xfrm>
+          <a:off x="0" y="0"/>
+          <a:ext cx="0" cy="0"/>
+          <a:chOff x="0" y="0"/>
+          <a:chExt cx="0" cy="0"/>
+        </a:xfrm>
+      </p:grpSpPr>
+      <p:sp>
+        <p:nvSpPr>
+          <p:cNvPr id="2" name="Title 1"/>
+          <p:cNvSpPr>
+            <a:spLocks noGrp="1"/>
+          </p:cNvSpPr>
+          <p:nvPr>
             <p:ph type="ctrTitle"/>
           </p:nvPr>
         </p:nvSpPr>
@@ -6603,7 +7656,7 @@
             <a:fld id="{106E12CD-FCB1-464E-A775-0B83FDDACE03}" type="slidenum">
               <a:rPr lang="en-US" smtClean="0"/>
               <a:pPr/>
-              <a:t>5</a:t>
+              <a:t>6</a:t>
             </a:fld>
             <a:endParaRPr lang="en-US" dirty="0"/>
           </a:p>
@@ -6740,21 +7793,8 @@
                   <a:schemeClr val="tx1"/>
                 </a:solidFill>
               </a:rPr>
-              <a:t> package in </a:t>
-            </a:r>
-            <a:r>
-              <a:rPr lang="en-US" sz="2000" dirty="0" smtClean="0">
-                <a:solidFill>
-                  <a:schemeClr val="tx1"/>
-                </a:solidFill>
-              </a:rPr>
-              <a:t>R.</a:t>
-            </a:r>
-            <a:endParaRPr lang="en-US" sz="2000" dirty="0" smtClean="0">
-              <a:solidFill>
-                <a:schemeClr val="tx1"/>
-              </a:solidFill>
-            </a:endParaRPr>
+              <a:t> package in R.</a:t>
+            </a:r>
           </a:p>
           <a:p>
             <a:pPr marL="457200" indent="-457200" algn="l">
@@ -6803,21 +7843,8 @@
                   <a:schemeClr val="tx1"/>
                 </a:solidFill>
               </a:rPr>
-              <a:t>Can train with gradient descent, </a:t>
-            </a:r>
-            <a:r>
-              <a:rPr lang="en-US" sz="2000" dirty="0" smtClean="0">
-                <a:solidFill>
-                  <a:schemeClr val="tx1"/>
-                </a:solidFill>
-              </a:rPr>
-              <a:t>online training. Missing data not allowed.</a:t>
-            </a:r>
-            <a:endParaRPr lang="en-US" sz="2000" dirty="0" smtClean="0">
-              <a:solidFill>
-                <a:schemeClr val="tx1"/>
-              </a:solidFill>
-            </a:endParaRPr>
+              <a:t>Can train with gradient descent, online training. Missing data not allowed.</a:t>
+            </a:r>
           </a:p>
         </p:txBody>
       </p:sp>
@@ -7283,15 +8310,7 @@
                   <a:schemeClr val="tx1"/>
                 </a:solidFill>
               </a:rPr>
-              <a:t>Cannot train in online fashion</a:t>
-            </a:r>
-            <a:r>
-              <a:rPr lang="en-US" sz="2000" dirty="0" smtClean="0">
-                <a:solidFill>
-                  <a:schemeClr val="tx1"/>
-                </a:solidFill>
-              </a:rPr>
-              <a:t>. But can handle missing data!</a:t>
+              <a:t>Cannot train in online fashion. But can handle missing data!</a:t>
             </a:r>
             <a:endParaRPr lang="en-US" sz="2000" dirty="0">
               <a:solidFill>
@@ -7325,7 +8344,7 @@
 </p:sld>
 </file>
 
-<file path=ppt/slides/slide7.xml><?xml version="1.0" encoding="utf-8"?>
+<file path=ppt/slides/slide8.xml><?xml version="1.0" encoding="utf-8"?>
 <p:sld xmlns:a="http://schemas.openxmlformats.org/drawingml/2006/main" xmlns:r="http://schemas.openxmlformats.org/officeDocument/2006/relationships" xmlns:p="http://schemas.openxmlformats.org/presentationml/2006/main">
   <p:cSld>
     <p:spTree>
@@ -7391,7 +8410,7 @@
             <a:fld id="{106E12CD-FCB1-464E-A775-0B83FDDACE03}" type="slidenum">
               <a:rPr lang="en-US" smtClean="0"/>
               <a:pPr/>
-              <a:t>6</a:t>
+              <a:t>7</a:t>
             </a:fld>
             <a:endParaRPr lang="en-US" dirty="0"/>
           </a:p>
@@ -7830,7 +8849,7 @@
 </p:sld>
 </file>
 
-<file path=ppt/slides/slide8.xml><?xml version="1.0" encoding="utf-8"?>
+<file path=ppt/slides/slide9.xml><?xml version="1.0" encoding="utf-8"?>
 <p:sld xmlns:a="http://schemas.openxmlformats.org/drawingml/2006/main" xmlns:r="http://schemas.openxmlformats.org/officeDocument/2006/relationships" xmlns:p="http://schemas.openxmlformats.org/presentationml/2006/main">
   <p:cSld>
     <p:spTree>
@@ -7872,7 +8891,19 @@
             <a:pPr algn="l"/>
             <a:r>
               <a:rPr lang="en-US" sz="2400" b="1" dirty="0" smtClean="0"/>
-              <a:t>Hybrid boosted/linear model</a:t>
+              <a:t>Facebook’s </a:t>
+            </a:r>
+            <a:r>
+              <a:rPr lang="en-US" sz="2400" b="1" dirty="0"/>
+              <a:t>h</a:t>
+            </a:r>
+            <a:r>
+              <a:rPr lang="en-US" sz="2400" b="1" dirty="0" smtClean="0"/>
+              <a:t>ybrid </a:t>
+            </a:r>
+            <a:r>
+              <a:rPr lang="en-US" sz="2400" b="1" dirty="0" smtClean="0"/>
+              <a:t>boosted/linear model</a:t>
             </a:r>
             <a:endParaRPr lang="en-US" sz="2400" b="1" dirty="0"/>
           </a:p>
@@ -7896,7 +8927,7 @@
             <a:fld id="{106E12CD-FCB1-464E-A775-0B83FDDACE03}" type="slidenum">
               <a:rPr lang="en-US" smtClean="0"/>
               <a:pPr/>
-              <a:t>7</a:t>
+              <a:t>8</a:t>
             </a:fld>
             <a:endParaRPr lang="en-US" dirty="0"/>
           </a:p>
@@ -7915,7 +8946,7 @@
         <p:spPr>
           <a:xfrm>
             <a:off x="309417" y="743527"/>
-            <a:ext cx="4932219" cy="5167746"/>
+            <a:ext cx="4932219" cy="4925291"/>
           </a:xfrm>
         </p:spPr>
         <p:txBody>
@@ -8076,8 +9107,45 @@
                   <a:schemeClr val="tx1"/>
                 </a:solidFill>
               </a:rPr>
-              <a:t>hour &gt; 3”</a:t>
-            </a:r>
+              <a:t>hour &gt; 3</a:t>
+            </a:r>
+            <a:r>
+              <a:rPr lang="en-US" sz="2000" dirty="0" smtClean="0">
+                <a:solidFill>
+                  <a:schemeClr val="tx1"/>
+                </a:solidFill>
+              </a:rPr>
+              <a:t>”. Use </a:t>
+            </a:r>
+            <a:r>
+              <a:rPr lang="en-US" sz="2000" b="1" dirty="0" err="1" smtClean="0">
+                <a:solidFill>
+                  <a:schemeClr val="tx1"/>
+                </a:solidFill>
+              </a:rPr>
+              <a:t>XG</a:t>
+            </a:r>
+            <a:r>
+              <a:rPr lang="en-US" sz="2000" b="1" dirty="0" err="1" smtClean="0">
+                <a:solidFill>
+                  <a:schemeClr val="tx1"/>
+                </a:solidFill>
+              </a:rPr>
+              <a:t>Boost</a:t>
+            </a:r>
+            <a:r>
+              <a:rPr lang="en-US" sz="2000" dirty="0" smtClean="0">
+                <a:solidFill>
+                  <a:schemeClr val="tx1"/>
+                </a:solidFill>
+              </a:rPr>
+              <a:t> package.</a:t>
+            </a:r>
+            <a:endParaRPr lang="en-US" sz="2000" dirty="0" smtClean="0">
+              <a:solidFill>
+                <a:schemeClr val="tx1"/>
+              </a:solidFill>
+            </a:endParaRPr>
           </a:p>
           <a:p>
             <a:pPr marL="457200" indent="-457200" algn="l">
@@ -8125,68 +9193,236 @@
           </a:prstGeom>
         </p:spPr>
       </p:pic>
+      <p:sp>
+        <p:nvSpPr>
+          <p:cNvPr id="6" name="Subtitle 2"/>
+          <p:cNvSpPr txBox="1">
+            <a:spLocks/>
+          </p:cNvSpPr>
+          <p:nvPr/>
+        </p:nvSpPr>
+        <p:spPr>
+          <a:xfrm>
+            <a:off x="473364" y="5691909"/>
+            <a:ext cx="8213436" cy="505691"/>
+          </a:xfrm>
+          <a:prstGeom prst="rect">
+            <a:avLst/>
+          </a:prstGeom>
+        </p:spPr>
+        <p:txBody>
+          <a:bodyPr vert="horz" lIns="91440" tIns="45720" rIns="91440" bIns="45720" rtlCol="0">
+            <a:noAutofit/>
+          </a:bodyPr>
+          <a:lstStyle>
+            <a:lvl1pPr marL="0" indent="0" algn="ctr" defTabSz="457200" rtl="0" eaLnBrk="1" latinLnBrk="0" hangingPunct="1">
+              <a:spcBef>
+                <a:spcPct val="20000"/>
+              </a:spcBef>
+              <a:buFont typeface="Arial"/>
+              <a:buNone/>
+              <a:defRPr sz="3200" kern="1200">
+                <a:solidFill>
+                  <a:schemeClr val="tx1">
+                    <a:tint val="75000"/>
+                  </a:schemeClr>
+                </a:solidFill>
+                <a:latin typeface="Arial"/>
+                <a:ea typeface="+mn-ea"/>
+                <a:cs typeface="+mn-cs"/>
+              </a:defRPr>
+            </a:lvl1pPr>
+            <a:lvl2pPr marL="457200" indent="0" algn="ctr" defTabSz="457200" rtl="0" eaLnBrk="1" latinLnBrk="0" hangingPunct="1">
+              <a:spcBef>
+                <a:spcPct val="20000"/>
+              </a:spcBef>
+              <a:buFont typeface="Arial"/>
+              <a:buNone/>
+              <a:defRPr sz="2800" kern="1200">
+                <a:solidFill>
+                  <a:schemeClr val="tx1">
+                    <a:tint val="75000"/>
+                  </a:schemeClr>
+                </a:solidFill>
+                <a:latin typeface="Arial"/>
+                <a:ea typeface="+mn-ea"/>
+                <a:cs typeface="+mn-cs"/>
+              </a:defRPr>
+            </a:lvl2pPr>
+            <a:lvl3pPr marL="914400" indent="0" algn="ctr" defTabSz="457200" rtl="0" eaLnBrk="1" latinLnBrk="0" hangingPunct="1">
+              <a:spcBef>
+                <a:spcPct val="20000"/>
+              </a:spcBef>
+              <a:buFont typeface="Arial"/>
+              <a:buNone/>
+              <a:defRPr sz="2400" kern="1200">
+                <a:solidFill>
+                  <a:schemeClr val="tx1">
+                    <a:tint val="75000"/>
+                  </a:schemeClr>
+                </a:solidFill>
+                <a:latin typeface="Arial"/>
+                <a:ea typeface="+mn-ea"/>
+                <a:cs typeface="+mn-cs"/>
+              </a:defRPr>
+            </a:lvl3pPr>
+            <a:lvl4pPr marL="1371600" indent="0" algn="ctr" defTabSz="457200" rtl="0" eaLnBrk="1" latinLnBrk="0" hangingPunct="1">
+              <a:spcBef>
+                <a:spcPct val="20000"/>
+              </a:spcBef>
+              <a:buFont typeface="Arial"/>
+              <a:buNone/>
+              <a:defRPr sz="2000" kern="1200">
+                <a:solidFill>
+                  <a:schemeClr val="tx1">
+                    <a:tint val="75000"/>
+                  </a:schemeClr>
+                </a:solidFill>
+                <a:latin typeface="Arial"/>
+                <a:ea typeface="+mn-ea"/>
+                <a:cs typeface="+mn-cs"/>
+              </a:defRPr>
+            </a:lvl4pPr>
+            <a:lvl5pPr marL="1828800" indent="0" algn="ctr" defTabSz="457200" rtl="0" eaLnBrk="1" latinLnBrk="0" hangingPunct="1">
+              <a:spcBef>
+                <a:spcPct val="20000"/>
+              </a:spcBef>
+              <a:buFont typeface="Arial"/>
+              <a:buNone/>
+              <a:defRPr sz="2000" kern="1200">
+                <a:solidFill>
+                  <a:schemeClr val="tx1">
+                    <a:tint val="75000"/>
+                  </a:schemeClr>
+                </a:solidFill>
+                <a:latin typeface="Arial"/>
+                <a:ea typeface="+mn-ea"/>
+                <a:cs typeface="+mn-cs"/>
+              </a:defRPr>
+            </a:lvl5pPr>
+            <a:lvl6pPr marL="2286000" indent="0" algn="ctr" defTabSz="457200" rtl="0" eaLnBrk="1" latinLnBrk="0" hangingPunct="1">
+              <a:spcBef>
+                <a:spcPct val="20000"/>
+              </a:spcBef>
+              <a:buFont typeface="Arial"/>
+              <a:buNone/>
+              <a:defRPr sz="2000" kern="1200">
+                <a:solidFill>
+                  <a:schemeClr val="tx1">
+                    <a:tint val="75000"/>
+                  </a:schemeClr>
+                </a:solidFill>
+                <a:latin typeface="+mn-lt"/>
+                <a:ea typeface="+mn-ea"/>
+                <a:cs typeface="+mn-cs"/>
+              </a:defRPr>
+            </a:lvl6pPr>
+            <a:lvl7pPr marL="2743200" indent="0" algn="ctr" defTabSz="457200" rtl="0" eaLnBrk="1" latinLnBrk="0" hangingPunct="1">
+              <a:spcBef>
+                <a:spcPct val="20000"/>
+              </a:spcBef>
+              <a:buFont typeface="Arial"/>
+              <a:buNone/>
+              <a:defRPr sz="2000" kern="1200">
+                <a:solidFill>
+                  <a:schemeClr val="tx1">
+                    <a:tint val="75000"/>
+                  </a:schemeClr>
+                </a:solidFill>
+                <a:latin typeface="+mn-lt"/>
+                <a:ea typeface="+mn-ea"/>
+                <a:cs typeface="+mn-cs"/>
+              </a:defRPr>
+            </a:lvl7pPr>
+            <a:lvl8pPr marL="3200400" indent="0" algn="ctr" defTabSz="457200" rtl="0" eaLnBrk="1" latinLnBrk="0" hangingPunct="1">
+              <a:spcBef>
+                <a:spcPct val="20000"/>
+              </a:spcBef>
+              <a:buFont typeface="Arial"/>
+              <a:buNone/>
+              <a:defRPr sz="2000" kern="1200">
+                <a:solidFill>
+                  <a:schemeClr val="tx1">
+                    <a:tint val="75000"/>
+                  </a:schemeClr>
+                </a:solidFill>
+                <a:latin typeface="+mn-lt"/>
+                <a:ea typeface="+mn-ea"/>
+                <a:cs typeface="+mn-cs"/>
+              </a:defRPr>
+            </a:lvl8pPr>
+            <a:lvl9pPr marL="3657600" indent="0" algn="ctr" defTabSz="457200" rtl="0" eaLnBrk="1" latinLnBrk="0" hangingPunct="1">
+              <a:spcBef>
+                <a:spcPct val="20000"/>
+              </a:spcBef>
+              <a:buFont typeface="Arial"/>
+              <a:buNone/>
+              <a:defRPr sz="2000" kern="1200">
+                <a:solidFill>
+                  <a:schemeClr val="tx1">
+                    <a:tint val="75000"/>
+                  </a:schemeClr>
+                </a:solidFill>
+                <a:latin typeface="+mn-lt"/>
+                <a:ea typeface="+mn-ea"/>
+                <a:cs typeface="+mn-cs"/>
+              </a:defRPr>
+            </a:lvl9pPr>
+          </a:lstStyle>
+          <a:p>
+            <a:pPr algn="l"/>
+            <a:r>
+              <a:rPr lang="en-US" sz="1800" dirty="0" smtClean="0">
+                <a:solidFill>
+                  <a:srgbClr val="FF6600"/>
+                </a:solidFill>
+              </a:rPr>
+              <a:t>Get benefits of </a:t>
+            </a:r>
+            <a:r>
+              <a:rPr lang="en-US" sz="1800" dirty="0" err="1" smtClean="0">
+                <a:solidFill>
+                  <a:srgbClr val="FF6600"/>
+                </a:solidFill>
+              </a:rPr>
+              <a:t>XGBoost</a:t>
+            </a:r>
+            <a:r>
+              <a:rPr lang="en-US" sz="1800" dirty="0" smtClean="0">
+                <a:solidFill>
+                  <a:srgbClr val="FF6600"/>
+                </a:solidFill>
+              </a:rPr>
+              <a:t> (non linearity, automatic, robust feature selection) with the benefits of linear models (online training, </a:t>
+            </a:r>
+            <a:r>
+              <a:rPr lang="en-US" sz="1800" dirty="0" err="1" smtClean="0">
+                <a:solidFill>
+                  <a:srgbClr val="FF6600"/>
+                </a:solidFill>
+              </a:rPr>
+              <a:t>explainability</a:t>
+            </a:r>
+            <a:r>
+              <a:rPr lang="en-US" sz="1800" dirty="0" smtClean="0">
+                <a:solidFill>
+                  <a:srgbClr val="FF6600"/>
+                </a:solidFill>
+              </a:rPr>
+              <a:t>)!</a:t>
+            </a:r>
+            <a:endParaRPr lang="en-US" sz="1800" dirty="0" smtClean="0">
+              <a:solidFill>
+                <a:srgbClr val="FF6600"/>
+              </a:solidFill>
+            </a:endParaRPr>
+          </a:p>
+        </p:txBody>
+      </p:sp>
     </p:spTree>
     <p:extLst>
       <p:ext uri="{BB962C8B-B14F-4D97-AF65-F5344CB8AC3E}">
         <p14:creationId xmlns:p14="http://schemas.microsoft.com/office/powerpoint/2010/main" val="3504579953"/>
-      </p:ext>
-    </p:extLst>
-  </p:cSld>
-  <p:clrMapOvr>
-    <a:masterClrMapping/>
-  </p:clrMapOvr>
-</p:sld>
-</file>
-
-<file path=ppt/slides/slide9.xml><?xml version="1.0" encoding="utf-8"?>
-<p:sld xmlns:a="http://schemas.openxmlformats.org/drawingml/2006/main" xmlns:r="http://schemas.openxmlformats.org/officeDocument/2006/relationships" xmlns:p="http://schemas.openxmlformats.org/presentationml/2006/main">
-  <p:cSld>
-    <p:spTree>
-      <p:nvGrpSpPr>
-        <p:cNvPr id="1" name=""/>
-        <p:cNvGrpSpPr/>
-        <p:nvPr/>
-      </p:nvGrpSpPr>
-      <p:grpSpPr>
-        <a:xfrm>
-          <a:off x="0" y="0"/>
-          <a:ext cx="0" cy="0"/>
-          <a:chOff x="0" y="0"/>
-          <a:chExt cx="0" cy="0"/>
-        </a:xfrm>
-      </p:grpSpPr>
-      <p:sp>
-        <p:nvSpPr>
-          <p:cNvPr id="2" name="Title 1"/>
-          <p:cNvSpPr>
-            <a:spLocks noGrp="1"/>
-          </p:cNvSpPr>
-          <p:nvPr>
-            <p:ph type="title"/>
-          </p:nvPr>
-        </p:nvSpPr>
-        <p:spPr>
-          <a:xfrm>
-            <a:off x="0" y="0"/>
-            <a:ext cx="9144000" cy="5943600"/>
-          </a:xfrm>
-        </p:spPr>
-        <p:txBody>
-          <a:bodyPr/>
-          <a:lstStyle/>
-          <a:p>
-            <a:r>
-              <a:rPr lang="en-US" dirty="0" smtClean="0"/>
-              <a:t>Data preprocessing</a:t>
-            </a:r>
-            <a:endParaRPr lang="en-US" dirty="0"/>
-          </a:p>
-        </p:txBody>
-      </p:sp>
-    </p:spTree>
-    <p:extLst>
-      <p:ext uri="{BB962C8B-B14F-4D97-AF65-F5344CB8AC3E}">
-        <p14:creationId xmlns:p14="http://schemas.microsoft.com/office/powerpoint/2010/main" val="4133557557"/>
       </p:ext>
     </p:extLst>
   </p:cSld>

</xml_diff>

<commit_message>
add sebastian slides, logloss metric content
</commit_message>
<xml_diff>
--- a/report/presentation.pptx
+++ b/report/presentation.pptx
@@ -5,10 +5,10 @@
     <p:sldMasterId id="2147483648" r:id="rId1"/>
   </p:sldMasterIdLst>
   <p:notesMasterIdLst>
-    <p:notesMasterId r:id="rId20"/>
+    <p:notesMasterId r:id="rId23"/>
   </p:notesMasterIdLst>
   <p:handoutMasterIdLst>
-    <p:handoutMasterId r:id="rId21"/>
+    <p:handoutMasterId r:id="rId24"/>
   </p:handoutMasterIdLst>
   <p:sldIdLst>
     <p:sldId id="256" r:id="rId2"/>
@@ -17,18 +17,21 @@
     <p:sldId id="261" r:id="rId5"/>
     <p:sldId id="268" r:id="rId6"/>
     <p:sldId id="276" r:id="rId7"/>
-    <p:sldId id="278" r:id="rId8"/>
-    <p:sldId id="263" r:id="rId9"/>
-    <p:sldId id="265" r:id="rId10"/>
-    <p:sldId id="267" r:id="rId11"/>
-    <p:sldId id="266" r:id="rId12"/>
+    <p:sldId id="263" r:id="rId8"/>
+    <p:sldId id="265" r:id="rId9"/>
+    <p:sldId id="267" r:id="rId10"/>
+    <p:sldId id="266" r:id="rId11"/>
+    <p:sldId id="278" r:id="rId12"/>
     <p:sldId id="272" r:id="rId13"/>
     <p:sldId id="264" r:id="rId14"/>
-    <p:sldId id="270" r:id="rId15"/>
-    <p:sldId id="269" r:id="rId16"/>
-    <p:sldId id="273" r:id="rId17"/>
-    <p:sldId id="274" r:id="rId18"/>
-    <p:sldId id="277" r:id="rId19"/>
+    <p:sldId id="279" r:id="rId15"/>
+    <p:sldId id="280" r:id="rId16"/>
+    <p:sldId id="281" r:id="rId17"/>
+    <p:sldId id="270" r:id="rId18"/>
+    <p:sldId id="269" r:id="rId19"/>
+    <p:sldId id="273" r:id="rId20"/>
+    <p:sldId id="274" r:id="rId21"/>
+    <p:sldId id="277" r:id="rId22"/>
   </p:sldIdLst>
   <p:sldSz cx="9144000" cy="6858000" type="screen4x3"/>
   <p:notesSz cx="6858000" cy="9144000"/>
@@ -212,7 +215,7 @@
           <a:p>
             <a:fld id="{DE6D1952-4C8C-594A-8D47-CC3EBD31CD69}" type="datetimeFigureOut">
               <a:rPr lang="en-US" smtClean="0"/>
-              <a:t>3/1/18</a:t>
+              <a:t>3/6/18</a:t>
             </a:fld>
             <a:endParaRPr lang="en-US"/>
           </a:p>
@@ -378,7 +381,7 @@
           <a:p>
             <a:fld id="{5AE82BA9-193E-D440-8A2C-9653656F2AE3}" type="datetimeFigureOut">
               <a:rPr lang="en-US" smtClean="0"/>
-              <a:t>3/1/18</a:t>
+              <a:t>3/6/18</a:t>
             </a:fld>
             <a:endParaRPr lang="en-US"/>
           </a:p>
@@ -960,7 +963,7 @@
             <a:fld id="{B362BA78-8688-C546-A03A-2A39F84C0B58}" type="datetime1">
               <a:rPr lang="en-US" smtClean="0"/>
               <a:pPr/>
-              <a:t>3/1/18</a:t>
+              <a:t>3/6/18</a:t>
             </a:fld>
             <a:endParaRPr lang="en-US"/>
           </a:p>
@@ -1182,7 +1185,7 @@
             <a:fld id="{EF5B9135-15EF-DE46-84CC-16626B0FAF7F}" type="datetime1">
               <a:rPr lang="en-US" smtClean="0"/>
               <a:pPr/>
-              <a:t>3/1/18</a:t>
+              <a:t>3/6/18</a:t>
             </a:fld>
             <a:endParaRPr lang="en-US"/>
           </a:p>
@@ -1432,7 +1435,7 @@
           <a:p>
             <a:fld id="{99477ADD-011F-3541-9724-9C7FC92455D5}" type="datetime1">
               <a:rPr lang="en-US" smtClean="0"/>
-              <a:t>3/1/18</a:t>
+              <a:t>3/6/18</a:t>
             </a:fld>
             <a:endParaRPr lang="en-US"/>
           </a:p>
@@ -1496,6 +1499,184 @@
     <p:extLst>
       <p:ext uri="{BB962C8B-B14F-4D97-AF65-F5344CB8AC3E}">
         <p14:creationId xmlns:p14="http://schemas.microsoft.com/office/powerpoint/2010/main" val="3349232128"/>
+      </p:ext>
+    </p:extLst>
+  </p:cSld>
+  <p:clrMapOvr>
+    <a:masterClrMapping/>
+  </p:clrMapOvr>
+</p:sldLayout>
+</file>
+
+<file path=ppt/slideLayouts/slideLayout13.xml><?xml version="1.0" encoding="utf-8"?>
+<p:sldLayout xmlns:a="http://schemas.openxmlformats.org/drawingml/2006/main" xmlns:r="http://schemas.openxmlformats.org/officeDocument/2006/relationships" xmlns:p="http://schemas.openxmlformats.org/presentationml/2006/main" type="objAndTwoObj">
+  <p:cSld name="Title Content and 2 Content">
+    <p:spTree>
+      <p:nvGrpSpPr>
+        <p:cNvPr id="1" name=""/>
+        <p:cNvGrpSpPr/>
+        <p:nvPr/>
+      </p:nvGrpSpPr>
+      <p:grpSpPr>
+        <a:xfrm>
+          <a:off x="0" y="0"/>
+          <a:ext cx="0" cy="0"/>
+          <a:chOff x="0" y="0"/>
+          <a:chExt cx="0" cy="0"/>
+        </a:xfrm>
+      </p:grpSpPr>
+      <p:sp>
+        <p:nvSpPr>
+          <p:cNvPr id="57" name="PlaceHolder 1"/>
+          <p:cNvSpPr>
+            <a:spLocks noGrp="1"/>
+          </p:cNvSpPr>
+          <p:nvPr>
+            <p:ph type="title"/>
+          </p:nvPr>
+        </p:nvSpPr>
+        <p:spPr>
+          <a:xfrm>
+            <a:off x="685800" y="2130480"/>
+            <a:ext cx="7772040" cy="1469520"/>
+          </a:xfrm>
+          <a:prstGeom prst="rect">
+            <a:avLst/>
+          </a:prstGeom>
+        </p:spPr>
+        <p:txBody>
+          <a:bodyPr lIns="0" tIns="0" rIns="0" bIns="0" anchor="ctr"/>
+          <a:lstStyle/>
+          <a:p>
+            <a:endParaRPr lang="en-US" sz="1800" b="0" strike="noStrike" spc="-1">
+              <a:solidFill>
+                <a:srgbClr val="000000"/>
+              </a:solidFill>
+              <a:uFill>
+                <a:solidFill>
+                  <a:srgbClr val="FFFFFF"/>
+                </a:solidFill>
+              </a:uFill>
+              <a:latin typeface="Calibri"/>
+            </a:endParaRPr>
+          </a:p>
+        </p:txBody>
+      </p:sp>
+      <p:sp>
+        <p:nvSpPr>
+          <p:cNvPr id="58" name="PlaceHolder 2"/>
+          <p:cNvSpPr>
+            <a:spLocks noGrp="1"/>
+          </p:cNvSpPr>
+          <p:nvPr>
+            <p:ph type="body"/>
+          </p:nvPr>
+        </p:nvSpPr>
+        <p:spPr>
+          <a:xfrm>
+            <a:off x="457200" y="1604520"/>
+            <a:ext cx="4015800" cy="3977280"/>
+          </a:xfrm>
+          <a:prstGeom prst="rect">
+            <a:avLst/>
+          </a:prstGeom>
+        </p:spPr>
+        <p:txBody>
+          <a:bodyPr lIns="0" tIns="0" rIns="0" bIns="0"/>
+          <a:lstStyle/>
+          <a:p>
+            <a:endParaRPr lang="en-US" sz="3200" b="0" strike="noStrike" spc="-1">
+              <a:solidFill>
+                <a:srgbClr val="000000"/>
+              </a:solidFill>
+              <a:uFill>
+                <a:solidFill>
+                  <a:srgbClr val="FFFFFF"/>
+                </a:solidFill>
+              </a:uFill>
+              <a:latin typeface="Arial"/>
+            </a:endParaRPr>
+          </a:p>
+        </p:txBody>
+      </p:sp>
+      <p:sp>
+        <p:nvSpPr>
+          <p:cNvPr id="59" name="PlaceHolder 3"/>
+          <p:cNvSpPr>
+            <a:spLocks noGrp="1"/>
+          </p:cNvSpPr>
+          <p:nvPr>
+            <p:ph type="body"/>
+          </p:nvPr>
+        </p:nvSpPr>
+        <p:spPr>
+          <a:xfrm>
+            <a:off x="4674240" y="1604520"/>
+            <a:ext cx="4015800" cy="1896840"/>
+          </a:xfrm>
+          <a:prstGeom prst="rect">
+            <a:avLst/>
+          </a:prstGeom>
+        </p:spPr>
+        <p:txBody>
+          <a:bodyPr lIns="0" tIns="0" rIns="0" bIns="0"/>
+          <a:lstStyle/>
+          <a:p>
+            <a:endParaRPr lang="en-US" sz="3200" b="0" strike="noStrike" spc="-1">
+              <a:solidFill>
+                <a:srgbClr val="000000"/>
+              </a:solidFill>
+              <a:uFill>
+                <a:solidFill>
+                  <a:srgbClr val="FFFFFF"/>
+                </a:solidFill>
+              </a:uFill>
+              <a:latin typeface="Arial"/>
+            </a:endParaRPr>
+          </a:p>
+        </p:txBody>
+      </p:sp>
+      <p:sp>
+        <p:nvSpPr>
+          <p:cNvPr id="60" name="PlaceHolder 4"/>
+          <p:cNvSpPr>
+            <a:spLocks noGrp="1"/>
+          </p:cNvSpPr>
+          <p:nvPr>
+            <p:ph type="body"/>
+          </p:nvPr>
+        </p:nvSpPr>
+        <p:spPr>
+          <a:xfrm>
+            <a:off x="4674240" y="3682080"/>
+            <a:ext cx="4015800" cy="1896840"/>
+          </a:xfrm>
+          <a:prstGeom prst="rect">
+            <a:avLst/>
+          </a:prstGeom>
+        </p:spPr>
+        <p:txBody>
+          <a:bodyPr lIns="0" tIns="0" rIns="0" bIns="0"/>
+          <a:lstStyle/>
+          <a:p>
+            <a:endParaRPr lang="en-US" sz="3200" b="0" strike="noStrike" spc="-1">
+              <a:solidFill>
+                <a:srgbClr val="000000"/>
+              </a:solidFill>
+              <a:uFill>
+                <a:solidFill>
+                  <a:srgbClr val="FFFFFF"/>
+                </a:solidFill>
+              </a:uFill>
+              <a:latin typeface="Arial"/>
+            </a:endParaRPr>
+          </a:p>
+        </p:txBody>
+      </p:sp>
+    </p:spTree>
+    <p:extLst>
+      <p:ext uri="{BB962C8B-B14F-4D97-AF65-F5344CB8AC3E}">
+        <p14:creationId xmlns:p14="http://schemas.microsoft.com/office/powerpoint/2010/main" val="2027397993"/>
       </p:ext>
     </p:extLst>
   </p:cSld>
@@ -1546,7 +1727,7 @@
             <a:fld id="{D3421027-4EC0-9C48-8CFB-B8A3104CB056}" type="datetime1">
               <a:rPr lang="en-US" smtClean="0"/>
               <a:pPr/>
-              <a:t>3/1/18</a:t>
+              <a:t>3/6/18</a:t>
             </a:fld>
             <a:endParaRPr lang="en-US"/>
           </a:p>
@@ -1814,7 +1995,7 @@
           <a:p>
             <a:fld id="{FA5DAB8B-8178-D047-869E-5A62AF236443}" type="datetime1">
               <a:rPr lang="en-US" smtClean="0"/>
-              <a:t>3/1/18</a:t>
+              <a:t>3/6/18</a:t>
             </a:fld>
             <a:endParaRPr lang="en-US" dirty="0"/>
           </a:p>
@@ -2030,7 +2211,7 @@
             <a:fld id="{B9AB8213-A564-3C44-8CA0-968996562138}" type="datetime1">
               <a:rPr lang="en-US" smtClean="0"/>
               <a:pPr/>
-              <a:t>3/1/18</a:t>
+              <a:t>3/6/18</a:t>
             </a:fld>
             <a:endParaRPr lang="en-US"/>
           </a:p>
@@ -2301,7 +2482,7 @@
             <a:fld id="{0A83DA12-03A5-114A-ABAE-78CD6BB6AC19}" type="datetime1">
               <a:rPr lang="en-US" smtClean="0"/>
               <a:pPr/>
-              <a:t>3/1/18</a:t>
+              <a:t>3/6/18</a:t>
             </a:fld>
             <a:endParaRPr lang="en-US"/>
           </a:p>
@@ -2635,7 +2816,7 @@
             <a:fld id="{1FFF386F-14E4-954A-9EC2-E277FFD66D49}" type="datetime1">
               <a:rPr lang="en-US" smtClean="0"/>
               <a:pPr/>
-              <a:t>3/1/18</a:t>
+              <a:t>3/6/18</a:t>
             </a:fld>
             <a:endParaRPr lang="en-US"/>
           </a:p>
@@ -3107,7 +3288,7 @@
             <a:fld id="{D8FFCF06-3344-8345-BEA6-DDAEFCC6ECCE}" type="datetime1">
               <a:rPr lang="en-US" smtClean="0"/>
               <a:pPr/>
-              <a:t>3/1/18</a:t>
+              <a:t>3/6/18</a:t>
             </a:fld>
             <a:endParaRPr lang="en-US"/>
           </a:p>
@@ -3251,7 +3432,7 @@
             <a:fld id="{84C6D879-35D4-554E-9D6D-93E8130AA922}" type="datetime1">
               <a:rPr lang="en-US" smtClean="0"/>
               <a:pPr/>
-              <a:t>3/1/18</a:t>
+              <a:t>3/6/18</a:t>
             </a:fld>
             <a:endParaRPr lang="en-US"/>
           </a:p>
@@ -3562,7 +3743,7 @@
             <a:fld id="{AB182AE3-760A-8E44-AB65-03A533386DFC}" type="datetime1">
               <a:rPr lang="en-US" smtClean="0"/>
               <a:pPr/>
-              <a:t>3/1/18</a:t>
+              <a:t>3/6/18</a:t>
             </a:fld>
             <a:endParaRPr lang="en-US"/>
           </a:p>
@@ -3667,7 +3848,7 @@
           <p:nvPr userDrawn="1"/>
         </p:nvPicPr>
         <p:blipFill>
-          <a:blip r:embed="rId14">
+          <a:blip r:embed="rId15">
             <a:extLst>
               <a:ext uri="{28A0092B-C50C-407E-A947-70E740481C1C}">
                 <a14:useLocalDpi xmlns:a14="http://schemas.microsoft.com/office/drawing/2010/main" val="0"/>
@@ -3818,7 +3999,7 @@
           <a:p>
             <a:fld id="{D98C176C-065F-124D-AAA4-94F2B7A2EC7C}" type="datetime1">
               <a:rPr lang="en-US" smtClean="0"/>
-              <a:t>3/1/18</a:t>
+              <a:t>3/6/18</a:t>
             </a:fld>
             <a:endParaRPr lang="en-US"/>
           </a:p>
@@ -3924,6 +4105,7 @@
     <p:sldLayoutId id="2147483657" r:id="rId10"/>
     <p:sldLayoutId id="2147483658" r:id="rId11"/>
     <p:sldLayoutId id="2147483659" r:id="rId12"/>
+    <p:sldLayoutId id="2147483661" r:id="rId13"/>
   </p:sldLayoutIdLst>
   <p:hf hdr="0" ftr="0" dt="0"/>
   <p:txStyles>
@@ -4662,7 +4844,15 @@
             <a:pPr algn="l"/>
             <a:r>
               <a:rPr lang="en-US" sz="2400" b="1" dirty="0" smtClean="0"/>
-              <a:t>Example of a decision tree</a:t>
+              <a:t>Facebook’s </a:t>
+            </a:r>
+            <a:r>
+              <a:rPr lang="en-US" sz="2400" b="1" dirty="0"/>
+              <a:t>h</a:t>
+            </a:r>
+            <a:r>
+              <a:rPr lang="en-US" sz="2400" b="1" dirty="0" smtClean="0"/>
+              <a:t>ybrid boosted/linear model</a:t>
             </a:r>
             <a:endParaRPr lang="en-US" sz="2400" b="1" dirty="0"/>
           </a:p>
@@ -4692,9 +4882,439 @@
           </a:p>
         </p:txBody>
       </p:sp>
+      <p:sp>
+        <p:nvSpPr>
+          <p:cNvPr id="7" name="Subtitle 2"/>
+          <p:cNvSpPr>
+            <a:spLocks noGrp="1"/>
+          </p:cNvSpPr>
+          <p:nvPr>
+            <p:ph type="subTitle" idx="1"/>
+          </p:nvPr>
+        </p:nvSpPr>
+        <p:spPr>
+          <a:xfrm>
+            <a:off x="309417" y="743527"/>
+            <a:ext cx="4932219" cy="4925291"/>
+          </a:xfrm>
+        </p:spPr>
+        <p:txBody>
+          <a:bodyPr>
+            <a:normAutofit/>
+          </a:bodyPr>
+          <a:lstStyle/>
+          <a:p>
+            <a:pPr marL="457200" indent="-457200" algn="l">
+              <a:buFont typeface="+mj-lt"/>
+              <a:buAutoNum type="arabicPeriod"/>
+            </a:pPr>
+            <a:r>
+              <a:rPr lang="en-US" sz="2000" dirty="0" smtClean="0">
+                <a:solidFill>
+                  <a:schemeClr val="tx1"/>
+                </a:solidFill>
+              </a:rPr>
+              <a:t>Fit boosted decision tree model to CTR data training set with cross validation.</a:t>
+            </a:r>
+          </a:p>
+          <a:p>
+            <a:pPr marL="457200" indent="-457200" algn="l">
+              <a:buFont typeface="+mj-lt"/>
+              <a:buAutoNum type="arabicPeriod"/>
+            </a:pPr>
+            <a:r>
+              <a:rPr lang="en-US" sz="2000" dirty="0" smtClean="0">
+                <a:solidFill>
+                  <a:schemeClr val="tx1"/>
+                </a:solidFill>
+              </a:rPr>
+              <a:t>“Send data through trees” </a:t>
+            </a:r>
+            <a:r>
+              <a:rPr lang="mr-IN" sz="2000" dirty="0" smtClean="0">
+                <a:solidFill>
+                  <a:schemeClr val="tx1"/>
+                </a:solidFill>
+              </a:rPr>
+              <a:t>–</a:t>
+            </a:r>
+            <a:r>
+              <a:rPr lang="en-US" sz="2000" dirty="0" smtClean="0">
+                <a:solidFill>
+                  <a:schemeClr val="tx1"/>
+                </a:solidFill>
+              </a:rPr>
+              <a:t> boosted model is comprised of </a:t>
+            </a:r>
+            <a:r>
+              <a:rPr lang="en-US" sz="2000" i="1" dirty="0" smtClean="0">
+                <a:solidFill>
+                  <a:schemeClr val="tx1"/>
+                </a:solidFill>
+              </a:rPr>
+              <a:t>M </a:t>
+            </a:r>
+            <a:r>
+              <a:rPr lang="en-US" sz="2000" dirty="0" smtClean="0">
+                <a:solidFill>
+                  <a:schemeClr val="tx1"/>
+                </a:solidFill>
+              </a:rPr>
+              <a:t>weak learners. Each tree has </a:t>
+            </a:r>
+            <a:r>
+              <a:rPr lang="en-US" sz="2000" i="1" dirty="0" smtClean="0">
+                <a:solidFill>
+                  <a:schemeClr val="tx1"/>
+                </a:solidFill>
+              </a:rPr>
+              <a:t>p </a:t>
+            </a:r>
+            <a:r>
+              <a:rPr lang="en-US" sz="2000" dirty="0" smtClean="0">
+                <a:solidFill>
+                  <a:schemeClr val="tx1"/>
+                </a:solidFill>
+              </a:rPr>
+              <a:t>terminal nodes. Represent each observation an (1 x </a:t>
+            </a:r>
+            <a:r>
+              <a:rPr lang="en-US" sz="2000" i="1" dirty="0" err="1" smtClean="0">
+                <a:solidFill>
+                  <a:schemeClr val="tx1"/>
+                </a:solidFill>
+              </a:rPr>
+              <a:t>pM</a:t>
+            </a:r>
+            <a:r>
+              <a:rPr lang="en-US" sz="2000" dirty="0" smtClean="0">
+                <a:solidFill>
+                  <a:schemeClr val="tx1"/>
+                </a:solidFill>
+              </a:rPr>
+              <a:t>) vector by “following” trees. All data will fall into </a:t>
+            </a:r>
+            <a:r>
+              <a:rPr lang="en-US" sz="2000" i="1" dirty="0" smtClean="0">
+                <a:solidFill>
+                  <a:schemeClr val="tx1"/>
+                </a:solidFill>
+              </a:rPr>
+              <a:t>M</a:t>
+            </a:r>
+            <a:r>
+              <a:rPr lang="en-US" sz="2000" dirty="0" smtClean="0">
+                <a:solidFill>
+                  <a:schemeClr val="tx1"/>
+                </a:solidFill>
+              </a:rPr>
+              <a:t> terminal nodes. Each feature corresponds to a set of decisions, e.g. “</a:t>
+            </a:r>
+            <a:r>
+              <a:rPr lang="en-US" sz="2000" dirty="0" err="1" smtClean="0">
+                <a:solidFill>
+                  <a:schemeClr val="tx1"/>
+                </a:solidFill>
+              </a:rPr>
+              <a:t>device_type</a:t>
+            </a:r>
+            <a:r>
+              <a:rPr lang="en-US" sz="2000" dirty="0" smtClean="0">
+                <a:solidFill>
+                  <a:schemeClr val="tx1"/>
+                </a:solidFill>
+              </a:rPr>
+              <a:t> == ‘type 3’ &amp; </a:t>
+            </a:r>
+            <a:r>
+              <a:rPr lang="en-US" sz="2000" dirty="0" err="1" smtClean="0">
+                <a:solidFill>
+                  <a:schemeClr val="tx1"/>
+                </a:solidFill>
+              </a:rPr>
+              <a:t>site_category</a:t>
+            </a:r>
+            <a:r>
+              <a:rPr lang="en-US" sz="2000" dirty="0" smtClean="0">
+                <a:solidFill>
+                  <a:schemeClr val="tx1"/>
+                </a:solidFill>
+              </a:rPr>
+              <a:t> == ‘</a:t>
+            </a:r>
+            <a:r>
+              <a:rPr lang="pl-PL" sz="2000" dirty="0" smtClean="0">
+                <a:solidFill>
+                  <a:schemeClr val="tx1"/>
+                </a:solidFill>
+              </a:rPr>
+              <a:t>bcf865d9’ &amp; </a:t>
+            </a:r>
+            <a:r>
+              <a:rPr lang="en-US" sz="2000" dirty="0" smtClean="0">
+                <a:solidFill>
+                  <a:schemeClr val="tx1"/>
+                </a:solidFill>
+              </a:rPr>
+              <a:t>hour &gt; 3”. Use </a:t>
+            </a:r>
+            <a:r>
+              <a:rPr lang="en-US" sz="2000" b="1" dirty="0" err="1" smtClean="0">
+                <a:solidFill>
+                  <a:schemeClr val="tx1"/>
+                </a:solidFill>
+              </a:rPr>
+              <a:t>XGBoost</a:t>
+            </a:r>
+            <a:r>
+              <a:rPr lang="en-US" sz="2000" dirty="0" smtClean="0">
+                <a:solidFill>
+                  <a:schemeClr val="tx1"/>
+                </a:solidFill>
+              </a:rPr>
+              <a:t> package.</a:t>
+            </a:r>
+          </a:p>
+          <a:p>
+            <a:pPr marL="457200" indent="-457200" algn="l">
+              <a:buFont typeface="+mj-lt"/>
+              <a:buAutoNum type="arabicPeriod"/>
+            </a:pPr>
+            <a:r>
+              <a:rPr lang="en-US" sz="2000" dirty="0" smtClean="0">
+                <a:solidFill>
+                  <a:schemeClr val="tx1"/>
+                </a:solidFill>
+              </a:rPr>
+              <a:t>Train penalized linear model to learn important rules.</a:t>
+            </a:r>
+          </a:p>
+        </p:txBody>
+      </p:sp>
+      <p:sp>
+        <p:nvSpPr>
+          <p:cNvPr id="6" name="Subtitle 2"/>
+          <p:cNvSpPr txBox="1">
+            <a:spLocks/>
+          </p:cNvSpPr>
+          <p:nvPr/>
+        </p:nvSpPr>
+        <p:spPr>
+          <a:xfrm>
+            <a:off x="473364" y="5691909"/>
+            <a:ext cx="8213436" cy="505691"/>
+          </a:xfrm>
+          <a:prstGeom prst="rect">
+            <a:avLst/>
+          </a:prstGeom>
+        </p:spPr>
+        <p:txBody>
+          <a:bodyPr vert="horz" lIns="91440" tIns="45720" rIns="91440" bIns="45720" rtlCol="0">
+            <a:noAutofit/>
+          </a:bodyPr>
+          <a:lstStyle>
+            <a:lvl1pPr marL="0" indent="0" algn="ctr" defTabSz="457200" rtl="0" eaLnBrk="1" latinLnBrk="0" hangingPunct="1">
+              <a:spcBef>
+                <a:spcPct val="20000"/>
+              </a:spcBef>
+              <a:buFont typeface="Arial"/>
+              <a:buNone/>
+              <a:defRPr sz="3200" kern="1200">
+                <a:solidFill>
+                  <a:schemeClr val="tx1">
+                    <a:tint val="75000"/>
+                  </a:schemeClr>
+                </a:solidFill>
+                <a:latin typeface="Arial"/>
+                <a:ea typeface="+mn-ea"/>
+                <a:cs typeface="+mn-cs"/>
+              </a:defRPr>
+            </a:lvl1pPr>
+            <a:lvl2pPr marL="457200" indent="0" algn="ctr" defTabSz="457200" rtl="0" eaLnBrk="1" latinLnBrk="0" hangingPunct="1">
+              <a:spcBef>
+                <a:spcPct val="20000"/>
+              </a:spcBef>
+              <a:buFont typeface="Arial"/>
+              <a:buNone/>
+              <a:defRPr sz="2800" kern="1200">
+                <a:solidFill>
+                  <a:schemeClr val="tx1">
+                    <a:tint val="75000"/>
+                  </a:schemeClr>
+                </a:solidFill>
+                <a:latin typeface="Arial"/>
+                <a:ea typeface="+mn-ea"/>
+                <a:cs typeface="+mn-cs"/>
+              </a:defRPr>
+            </a:lvl2pPr>
+            <a:lvl3pPr marL="914400" indent="0" algn="ctr" defTabSz="457200" rtl="0" eaLnBrk="1" latinLnBrk="0" hangingPunct="1">
+              <a:spcBef>
+                <a:spcPct val="20000"/>
+              </a:spcBef>
+              <a:buFont typeface="Arial"/>
+              <a:buNone/>
+              <a:defRPr sz="2400" kern="1200">
+                <a:solidFill>
+                  <a:schemeClr val="tx1">
+                    <a:tint val="75000"/>
+                  </a:schemeClr>
+                </a:solidFill>
+                <a:latin typeface="Arial"/>
+                <a:ea typeface="+mn-ea"/>
+                <a:cs typeface="+mn-cs"/>
+              </a:defRPr>
+            </a:lvl3pPr>
+            <a:lvl4pPr marL="1371600" indent="0" algn="ctr" defTabSz="457200" rtl="0" eaLnBrk="1" latinLnBrk="0" hangingPunct="1">
+              <a:spcBef>
+                <a:spcPct val="20000"/>
+              </a:spcBef>
+              <a:buFont typeface="Arial"/>
+              <a:buNone/>
+              <a:defRPr sz="2000" kern="1200">
+                <a:solidFill>
+                  <a:schemeClr val="tx1">
+                    <a:tint val="75000"/>
+                  </a:schemeClr>
+                </a:solidFill>
+                <a:latin typeface="Arial"/>
+                <a:ea typeface="+mn-ea"/>
+                <a:cs typeface="+mn-cs"/>
+              </a:defRPr>
+            </a:lvl4pPr>
+            <a:lvl5pPr marL="1828800" indent="0" algn="ctr" defTabSz="457200" rtl="0" eaLnBrk="1" latinLnBrk="0" hangingPunct="1">
+              <a:spcBef>
+                <a:spcPct val="20000"/>
+              </a:spcBef>
+              <a:buFont typeface="Arial"/>
+              <a:buNone/>
+              <a:defRPr sz="2000" kern="1200">
+                <a:solidFill>
+                  <a:schemeClr val="tx1">
+                    <a:tint val="75000"/>
+                  </a:schemeClr>
+                </a:solidFill>
+                <a:latin typeface="Arial"/>
+                <a:ea typeface="+mn-ea"/>
+                <a:cs typeface="+mn-cs"/>
+              </a:defRPr>
+            </a:lvl5pPr>
+            <a:lvl6pPr marL="2286000" indent="0" algn="ctr" defTabSz="457200" rtl="0" eaLnBrk="1" latinLnBrk="0" hangingPunct="1">
+              <a:spcBef>
+                <a:spcPct val="20000"/>
+              </a:spcBef>
+              <a:buFont typeface="Arial"/>
+              <a:buNone/>
+              <a:defRPr sz="2000" kern="1200">
+                <a:solidFill>
+                  <a:schemeClr val="tx1">
+                    <a:tint val="75000"/>
+                  </a:schemeClr>
+                </a:solidFill>
+                <a:latin typeface="+mn-lt"/>
+                <a:ea typeface="+mn-ea"/>
+                <a:cs typeface="+mn-cs"/>
+              </a:defRPr>
+            </a:lvl6pPr>
+            <a:lvl7pPr marL="2743200" indent="0" algn="ctr" defTabSz="457200" rtl="0" eaLnBrk="1" latinLnBrk="0" hangingPunct="1">
+              <a:spcBef>
+                <a:spcPct val="20000"/>
+              </a:spcBef>
+              <a:buFont typeface="Arial"/>
+              <a:buNone/>
+              <a:defRPr sz="2000" kern="1200">
+                <a:solidFill>
+                  <a:schemeClr val="tx1">
+                    <a:tint val="75000"/>
+                  </a:schemeClr>
+                </a:solidFill>
+                <a:latin typeface="+mn-lt"/>
+                <a:ea typeface="+mn-ea"/>
+                <a:cs typeface="+mn-cs"/>
+              </a:defRPr>
+            </a:lvl7pPr>
+            <a:lvl8pPr marL="3200400" indent="0" algn="ctr" defTabSz="457200" rtl="0" eaLnBrk="1" latinLnBrk="0" hangingPunct="1">
+              <a:spcBef>
+                <a:spcPct val="20000"/>
+              </a:spcBef>
+              <a:buFont typeface="Arial"/>
+              <a:buNone/>
+              <a:defRPr sz="2000" kern="1200">
+                <a:solidFill>
+                  <a:schemeClr val="tx1">
+                    <a:tint val="75000"/>
+                  </a:schemeClr>
+                </a:solidFill>
+                <a:latin typeface="+mn-lt"/>
+                <a:ea typeface="+mn-ea"/>
+                <a:cs typeface="+mn-cs"/>
+              </a:defRPr>
+            </a:lvl8pPr>
+            <a:lvl9pPr marL="3657600" indent="0" algn="ctr" defTabSz="457200" rtl="0" eaLnBrk="1" latinLnBrk="0" hangingPunct="1">
+              <a:spcBef>
+                <a:spcPct val="20000"/>
+              </a:spcBef>
+              <a:buFont typeface="Arial"/>
+              <a:buNone/>
+              <a:defRPr sz="2000" kern="1200">
+                <a:solidFill>
+                  <a:schemeClr val="tx1">
+                    <a:tint val="75000"/>
+                  </a:schemeClr>
+                </a:solidFill>
+                <a:latin typeface="+mn-lt"/>
+                <a:ea typeface="+mn-ea"/>
+                <a:cs typeface="+mn-cs"/>
+              </a:defRPr>
+            </a:lvl9pPr>
+          </a:lstStyle>
+          <a:p>
+            <a:pPr algn="l"/>
+            <a:r>
+              <a:rPr lang="en-US" sz="1800" dirty="0" smtClean="0">
+                <a:solidFill>
+                  <a:srgbClr val="FF6600"/>
+                </a:solidFill>
+              </a:rPr>
+              <a:t>Get benefits of </a:t>
+            </a:r>
+            <a:r>
+              <a:rPr lang="en-US" sz="1800" dirty="0" err="1" smtClean="0">
+                <a:solidFill>
+                  <a:srgbClr val="FF6600"/>
+                </a:solidFill>
+              </a:rPr>
+              <a:t>XGBoost</a:t>
+            </a:r>
+            <a:r>
+              <a:rPr lang="en-US" sz="1800" dirty="0" smtClean="0">
+                <a:solidFill>
+                  <a:srgbClr val="FF6600"/>
+                </a:solidFill>
+              </a:rPr>
+              <a:t> (non linearity, automatic, robust feature selection) with the benefits of linear models (online training, </a:t>
+            </a:r>
+            <a:r>
+              <a:rPr lang="en-US" sz="1800" dirty="0" err="1" smtClean="0">
+                <a:solidFill>
+                  <a:srgbClr val="FF6600"/>
+                </a:solidFill>
+              </a:rPr>
+              <a:t>explainability</a:t>
+            </a:r>
+            <a:r>
+              <a:rPr lang="en-US" sz="1800" dirty="0" smtClean="0">
+                <a:solidFill>
+                  <a:srgbClr val="FF6600"/>
+                </a:solidFill>
+              </a:rPr>
+              <a:t>)!</a:t>
+            </a:r>
+          </a:p>
+        </p:txBody>
+      </p:sp>
       <p:pic>
         <p:nvPicPr>
-          <p:cNvPr id="8" name="Picture 7" descr="decision_tree_example.png"/>
+          <p:cNvPr id="3" name="Picture 2" descr="hybrid_model.png"/>
           <p:cNvPicPr>
             <a:picLocks noChangeAspect="1"/>
           </p:cNvPicPr>
@@ -4714,408 +5334,18 @@
         </p:blipFill>
         <p:spPr>
           <a:xfrm>
-            <a:off x="2055091" y="1177635"/>
-            <a:ext cx="5498709" cy="3163455"/>
+            <a:off x="5303588" y="1103630"/>
+            <a:ext cx="3840412" cy="3021330"/>
           </a:xfrm>
           <a:prstGeom prst="rect">
             <a:avLst/>
           </a:prstGeom>
         </p:spPr>
       </p:pic>
-      <p:cxnSp>
-        <p:nvCxnSpPr>
-          <p:cNvPr id="11" name="Straight Arrow Connector 10"/>
-          <p:cNvCxnSpPr/>
-          <p:nvPr/>
-        </p:nvCxnSpPr>
-        <p:spPr>
-          <a:xfrm>
-            <a:off x="2465142" y="1443182"/>
-            <a:ext cx="2112818" cy="57726"/>
-          </a:xfrm>
-          <a:prstGeom prst="straightConnector1">
-            <a:avLst/>
-          </a:prstGeom>
-          <a:ln>
-            <a:tailEnd type="arrow"/>
-          </a:ln>
-        </p:spPr>
-        <p:style>
-          <a:lnRef idx="2">
-            <a:schemeClr val="accent6"/>
-          </a:lnRef>
-          <a:fillRef idx="0">
-            <a:schemeClr val="accent6"/>
-          </a:fillRef>
-          <a:effectRef idx="1">
-            <a:schemeClr val="accent6"/>
-          </a:effectRef>
-          <a:fontRef idx="minor">
-            <a:schemeClr val="tx1"/>
-          </a:fontRef>
-        </p:style>
-      </p:cxnSp>
-      <p:cxnSp>
-        <p:nvCxnSpPr>
-          <p:cNvPr id="13" name="Straight Arrow Connector 12"/>
-          <p:cNvCxnSpPr/>
-          <p:nvPr/>
-        </p:nvCxnSpPr>
-        <p:spPr>
-          <a:xfrm>
-            <a:off x="2465142" y="1443182"/>
-            <a:ext cx="1212273" cy="900545"/>
-          </a:xfrm>
-          <a:prstGeom prst="straightConnector1">
-            <a:avLst/>
-          </a:prstGeom>
-          <a:ln>
-            <a:tailEnd type="arrow"/>
-          </a:ln>
-        </p:spPr>
-        <p:style>
-          <a:lnRef idx="2">
-            <a:schemeClr val="accent6"/>
-          </a:lnRef>
-          <a:fillRef idx="0">
-            <a:schemeClr val="accent6"/>
-          </a:fillRef>
-          <a:effectRef idx="1">
-            <a:schemeClr val="accent6"/>
-          </a:effectRef>
-          <a:fontRef idx="minor">
-            <a:schemeClr val="tx1"/>
-          </a:fontRef>
-        </p:style>
-      </p:cxnSp>
-      <p:sp>
-        <p:nvSpPr>
-          <p:cNvPr id="18" name="Subtitle 2"/>
-          <p:cNvSpPr>
-            <a:spLocks noGrp="1"/>
-          </p:cNvSpPr>
-          <p:nvPr>
-            <p:ph type="subTitle" idx="1"/>
-          </p:nvPr>
-        </p:nvSpPr>
-        <p:spPr>
-          <a:xfrm>
-            <a:off x="710233" y="1223816"/>
-            <a:ext cx="1924441" cy="484909"/>
-          </a:xfrm>
-        </p:spPr>
-        <p:txBody>
-          <a:bodyPr>
-            <a:normAutofit lnSpcReduction="10000"/>
-          </a:bodyPr>
-          <a:lstStyle/>
-          <a:p>
-            <a:pPr algn="l"/>
-            <a:r>
-              <a:rPr lang="en-US" sz="1400" dirty="0" smtClean="0">
-                <a:solidFill>
-                  <a:srgbClr val="FF6600"/>
-                </a:solidFill>
-              </a:rPr>
-              <a:t>Age and gender are the “split variables”</a:t>
-            </a:r>
-          </a:p>
-        </p:txBody>
-      </p:sp>
-      <p:cxnSp>
-        <p:nvCxnSpPr>
-          <p:cNvPr id="19" name="Straight Arrow Connector 18"/>
-          <p:cNvCxnSpPr/>
-          <p:nvPr/>
-        </p:nvCxnSpPr>
-        <p:spPr>
-          <a:xfrm flipH="1" flipV="1">
-            <a:off x="2857687" y="4341090"/>
-            <a:ext cx="1085273" cy="568038"/>
-          </a:xfrm>
-          <a:prstGeom prst="straightConnector1">
-            <a:avLst/>
-          </a:prstGeom>
-          <a:ln>
-            <a:tailEnd type="arrow"/>
-          </a:ln>
-        </p:spPr>
-        <p:style>
-          <a:lnRef idx="2">
-            <a:schemeClr val="accent6"/>
-          </a:lnRef>
-          <a:fillRef idx="0">
-            <a:schemeClr val="accent6"/>
-          </a:fillRef>
-          <a:effectRef idx="1">
-            <a:schemeClr val="accent6"/>
-          </a:effectRef>
-          <a:fontRef idx="minor">
-            <a:schemeClr val="tx1"/>
-          </a:fontRef>
-        </p:style>
-      </p:cxnSp>
-      <p:cxnSp>
-        <p:nvCxnSpPr>
-          <p:cNvPr id="22" name="Straight Arrow Connector 21"/>
-          <p:cNvCxnSpPr>
-            <a:endCxn id="8" idx="2"/>
-          </p:cNvCxnSpPr>
-          <p:nvPr/>
-        </p:nvCxnSpPr>
-        <p:spPr>
-          <a:xfrm flipV="1">
-            <a:off x="4196960" y="4341090"/>
-            <a:ext cx="607486" cy="568038"/>
-          </a:xfrm>
-          <a:prstGeom prst="straightConnector1">
-            <a:avLst/>
-          </a:prstGeom>
-          <a:ln>
-            <a:tailEnd type="arrow"/>
-          </a:ln>
-        </p:spPr>
-        <p:style>
-          <a:lnRef idx="2">
-            <a:schemeClr val="accent6"/>
-          </a:lnRef>
-          <a:fillRef idx="0">
-            <a:schemeClr val="accent6"/>
-          </a:fillRef>
-          <a:effectRef idx="1">
-            <a:schemeClr val="accent6"/>
-          </a:effectRef>
-          <a:fontRef idx="minor">
-            <a:schemeClr val="tx1"/>
-          </a:fontRef>
-        </p:style>
-      </p:cxnSp>
-      <p:cxnSp>
-        <p:nvCxnSpPr>
-          <p:cNvPr id="25" name="Straight Arrow Connector 24"/>
-          <p:cNvCxnSpPr/>
-          <p:nvPr/>
-        </p:nvCxnSpPr>
-        <p:spPr>
-          <a:xfrm flipV="1">
-            <a:off x="4658778" y="4167909"/>
-            <a:ext cx="1674091" cy="741219"/>
-          </a:xfrm>
-          <a:prstGeom prst="straightConnector1">
-            <a:avLst/>
-          </a:prstGeom>
-          <a:ln>
-            <a:tailEnd type="arrow"/>
-          </a:ln>
-        </p:spPr>
-        <p:style>
-          <a:lnRef idx="2">
-            <a:schemeClr val="accent6"/>
-          </a:lnRef>
-          <a:fillRef idx="0">
-            <a:schemeClr val="accent6"/>
-          </a:fillRef>
-          <a:effectRef idx="1">
-            <a:schemeClr val="accent6"/>
-          </a:effectRef>
-          <a:fontRef idx="minor">
-            <a:schemeClr val="tx1"/>
-          </a:fontRef>
-        </p:style>
-      </p:cxnSp>
-      <p:sp>
-        <p:nvSpPr>
-          <p:cNvPr id="28" name="Subtitle 2"/>
-          <p:cNvSpPr txBox="1">
-            <a:spLocks/>
-          </p:cNvSpPr>
-          <p:nvPr/>
-        </p:nvSpPr>
-        <p:spPr>
-          <a:xfrm>
-            <a:off x="3568887" y="4934526"/>
-            <a:ext cx="2018145" cy="607292"/>
-          </a:xfrm>
-          <a:prstGeom prst="rect">
-            <a:avLst/>
-          </a:prstGeom>
-        </p:spPr>
-        <p:txBody>
-          <a:bodyPr vert="horz" lIns="91440" tIns="45720" rIns="91440" bIns="45720" rtlCol="0">
-            <a:normAutofit fontScale="92500"/>
-          </a:bodyPr>
-          <a:lstStyle>
-            <a:lvl1pPr marL="0" indent="0" algn="ctr" defTabSz="457200" rtl="0" eaLnBrk="1" latinLnBrk="0" hangingPunct="1">
-              <a:spcBef>
-                <a:spcPct val="20000"/>
-              </a:spcBef>
-              <a:buFont typeface="Arial"/>
-              <a:buNone/>
-              <a:defRPr sz="3200" kern="1200">
-                <a:solidFill>
-                  <a:schemeClr val="tx1">
-                    <a:tint val="75000"/>
-                  </a:schemeClr>
-                </a:solidFill>
-                <a:latin typeface="Arial"/>
-                <a:ea typeface="+mn-ea"/>
-                <a:cs typeface="+mn-cs"/>
-              </a:defRPr>
-            </a:lvl1pPr>
-            <a:lvl2pPr marL="457200" indent="0" algn="ctr" defTabSz="457200" rtl="0" eaLnBrk="1" latinLnBrk="0" hangingPunct="1">
-              <a:spcBef>
-                <a:spcPct val="20000"/>
-              </a:spcBef>
-              <a:buFont typeface="Arial"/>
-              <a:buNone/>
-              <a:defRPr sz="2800" kern="1200">
-                <a:solidFill>
-                  <a:schemeClr val="tx1">
-                    <a:tint val="75000"/>
-                  </a:schemeClr>
-                </a:solidFill>
-                <a:latin typeface="Arial"/>
-                <a:ea typeface="+mn-ea"/>
-                <a:cs typeface="+mn-cs"/>
-              </a:defRPr>
-            </a:lvl2pPr>
-            <a:lvl3pPr marL="914400" indent="0" algn="ctr" defTabSz="457200" rtl="0" eaLnBrk="1" latinLnBrk="0" hangingPunct="1">
-              <a:spcBef>
-                <a:spcPct val="20000"/>
-              </a:spcBef>
-              <a:buFont typeface="Arial"/>
-              <a:buNone/>
-              <a:defRPr sz="2400" kern="1200">
-                <a:solidFill>
-                  <a:schemeClr val="tx1">
-                    <a:tint val="75000"/>
-                  </a:schemeClr>
-                </a:solidFill>
-                <a:latin typeface="Arial"/>
-                <a:ea typeface="+mn-ea"/>
-                <a:cs typeface="+mn-cs"/>
-              </a:defRPr>
-            </a:lvl3pPr>
-            <a:lvl4pPr marL="1371600" indent="0" algn="ctr" defTabSz="457200" rtl="0" eaLnBrk="1" latinLnBrk="0" hangingPunct="1">
-              <a:spcBef>
-                <a:spcPct val="20000"/>
-              </a:spcBef>
-              <a:buFont typeface="Arial"/>
-              <a:buNone/>
-              <a:defRPr sz="2000" kern="1200">
-                <a:solidFill>
-                  <a:schemeClr val="tx1">
-                    <a:tint val="75000"/>
-                  </a:schemeClr>
-                </a:solidFill>
-                <a:latin typeface="Arial"/>
-                <a:ea typeface="+mn-ea"/>
-                <a:cs typeface="+mn-cs"/>
-              </a:defRPr>
-            </a:lvl4pPr>
-            <a:lvl5pPr marL="1828800" indent="0" algn="ctr" defTabSz="457200" rtl="0" eaLnBrk="1" latinLnBrk="0" hangingPunct="1">
-              <a:spcBef>
-                <a:spcPct val="20000"/>
-              </a:spcBef>
-              <a:buFont typeface="Arial"/>
-              <a:buNone/>
-              <a:defRPr sz="2000" kern="1200">
-                <a:solidFill>
-                  <a:schemeClr val="tx1">
-                    <a:tint val="75000"/>
-                  </a:schemeClr>
-                </a:solidFill>
-                <a:latin typeface="Arial"/>
-                <a:ea typeface="+mn-ea"/>
-                <a:cs typeface="+mn-cs"/>
-              </a:defRPr>
-            </a:lvl5pPr>
-            <a:lvl6pPr marL="2286000" indent="0" algn="ctr" defTabSz="457200" rtl="0" eaLnBrk="1" latinLnBrk="0" hangingPunct="1">
-              <a:spcBef>
-                <a:spcPct val="20000"/>
-              </a:spcBef>
-              <a:buFont typeface="Arial"/>
-              <a:buNone/>
-              <a:defRPr sz="2000" kern="1200">
-                <a:solidFill>
-                  <a:schemeClr val="tx1">
-                    <a:tint val="75000"/>
-                  </a:schemeClr>
-                </a:solidFill>
-                <a:latin typeface="+mn-lt"/>
-                <a:ea typeface="+mn-ea"/>
-                <a:cs typeface="+mn-cs"/>
-              </a:defRPr>
-            </a:lvl6pPr>
-            <a:lvl7pPr marL="2743200" indent="0" algn="ctr" defTabSz="457200" rtl="0" eaLnBrk="1" latinLnBrk="0" hangingPunct="1">
-              <a:spcBef>
-                <a:spcPct val="20000"/>
-              </a:spcBef>
-              <a:buFont typeface="Arial"/>
-              <a:buNone/>
-              <a:defRPr sz="2000" kern="1200">
-                <a:solidFill>
-                  <a:schemeClr val="tx1">
-                    <a:tint val="75000"/>
-                  </a:schemeClr>
-                </a:solidFill>
-                <a:latin typeface="+mn-lt"/>
-                <a:ea typeface="+mn-ea"/>
-                <a:cs typeface="+mn-cs"/>
-              </a:defRPr>
-            </a:lvl7pPr>
-            <a:lvl8pPr marL="3200400" indent="0" algn="ctr" defTabSz="457200" rtl="0" eaLnBrk="1" latinLnBrk="0" hangingPunct="1">
-              <a:spcBef>
-                <a:spcPct val="20000"/>
-              </a:spcBef>
-              <a:buFont typeface="Arial"/>
-              <a:buNone/>
-              <a:defRPr sz="2000" kern="1200">
-                <a:solidFill>
-                  <a:schemeClr val="tx1">
-                    <a:tint val="75000"/>
-                  </a:schemeClr>
-                </a:solidFill>
-                <a:latin typeface="+mn-lt"/>
-                <a:ea typeface="+mn-ea"/>
-                <a:cs typeface="+mn-cs"/>
-              </a:defRPr>
-            </a:lvl8pPr>
-            <a:lvl9pPr marL="3657600" indent="0" algn="ctr" defTabSz="457200" rtl="0" eaLnBrk="1" latinLnBrk="0" hangingPunct="1">
-              <a:spcBef>
-                <a:spcPct val="20000"/>
-              </a:spcBef>
-              <a:buFont typeface="Arial"/>
-              <a:buNone/>
-              <a:defRPr sz="2000" kern="1200">
-                <a:solidFill>
-                  <a:schemeClr val="tx1">
-                    <a:tint val="75000"/>
-                  </a:schemeClr>
-                </a:solidFill>
-                <a:latin typeface="+mn-lt"/>
-                <a:ea typeface="+mn-ea"/>
-                <a:cs typeface="+mn-cs"/>
-              </a:defRPr>
-            </a:lvl9pPr>
-          </a:lstStyle>
-          <a:p>
-            <a:pPr algn="l"/>
-            <a:r>
-              <a:rPr lang="en-US" sz="1400" dirty="0" smtClean="0">
-                <a:solidFill>
-                  <a:srgbClr val="FF6600"/>
-                </a:solidFill>
-              </a:rPr>
-              <a:t>This tree has 3 terminal nodes (leaves)</a:t>
-            </a:r>
-          </a:p>
-        </p:txBody>
-      </p:sp>
     </p:spTree>
     <p:extLst>
       <p:ext uri="{BB962C8B-B14F-4D97-AF65-F5344CB8AC3E}">
-        <p14:creationId xmlns:p14="http://schemas.microsoft.com/office/powerpoint/2010/main" val="2389167023"/>
+        <p14:creationId xmlns:p14="http://schemas.microsoft.com/office/powerpoint/2010/main" val="3504579953"/>
       </p:ext>
     </p:extLst>
   </p:cSld>
@@ -5144,45 +5374,6 @@
       </p:grpSpPr>
       <p:sp>
         <p:nvSpPr>
-          <p:cNvPr id="2" name="Title 1"/>
-          <p:cNvSpPr>
-            <a:spLocks noGrp="1"/>
-          </p:cNvSpPr>
-          <p:nvPr>
-            <p:ph type="ctrTitle"/>
-          </p:nvPr>
-        </p:nvSpPr>
-        <p:spPr>
-          <a:xfrm>
-            <a:off x="184727" y="32328"/>
-            <a:ext cx="8001000" cy="868217"/>
-          </a:xfrm>
-        </p:spPr>
-        <p:txBody>
-          <a:bodyPr>
-            <a:normAutofit/>
-          </a:bodyPr>
-          <a:lstStyle/>
-          <a:p>
-            <a:pPr algn="l"/>
-            <a:r>
-              <a:rPr lang="en-US" sz="2400" b="1" dirty="0" smtClean="0"/>
-              <a:t>Facebook’s </a:t>
-            </a:r>
-            <a:r>
-              <a:rPr lang="en-US" sz="2400" b="1" dirty="0"/>
-              <a:t>h</a:t>
-            </a:r>
-            <a:r>
-              <a:rPr lang="en-US" sz="2400" b="1" dirty="0" smtClean="0"/>
-              <a:t>ybrid boosted/linear model</a:t>
-            </a:r>
-            <a:endParaRPr lang="en-US" sz="2400" b="1" dirty="0"/>
-          </a:p>
-        </p:txBody>
-      </p:sp>
-      <p:sp>
-        <p:nvSpPr>
           <p:cNvPr id="4" name="Slide Number Placeholder 3"/>
           <p:cNvSpPr>
             <a:spLocks noGrp="1"/>
@@ -5207,18 +5398,65 @@
       </p:sp>
       <p:sp>
         <p:nvSpPr>
-          <p:cNvPr id="7" name="Subtitle 2"/>
-          <p:cNvSpPr>
-            <a:spLocks noGrp="1"/>
-          </p:cNvSpPr>
-          <p:nvPr>
-            <p:ph type="subTitle" idx="1"/>
-          </p:nvPr>
+          <p:cNvPr id="5" name="Title 1"/>
+          <p:cNvSpPr txBox="1">
+            <a:spLocks/>
+          </p:cNvSpPr>
+          <p:nvPr/>
         </p:nvSpPr>
         <p:spPr>
           <a:xfrm>
-            <a:off x="309417" y="743527"/>
-            <a:ext cx="4932219" cy="4925291"/>
+            <a:off x="184727" y="32328"/>
+            <a:ext cx="8001000" cy="868217"/>
+          </a:xfrm>
+          <a:prstGeom prst="rect">
+            <a:avLst/>
+          </a:prstGeom>
+        </p:spPr>
+        <p:txBody>
+          <a:bodyPr vert="horz" lIns="91440" tIns="45720" rIns="91440" bIns="45720" rtlCol="0" anchor="ctr">
+            <a:normAutofit/>
+          </a:bodyPr>
+          <a:lstStyle>
+            <a:lvl1pPr algn="ctr" defTabSz="457200" rtl="0" eaLnBrk="1" latinLnBrk="0" hangingPunct="1">
+              <a:spcBef>
+                <a:spcPct val="0"/>
+              </a:spcBef>
+              <a:buNone/>
+              <a:defRPr sz="4400" kern="1200">
+                <a:solidFill>
+                  <a:schemeClr val="tx1"/>
+                </a:solidFill>
+                <a:latin typeface="Arial"/>
+                <a:ea typeface="+mj-ea"/>
+                <a:cs typeface="+mj-cs"/>
+              </a:defRPr>
+            </a:lvl1pPr>
+          </a:lstStyle>
+          <a:p>
+            <a:pPr algn="l"/>
+            <a:r>
+              <a:rPr lang="en-US" sz="2400" b="1" dirty="0" smtClean="0"/>
+              <a:t>The objective function</a:t>
+            </a:r>
+            <a:endParaRPr lang="en-US" sz="2400" b="1" dirty="0"/>
+          </a:p>
+        </p:txBody>
+      </p:sp>
+      <p:sp>
+        <p:nvSpPr>
+          <p:cNvPr id="7" name="Subtitle 2"/>
+          <p:cNvSpPr>
+            <a:spLocks noGrp="1"/>
+          </p:cNvSpPr>
+          <p:nvPr>
+            <p:ph type="subTitle" idx="1"/>
+          </p:nvPr>
+        </p:nvSpPr>
+        <p:spPr>
+          <a:xfrm>
+            <a:off x="598054" y="743528"/>
+            <a:ext cx="8176492" cy="919017"/>
           </a:xfrm>
         </p:spPr>
         <p:txBody>
@@ -5227,196 +5465,34 @@
           </a:bodyPr>
           <a:lstStyle/>
           <a:p>
-            <a:pPr marL="457200" indent="-457200" algn="l">
-              <a:buFont typeface="+mj-lt"/>
-              <a:buAutoNum type="arabicPeriod"/>
-            </a:pPr>
+            <a:pPr algn="l"/>
             <a:r>
               <a:rPr lang="en-US" sz="2000" dirty="0" smtClean="0">
                 <a:solidFill>
                   <a:schemeClr val="tx1"/>
                 </a:solidFill>
               </a:rPr>
-              <a:t>Fit boosted decision tree model to CTR data training set with cross validation.</a:t>
-            </a:r>
-          </a:p>
-          <a:p>
-            <a:pPr marL="457200" indent="-457200" algn="l">
-              <a:buFont typeface="+mj-lt"/>
-              <a:buAutoNum type="arabicPeriod"/>
-            </a:pPr>
+              <a:t>Want to maximize accuracy of click prediction by minimizing </a:t>
+            </a:r>
             <a:r>
               <a:rPr lang="en-US" sz="2000" dirty="0" smtClean="0">
                 <a:solidFill>
                   <a:schemeClr val="tx1"/>
                 </a:solidFill>
               </a:rPr>
-              <a:t>“Send data through trees” </a:t>
-            </a:r>
-            <a:r>
-              <a:rPr lang="mr-IN" sz="2000" dirty="0" smtClean="0">
-                <a:solidFill>
-                  <a:schemeClr val="tx1"/>
-                </a:solidFill>
-              </a:rPr>
-              <a:t>–</a:t>
-            </a:r>
-            <a:r>
-              <a:rPr lang="en-US" sz="2000" dirty="0" smtClean="0">
-                <a:solidFill>
-                  <a:schemeClr val="tx1"/>
-                </a:solidFill>
-              </a:rPr>
-              <a:t> boosted model is comprised of </a:t>
-            </a:r>
-            <a:r>
-              <a:rPr lang="en-US" sz="2000" i="1" dirty="0" smtClean="0">
-                <a:solidFill>
-                  <a:schemeClr val="tx1"/>
-                </a:solidFill>
-              </a:rPr>
-              <a:t>M </a:t>
-            </a:r>
-            <a:r>
-              <a:rPr lang="en-US" sz="2000" dirty="0" smtClean="0">
-                <a:solidFill>
-                  <a:schemeClr val="tx1"/>
-                </a:solidFill>
-              </a:rPr>
-              <a:t>weak learners. Each tree has </a:t>
-            </a:r>
-            <a:r>
-              <a:rPr lang="en-US" sz="2000" i="1" dirty="0" smtClean="0">
-                <a:solidFill>
-                  <a:schemeClr val="tx1"/>
-                </a:solidFill>
-              </a:rPr>
-              <a:t>p </a:t>
-            </a:r>
-            <a:r>
-              <a:rPr lang="en-US" sz="2000" dirty="0" smtClean="0">
-                <a:solidFill>
-                  <a:schemeClr val="tx1"/>
-                </a:solidFill>
-              </a:rPr>
-              <a:t>terminal nodes. Represent each observation an (1 x </a:t>
-            </a:r>
-            <a:r>
-              <a:rPr lang="en-US" sz="2000" i="1" dirty="0" err="1" smtClean="0">
-                <a:solidFill>
-                  <a:schemeClr val="tx1"/>
-                </a:solidFill>
-              </a:rPr>
-              <a:t>pM</a:t>
-            </a:r>
-            <a:r>
-              <a:rPr lang="en-US" sz="2000" dirty="0" smtClean="0">
-                <a:solidFill>
-                  <a:schemeClr val="tx1"/>
-                </a:solidFill>
-              </a:rPr>
-              <a:t>) vector by “following” trees. All data will fall into </a:t>
-            </a:r>
-            <a:r>
-              <a:rPr lang="en-US" sz="2000" i="1" dirty="0" smtClean="0">
-                <a:solidFill>
-                  <a:schemeClr val="tx1"/>
-                </a:solidFill>
-              </a:rPr>
-              <a:t>M</a:t>
-            </a:r>
-            <a:r>
-              <a:rPr lang="en-US" sz="2000" dirty="0" smtClean="0">
-                <a:solidFill>
-                  <a:schemeClr val="tx1"/>
-                </a:solidFill>
-              </a:rPr>
-              <a:t> terminal nodes. Each feature corresponds to a set of decisions, e.g. “</a:t>
-            </a:r>
-            <a:r>
-              <a:rPr lang="en-US" sz="2000" dirty="0" err="1" smtClean="0">
-                <a:solidFill>
-                  <a:schemeClr val="tx1"/>
-                </a:solidFill>
-              </a:rPr>
-              <a:t>device_type</a:t>
-            </a:r>
-            <a:r>
-              <a:rPr lang="en-US" sz="2000" dirty="0" smtClean="0">
-                <a:solidFill>
-                  <a:schemeClr val="tx1"/>
-                </a:solidFill>
-              </a:rPr>
-              <a:t> == ‘type 3’ &amp; </a:t>
-            </a:r>
-            <a:r>
-              <a:rPr lang="en-US" sz="2000" dirty="0" err="1" smtClean="0">
-                <a:solidFill>
-                  <a:schemeClr val="tx1"/>
-                </a:solidFill>
-              </a:rPr>
-              <a:t>site_category</a:t>
-            </a:r>
-            <a:r>
-              <a:rPr lang="en-US" sz="2000" dirty="0" smtClean="0">
-                <a:solidFill>
-                  <a:schemeClr val="tx1"/>
-                </a:solidFill>
-              </a:rPr>
-              <a:t> == ‘</a:t>
-            </a:r>
-            <a:r>
-              <a:rPr lang="pl-PL" sz="2000" dirty="0" smtClean="0">
-                <a:solidFill>
-                  <a:schemeClr val="tx1"/>
-                </a:solidFill>
-              </a:rPr>
-              <a:t>bcf865d9’ &amp; </a:t>
-            </a:r>
-            <a:r>
-              <a:rPr lang="en-US" sz="2000" dirty="0" smtClean="0">
-                <a:solidFill>
-                  <a:schemeClr val="tx1"/>
-                </a:solidFill>
-              </a:rPr>
-              <a:t>hour &gt; 3”. Use </a:t>
-            </a:r>
-            <a:r>
-              <a:rPr lang="en-US" sz="2000" b="1" dirty="0" err="1" smtClean="0">
-                <a:solidFill>
-                  <a:schemeClr val="tx1"/>
-                </a:solidFill>
-              </a:rPr>
-              <a:t>XGBoost</a:t>
-            </a:r>
-            <a:r>
-              <a:rPr lang="en-US" sz="2000" dirty="0" smtClean="0">
-                <a:solidFill>
-                  <a:schemeClr val="tx1"/>
-                </a:solidFill>
-              </a:rPr>
-              <a:t> package.</a:t>
-            </a:r>
-          </a:p>
-          <a:p>
-            <a:pPr marL="457200" indent="-457200" algn="l">
-              <a:buFont typeface="+mj-lt"/>
-              <a:buAutoNum type="arabicPeriod"/>
-            </a:pPr>
-            <a:r>
-              <a:rPr lang="en-US" sz="2000" dirty="0" smtClean="0">
-                <a:solidFill>
-                  <a:schemeClr val="tx1"/>
-                </a:solidFill>
-              </a:rPr>
-              <a:t>Train penalized linear model to learn important rules.</a:t>
-            </a:r>
+              <a:t>“Normalized Entropy,” similar to “binary cross entropy” function.</a:t>
+            </a:r>
+            <a:endParaRPr lang="en-US" sz="2000" dirty="0" smtClean="0">
+              <a:solidFill>
+                <a:schemeClr val="tx1"/>
+              </a:solidFill>
+            </a:endParaRPr>
           </a:p>
         </p:txBody>
       </p:sp>
       <p:pic>
         <p:nvPicPr>
-          <p:cNvPr id="8" name="Picture 7" descr="hybrid_model.png"/>
+          <p:cNvPr id="11" name="Picture 10" descr="bin_logloss.png"/>
           <p:cNvPicPr>
             <a:picLocks noChangeAspect="1"/>
           </p:cNvPicPr>
@@ -5436,239 +5512,48 @@
         </p:blipFill>
         <p:spPr>
           <a:xfrm>
-            <a:off x="5152283" y="1108363"/>
-            <a:ext cx="3991717" cy="3602182"/>
+            <a:off x="1258455" y="2229299"/>
+            <a:ext cx="6407728" cy="4127051"/>
           </a:xfrm>
           <a:prstGeom prst="rect">
             <a:avLst/>
           </a:prstGeom>
         </p:spPr>
       </p:pic>
-      <p:sp>
-        <p:nvSpPr>
-          <p:cNvPr id="6" name="Subtitle 2"/>
-          <p:cNvSpPr txBox="1">
-            <a:spLocks/>
-          </p:cNvSpPr>
+      <p:pic>
+        <p:nvPicPr>
+          <p:cNvPr id="13" name="Picture 12" descr="bin_logloss_equation.png"/>
+          <p:cNvPicPr>
+            <a:picLocks noChangeAspect="1"/>
+          </p:cNvPicPr>
           <p:nvPr/>
-        </p:nvSpPr>
+        </p:nvPicPr>
+        <p:blipFill>
+          <a:blip r:embed="rId3">
+            <a:extLst>
+              <a:ext uri="{28A0092B-C50C-407E-A947-70E740481C1C}">
+                <a14:useLocalDpi xmlns:a14="http://schemas.microsoft.com/office/drawing/2010/main" val="0"/>
+              </a:ext>
+            </a:extLst>
+          </a:blip>
+          <a:stretch>
+            <a:fillRect/>
+          </a:stretch>
+        </p:blipFill>
         <p:spPr>
           <a:xfrm>
-            <a:off x="473364" y="5691909"/>
-            <a:ext cx="8213436" cy="505691"/>
+            <a:off x="2710180" y="1550785"/>
+            <a:ext cx="3276600" cy="533400"/>
           </a:xfrm>
           <a:prstGeom prst="rect">
             <a:avLst/>
           </a:prstGeom>
         </p:spPr>
-        <p:txBody>
-          <a:bodyPr vert="horz" lIns="91440" tIns="45720" rIns="91440" bIns="45720" rtlCol="0">
-            <a:noAutofit/>
-          </a:bodyPr>
-          <a:lstStyle>
-            <a:lvl1pPr marL="0" indent="0" algn="ctr" defTabSz="457200" rtl="0" eaLnBrk="1" latinLnBrk="0" hangingPunct="1">
-              <a:spcBef>
-                <a:spcPct val="20000"/>
-              </a:spcBef>
-              <a:buFont typeface="Arial"/>
-              <a:buNone/>
-              <a:defRPr sz="3200" kern="1200">
-                <a:solidFill>
-                  <a:schemeClr val="tx1">
-                    <a:tint val="75000"/>
-                  </a:schemeClr>
-                </a:solidFill>
-                <a:latin typeface="Arial"/>
-                <a:ea typeface="+mn-ea"/>
-                <a:cs typeface="+mn-cs"/>
-              </a:defRPr>
-            </a:lvl1pPr>
-            <a:lvl2pPr marL="457200" indent="0" algn="ctr" defTabSz="457200" rtl="0" eaLnBrk="1" latinLnBrk="0" hangingPunct="1">
-              <a:spcBef>
-                <a:spcPct val="20000"/>
-              </a:spcBef>
-              <a:buFont typeface="Arial"/>
-              <a:buNone/>
-              <a:defRPr sz="2800" kern="1200">
-                <a:solidFill>
-                  <a:schemeClr val="tx1">
-                    <a:tint val="75000"/>
-                  </a:schemeClr>
-                </a:solidFill>
-                <a:latin typeface="Arial"/>
-                <a:ea typeface="+mn-ea"/>
-                <a:cs typeface="+mn-cs"/>
-              </a:defRPr>
-            </a:lvl2pPr>
-            <a:lvl3pPr marL="914400" indent="0" algn="ctr" defTabSz="457200" rtl="0" eaLnBrk="1" latinLnBrk="0" hangingPunct="1">
-              <a:spcBef>
-                <a:spcPct val="20000"/>
-              </a:spcBef>
-              <a:buFont typeface="Arial"/>
-              <a:buNone/>
-              <a:defRPr sz="2400" kern="1200">
-                <a:solidFill>
-                  <a:schemeClr val="tx1">
-                    <a:tint val="75000"/>
-                  </a:schemeClr>
-                </a:solidFill>
-                <a:latin typeface="Arial"/>
-                <a:ea typeface="+mn-ea"/>
-                <a:cs typeface="+mn-cs"/>
-              </a:defRPr>
-            </a:lvl3pPr>
-            <a:lvl4pPr marL="1371600" indent="0" algn="ctr" defTabSz="457200" rtl="0" eaLnBrk="1" latinLnBrk="0" hangingPunct="1">
-              <a:spcBef>
-                <a:spcPct val="20000"/>
-              </a:spcBef>
-              <a:buFont typeface="Arial"/>
-              <a:buNone/>
-              <a:defRPr sz="2000" kern="1200">
-                <a:solidFill>
-                  <a:schemeClr val="tx1">
-                    <a:tint val="75000"/>
-                  </a:schemeClr>
-                </a:solidFill>
-                <a:latin typeface="Arial"/>
-                <a:ea typeface="+mn-ea"/>
-                <a:cs typeface="+mn-cs"/>
-              </a:defRPr>
-            </a:lvl4pPr>
-            <a:lvl5pPr marL="1828800" indent="0" algn="ctr" defTabSz="457200" rtl="0" eaLnBrk="1" latinLnBrk="0" hangingPunct="1">
-              <a:spcBef>
-                <a:spcPct val="20000"/>
-              </a:spcBef>
-              <a:buFont typeface="Arial"/>
-              <a:buNone/>
-              <a:defRPr sz="2000" kern="1200">
-                <a:solidFill>
-                  <a:schemeClr val="tx1">
-                    <a:tint val="75000"/>
-                  </a:schemeClr>
-                </a:solidFill>
-                <a:latin typeface="Arial"/>
-                <a:ea typeface="+mn-ea"/>
-                <a:cs typeface="+mn-cs"/>
-              </a:defRPr>
-            </a:lvl5pPr>
-            <a:lvl6pPr marL="2286000" indent="0" algn="ctr" defTabSz="457200" rtl="0" eaLnBrk="1" latinLnBrk="0" hangingPunct="1">
-              <a:spcBef>
-                <a:spcPct val="20000"/>
-              </a:spcBef>
-              <a:buFont typeface="Arial"/>
-              <a:buNone/>
-              <a:defRPr sz="2000" kern="1200">
-                <a:solidFill>
-                  <a:schemeClr val="tx1">
-                    <a:tint val="75000"/>
-                  </a:schemeClr>
-                </a:solidFill>
-                <a:latin typeface="+mn-lt"/>
-                <a:ea typeface="+mn-ea"/>
-                <a:cs typeface="+mn-cs"/>
-              </a:defRPr>
-            </a:lvl6pPr>
-            <a:lvl7pPr marL="2743200" indent="0" algn="ctr" defTabSz="457200" rtl="0" eaLnBrk="1" latinLnBrk="0" hangingPunct="1">
-              <a:spcBef>
-                <a:spcPct val="20000"/>
-              </a:spcBef>
-              <a:buFont typeface="Arial"/>
-              <a:buNone/>
-              <a:defRPr sz="2000" kern="1200">
-                <a:solidFill>
-                  <a:schemeClr val="tx1">
-                    <a:tint val="75000"/>
-                  </a:schemeClr>
-                </a:solidFill>
-                <a:latin typeface="+mn-lt"/>
-                <a:ea typeface="+mn-ea"/>
-                <a:cs typeface="+mn-cs"/>
-              </a:defRPr>
-            </a:lvl7pPr>
-            <a:lvl8pPr marL="3200400" indent="0" algn="ctr" defTabSz="457200" rtl="0" eaLnBrk="1" latinLnBrk="0" hangingPunct="1">
-              <a:spcBef>
-                <a:spcPct val="20000"/>
-              </a:spcBef>
-              <a:buFont typeface="Arial"/>
-              <a:buNone/>
-              <a:defRPr sz="2000" kern="1200">
-                <a:solidFill>
-                  <a:schemeClr val="tx1">
-                    <a:tint val="75000"/>
-                  </a:schemeClr>
-                </a:solidFill>
-                <a:latin typeface="+mn-lt"/>
-                <a:ea typeface="+mn-ea"/>
-                <a:cs typeface="+mn-cs"/>
-              </a:defRPr>
-            </a:lvl8pPr>
-            <a:lvl9pPr marL="3657600" indent="0" algn="ctr" defTabSz="457200" rtl="0" eaLnBrk="1" latinLnBrk="0" hangingPunct="1">
-              <a:spcBef>
-                <a:spcPct val="20000"/>
-              </a:spcBef>
-              <a:buFont typeface="Arial"/>
-              <a:buNone/>
-              <a:defRPr sz="2000" kern="1200">
-                <a:solidFill>
-                  <a:schemeClr val="tx1">
-                    <a:tint val="75000"/>
-                  </a:schemeClr>
-                </a:solidFill>
-                <a:latin typeface="+mn-lt"/>
-                <a:ea typeface="+mn-ea"/>
-                <a:cs typeface="+mn-cs"/>
-              </a:defRPr>
-            </a:lvl9pPr>
-          </a:lstStyle>
-          <a:p>
-            <a:pPr algn="l"/>
-            <a:r>
-              <a:rPr lang="en-US" sz="1800" dirty="0" smtClean="0">
-                <a:solidFill>
-                  <a:srgbClr val="FF6600"/>
-                </a:solidFill>
-              </a:rPr>
-              <a:t>Get benefits of </a:t>
-            </a:r>
-            <a:r>
-              <a:rPr lang="en-US" sz="1800" dirty="0" err="1" smtClean="0">
-                <a:solidFill>
-                  <a:srgbClr val="FF6600"/>
-                </a:solidFill>
-              </a:rPr>
-              <a:t>XGBoost</a:t>
-            </a:r>
-            <a:r>
-              <a:rPr lang="en-US" sz="1800" dirty="0" smtClean="0">
-                <a:solidFill>
-                  <a:srgbClr val="FF6600"/>
-                </a:solidFill>
-              </a:rPr>
-              <a:t> (non linearity, automatic, robust feature selection) with the benefits of linear models (online training, </a:t>
-            </a:r>
-            <a:r>
-              <a:rPr lang="en-US" sz="1800" dirty="0" err="1" smtClean="0">
-                <a:solidFill>
-                  <a:srgbClr val="FF6600"/>
-                </a:solidFill>
-              </a:rPr>
-              <a:t>explainability</a:t>
-            </a:r>
-            <a:r>
-              <a:rPr lang="en-US" sz="1800" dirty="0" smtClean="0">
-                <a:solidFill>
-                  <a:srgbClr val="FF6600"/>
-                </a:solidFill>
-              </a:rPr>
-              <a:t>)!</a:t>
-            </a:r>
-          </a:p>
-        </p:txBody>
-      </p:sp>
+      </p:pic>
     </p:spTree>
     <p:extLst>
       <p:ext uri="{BB962C8B-B14F-4D97-AF65-F5344CB8AC3E}">
-        <p14:creationId xmlns:p14="http://schemas.microsoft.com/office/powerpoint/2010/main" val="3504579953"/>
+        <p14:creationId xmlns:p14="http://schemas.microsoft.com/office/powerpoint/2010/main" val="2441667291"/>
       </p:ext>
     </p:extLst>
   </p:cSld>
@@ -5958,46 +5843,535 @@
       </p:grpSpPr>
       <p:sp>
         <p:nvSpPr>
-          <p:cNvPr id="2" name="Title 1"/>
-          <p:cNvSpPr>
-            <a:spLocks noGrp="1"/>
-          </p:cNvSpPr>
-          <p:nvPr>
-            <p:ph type="title"/>
-          </p:nvPr>
+          <p:cNvPr id="130" name="TextShape 1"/>
+          <p:cNvSpPr txBox="1"/>
+          <p:nvPr/>
         </p:nvSpPr>
         <p:spPr>
           <a:xfrm>
-            <a:off x="0" y="0"/>
-            <a:ext cx="9144000" cy="5943600"/>
+            <a:off x="415440" y="182880"/>
+            <a:ext cx="9143640" cy="1097280"/>
           </a:xfrm>
+          <a:prstGeom prst="rect">
+            <a:avLst/>
+          </a:prstGeom>
+          <a:noFill/>
+          <a:ln>
+            <a:noFill/>
+          </a:ln>
         </p:spPr>
         <p:txBody>
-          <a:bodyPr/>
+          <a:bodyPr lIns="0" tIns="0" rIns="0" bIns="0" anchor="ctr"/>
           <a:lstStyle/>
           <a:p>
             <a:r>
-              <a:rPr lang="en-US" dirty="0" smtClean="0"/>
-              <a:t>Data preprocessing</a:t>
-            </a:r>
-            <a:endParaRPr lang="en-US" dirty="0"/>
+              <a:rPr lang="en-US" sz="4400" b="1" strike="noStrike" spc="-1">
+                <a:solidFill>
+                  <a:srgbClr val="000000"/>
+                </a:solidFill>
+                <a:uFill>
+                  <a:solidFill>
+                    <a:srgbClr val="FFFFFF"/>
+                  </a:solidFill>
+                </a:uFill>
+                <a:latin typeface="Calibri"/>
+              </a:rPr>
+              <a:t>Overview</a:t>
+            </a:r>
+          </a:p>
+        </p:txBody>
+      </p:sp>
+      <p:sp>
+        <p:nvSpPr>
+          <p:cNvPr id="131" name="TextShape 2"/>
+          <p:cNvSpPr txBox="1"/>
+          <p:nvPr/>
+        </p:nvSpPr>
+        <p:spPr>
+          <a:xfrm>
+            <a:off x="457200" y="2011680"/>
+            <a:ext cx="4015800" cy="3661560"/>
+          </a:xfrm>
+          <a:prstGeom prst="rect">
+            <a:avLst/>
+          </a:prstGeom>
+          <a:noFill/>
+          <a:ln>
+            <a:noFill/>
+          </a:ln>
+        </p:spPr>
+        <p:txBody>
+          <a:bodyPr lIns="0" tIns="0" rIns="0" bIns="0"/>
+          <a:lstStyle/>
+          <a:p>
+            <a:pPr marL="432000" indent="-324000">
+              <a:buClr>
+                <a:srgbClr val="000000"/>
+              </a:buClr>
+              <a:buSzPct val="45000"/>
+              <a:buFont typeface="Wingdings" charset="2"/>
+              <a:buChar char=""/>
+            </a:pPr>
+            <a:r>
+              <a:rPr lang="en-US" sz="2400" b="0" strike="noStrike" spc="-1">
+                <a:solidFill>
+                  <a:srgbClr val="000000"/>
+                </a:solidFill>
+                <a:uFill>
+                  <a:solidFill>
+                    <a:srgbClr val="FFFFFF"/>
+                  </a:solidFill>
+                </a:uFill>
+                <a:latin typeface="Arial"/>
+              </a:rPr>
+              <a:t>Data is arriving in a sequential stream</a:t>
+            </a:r>
+          </a:p>
+          <a:p>
+            <a:pPr marL="432000" indent="-324000">
+              <a:buClr>
+                <a:srgbClr val="000000"/>
+              </a:buClr>
+              <a:buSzPct val="45000"/>
+              <a:buFont typeface="Wingdings" charset="2"/>
+              <a:buChar char=""/>
+            </a:pPr>
+            <a:r>
+              <a:rPr lang="en-US" sz="2400" b="0" strike="noStrike" spc="-1">
+                <a:solidFill>
+                  <a:srgbClr val="000000"/>
+                </a:solidFill>
+                <a:uFill>
+                  <a:solidFill>
+                    <a:srgbClr val="FFFFFF"/>
+                  </a:solidFill>
+                </a:uFill>
+                <a:latin typeface="Arial"/>
+              </a:rPr>
+              <a:t> </a:t>
+            </a:r>
+          </a:p>
+          <a:p>
+            <a:pPr marL="432000" indent="-324000">
+              <a:buClr>
+                <a:srgbClr val="000000"/>
+              </a:buClr>
+              <a:buSzPct val="45000"/>
+              <a:buFont typeface="Wingdings" charset="2"/>
+              <a:buChar char=""/>
+            </a:pPr>
+            <a:r>
+              <a:rPr lang="en-US" sz="2400" b="0" strike="noStrike" spc="-1">
+                <a:solidFill>
+                  <a:srgbClr val="000000"/>
+                </a:solidFill>
+                <a:uFill>
+                  <a:solidFill>
+                    <a:srgbClr val="FFFFFF"/>
+                  </a:solidFill>
+                </a:uFill>
+                <a:latin typeface="Arial"/>
+              </a:rPr>
+              <a:t>Prediction accuracy degrades as the delay between training and test set increases</a:t>
+            </a:r>
+          </a:p>
+        </p:txBody>
+      </p:sp>
+      <p:sp>
+        <p:nvSpPr>
+          <p:cNvPr id="132" name="TextShape 3"/>
+          <p:cNvSpPr txBox="1"/>
+          <p:nvPr/>
+        </p:nvSpPr>
+        <p:spPr>
+          <a:xfrm>
+            <a:off x="4754880" y="2011680"/>
+            <a:ext cx="4015800" cy="3657600"/>
+          </a:xfrm>
+          <a:prstGeom prst="rect">
+            <a:avLst/>
+          </a:prstGeom>
+          <a:noFill/>
+          <a:ln>
+            <a:noFill/>
+          </a:ln>
+        </p:spPr>
+        <p:txBody>
+          <a:bodyPr lIns="0" tIns="0" rIns="0" bIns="0"/>
+          <a:lstStyle/>
+          <a:p>
+            <a:pPr marL="432000" indent="-324000">
+              <a:buClr>
+                <a:srgbClr val="000000"/>
+              </a:buClr>
+              <a:buSzPct val="45000"/>
+              <a:buFont typeface="Wingdings" charset="2"/>
+              <a:buChar char=""/>
+            </a:pPr>
+            <a:r>
+              <a:rPr lang="en-US" sz="2400" b="0" strike="noStrike" spc="-1">
+                <a:solidFill>
+                  <a:srgbClr val="000000"/>
+                </a:solidFill>
+                <a:uFill>
+                  <a:solidFill>
+                    <a:srgbClr val="FFFFFF"/>
+                  </a:solidFill>
+                </a:uFill>
+                <a:latin typeface="Arial"/>
+              </a:rPr>
+              <a:t>Use incoming data to update model coefficients</a:t>
+            </a:r>
+          </a:p>
+          <a:p>
+            <a:pPr marL="432000" indent="-324000">
+              <a:buClr>
+                <a:srgbClr val="000000"/>
+              </a:buClr>
+              <a:buSzPct val="45000"/>
+              <a:buFont typeface="Wingdings" charset="2"/>
+              <a:buChar char=""/>
+            </a:pPr>
+            <a:r>
+              <a:rPr lang="en-US" sz="2400" b="0" strike="noStrike" spc="-1">
+                <a:solidFill>
+                  <a:srgbClr val="000000"/>
+                </a:solidFill>
+                <a:uFill>
+                  <a:solidFill>
+                    <a:srgbClr val="FFFFFF"/>
+                  </a:solidFill>
+                </a:uFill>
+                <a:latin typeface="Arial"/>
+              </a:rPr>
+              <a:t> </a:t>
+            </a:r>
+          </a:p>
+          <a:p>
+            <a:pPr marL="432000" indent="-324000">
+              <a:buClr>
+                <a:srgbClr val="000000"/>
+              </a:buClr>
+              <a:buSzPct val="45000"/>
+              <a:buFont typeface="Wingdings" charset="2"/>
+              <a:buChar char=""/>
+            </a:pPr>
+            <a:r>
+              <a:rPr lang="en-US" sz="2400" b="0" strike="noStrike" spc="-1">
+                <a:solidFill>
+                  <a:srgbClr val="000000"/>
+                </a:solidFill>
+                <a:uFill>
+                  <a:solidFill>
+                    <a:srgbClr val="FFFFFF"/>
+                  </a:solidFill>
+                </a:uFill>
+                <a:latin typeface="Arial"/>
+              </a:rPr>
+              <a:t>Optimizing logistic loss with SGD, incorporate fresh data into batches for new iterations</a:t>
+            </a:r>
           </a:p>
         </p:txBody>
       </p:sp>
     </p:spTree>
     <p:extLst>
       <p:ext uri="{BB962C8B-B14F-4D97-AF65-F5344CB8AC3E}">
-        <p14:creationId xmlns:p14="http://schemas.microsoft.com/office/powerpoint/2010/main" val="1127324524"/>
+        <p14:creationId xmlns:p14="http://schemas.microsoft.com/office/powerpoint/2010/main" val="2537382096"/>
       </p:ext>
     </p:extLst>
   </p:cSld>
   <p:clrMapOvr>
     <a:masterClrMapping/>
   </p:clrMapOvr>
+  <p:timing>
+    <p:tnLst>
+      <p:par>
+        <p:cTn xmlns:p14="http://schemas.microsoft.com/office/powerpoint/2010/main" id="1" dur="indefinite" restart="never" nodeType="tmRoot">
+          <p:childTnLst>
+            <p:seq>
+              <p:cTn id="2" nodeType="mainSeq"/>
+              <p:prevCondLst>
+                <p:cond evt="onPrev" delay="0">
+                  <p:tgtEl>
+                    <p:sldTgt/>
+                  </p:tgtEl>
+                </p:cond>
+              </p:prevCondLst>
+              <p:nextCondLst>
+                <p:cond evt="onNext" delay="0">
+                  <p:tgtEl>
+                    <p:sldTgt/>
+                  </p:tgtEl>
+                </p:cond>
+              </p:nextCondLst>
+            </p:seq>
+          </p:childTnLst>
+        </p:cTn>
+      </p:par>
+    </p:tnLst>
+  </p:timing>
 </p:sld>
 </file>
 
 <file path=ppt/slides/slide15.xml><?xml version="1.0" encoding="utf-8"?>
+<p:sld xmlns:a="http://schemas.openxmlformats.org/drawingml/2006/main" xmlns:r="http://schemas.openxmlformats.org/officeDocument/2006/relationships" xmlns:p="http://schemas.openxmlformats.org/presentationml/2006/main" show="0">
+  <p:cSld>
+    <p:spTree>
+      <p:nvGrpSpPr>
+        <p:cNvPr id="1" name=""/>
+        <p:cNvGrpSpPr/>
+        <p:nvPr/>
+      </p:nvGrpSpPr>
+      <p:grpSpPr>
+        <a:xfrm>
+          <a:off x="0" y="0"/>
+          <a:ext cx="0" cy="0"/>
+          <a:chOff x="0" y="0"/>
+          <a:chExt cx="0" cy="0"/>
+        </a:xfrm>
+      </p:grpSpPr>
+      <p:sp>
+        <p:nvSpPr>
+          <p:cNvPr id="133" name="TextShape 1"/>
+          <p:cNvSpPr txBox="1"/>
+          <p:nvPr/>
+        </p:nvSpPr>
+        <p:spPr>
+          <a:xfrm>
+            <a:off x="457200" y="1604520"/>
+            <a:ext cx="4015800" cy="3977280"/>
+          </a:xfrm>
+          <a:prstGeom prst="rect">
+            <a:avLst/>
+          </a:prstGeom>
+          <a:noFill/>
+          <a:ln>
+            <a:noFill/>
+          </a:ln>
+        </p:spPr>
+        <p:txBody>
+          <a:bodyPr lIns="0" tIns="0" rIns="0" bIns="0"/>
+          <a:lstStyle/>
+          <a:p>
+            <a:pPr marL="432000" indent="-324000">
+              <a:buClr>
+                <a:srgbClr val="000000"/>
+              </a:buClr>
+              <a:buSzPct val="45000"/>
+              <a:buFont typeface="Wingdings" charset="2"/>
+              <a:buChar char=""/>
+            </a:pPr>
+            <a:r>
+              <a:rPr lang="en-US" sz="2400" b="0" strike="noStrike" spc="-1">
+                <a:solidFill>
+                  <a:srgbClr val="000000"/>
+                </a:solidFill>
+                <a:uFill>
+                  <a:solidFill>
+                    <a:srgbClr val="FFFFFF"/>
+                  </a:solidFill>
+                </a:uFill>
+                <a:latin typeface="Arial"/>
+              </a:rPr>
+              <a:t>For both models, NE can be reduced by 1% when going from training weekly to daily</a:t>
+            </a:r>
+          </a:p>
+          <a:p>
+            <a:pPr marL="432000" indent="-324000">
+              <a:buClr>
+                <a:srgbClr val="000000"/>
+              </a:buClr>
+              <a:buSzPct val="45000"/>
+              <a:buFont typeface="Wingdings" charset="2"/>
+              <a:buChar char=""/>
+            </a:pPr>
+            <a:r>
+              <a:rPr lang="en-US" sz="2400" b="0" strike="noStrike" spc="-1">
+                <a:solidFill>
+                  <a:srgbClr val="000000"/>
+                </a:solidFill>
+                <a:uFill>
+                  <a:solidFill>
+                    <a:srgbClr val="FFFFFF"/>
+                  </a:solidFill>
+                </a:uFill>
+                <a:latin typeface="Arial"/>
+              </a:rPr>
+              <a:t> </a:t>
+            </a:r>
+          </a:p>
+          <a:p>
+            <a:pPr marL="432000" indent="-324000">
+              <a:buClr>
+                <a:srgbClr val="000000"/>
+              </a:buClr>
+              <a:buSzPct val="45000"/>
+              <a:buFont typeface="Wingdings" charset="2"/>
+              <a:buChar char=""/>
+            </a:pPr>
+            <a:r>
+              <a:rPr lang="en-US" sz="2400" b="0" strike="noStrike" spc="-1">
+                <a:solidFill>
+                  <a:srgbClr val="000000"/>
+                </a:solidFill>
+                <a:uFill>
+                  <a:solidFill>
+                    <a:srgbClr val="FFFFFF"/>
+                  </a:solidFill>
+                </a:uFill>
+                <a:latin typeface="Arial"/>
+              </a:rPr>
+              <a:t>s</a:t>
+            </a:r>
+          </a:p>
+        </p:txBody>
+      </p:sp>
+      <p:sp>
+        <p:nvSpPr>
+          <p:cNvPr id="134" name="TextShape 2"/>
+          <p:cNvSpPr txBox="1"/>
+          <p:nvPr/>
+        </p:nvSpPr>
+        <p:spPr>
+          <a:xfrm>
+            <a:off x="4674240" y="1604520"/>
+            <a:ext cx="4015800" cy="3977280"/>
+          </a:xfrm>
+          <a:prstGeom prst="rect">
+            <a:avLst/>
+          </a:prstGeom>
+          <a:noFill/>
+          <a:ln>
+            <a:noFill/>
+          </a:ln>
+        </p:spPr>
+        <p:txBody>
+          <a:bodyPr lIns="0" tIns="0" rIns="0" bIns="0"/>
+          <a:lstStyle/>
+          <a:p>
+            <a:endParaRPr lang="en-US" sz="3200" b="0" strike="noStrike" spc="-1">
+              <a:solidFill>
+                <a:srgbClr val="000000"/>
+              </a:solidFill>
+              <a:uFill>
+                <a:solidFill>
+                  <a:srgbClr val="FFFFFF"/>
+                </a:solidFill>
+              </a:uFill>
+              <a:latin typeface="Arial"/>
+            </a:endParaRPr>
+          </a:p>
+        </p:txBody>
+      </p:sp>
+      <p:sp>
+        <p:nvSpPr>
+          <p:cNvPr id="135" name="TextShape 3"/>
+          <p:cNvSpPr txBox="1"/>
+          <p:nvPr/>
+        </p:nvSpPr>
+        <p:spPr>
+          <a:xfrm>
+            <a:off x="415800" y="182880"/>
+            <a:ext cx="9143640" cy="1097280"/>
+          </a:xfrm>
+          <a:prstGeom prst="rect">
+            <a:avLst/>
+          </a:prstGeom>
+          <a:noFill/>
+          <a:ln>
+            <a:noFill/>
+          </a:ln>
+        </p:spPr>
+      </p:sp>
+      <p:sp>
+        <p:nvSpPr>
+          <p:cNvPr id="136" name="TextShape 4"/>
+          <p:cNvSpPr txBox="1"/>
+          <p:nvPr/>
+        </p:nvSpPr>
+        <p:spPr>
+          <a:xfrm>
+            <a:off x="415800" y="182880"/>
+            <a:ext cx="9143640" cy="1097280"/>
+          </a:xfrm>
+          <a:prstGeom prst="rect">
+            <a:avLst/>
+          </a:prstGeom>
+          <a:noFill/>
+          <a:ln>
+            <a:noFill/>
+          </a:ln>
+        </p:spPr>
+        <p:txBody>
+          <a:bodyPr lIns="0" tIns="0" rIns="0" bIns="0" anchor="ctr"/>
+          <a:lstStyle/>
+          <a:p>
+            <a:r>
+              <a:rPr lang="en-US" sz="4000" b="1" strike="noStrike" spc="-1">
+                <a:solidFill>
+                  <a:srgbClr val="000000"/>
+                </a:solidFill>
+                <a:uFill>
+                  <a:solidFill>
+                    <a:srgbClr val="FFFFFF"/>
+                  </a:solidFill>
+                </a:uFill>
+                <a:latin typeface="Calibri"/>
+              </a:rPr>
+              <a:t>Model Results</a:t>
+            </a:r>
+          </a:p>
+        </p:txBody>
+      </p:sp>
+    </p:spTree>
+    <p:extLst>
+      <p:ext uri="{BB962C8B-B14F-4D97-AF65-F5344CB8AC3E}">
+        <p14:creationId xmlns:p14="http://schemas.microsoft.com/office/powerpoint/2010/main" val="1890640353"/>
+      </p:ext>
+    </p:extLst>
+  </p:cSld>
+  <p:clrMapOvr>
+    <a:masterClrMapping/>
+  </p:clrMapOvr>
+  <mc:AlternateContent xmlns:mc="http://schemas.openxmlformats.org/markup-compatibility/2006">
+    <mc:Choice xmlns:p14="http://schemas.microsoft.com/office/powerpoint/2010/main" Requires="p14">
+      <p:transition spd="slow" p14:dur="2000"/>
+    </mc:Choice>
+    <mc:Fallback>
+      <p:transition xmlns:p14="http://schemas.microsoft.com/office/powerpoint/2010/main" spd="slow"/>
+    </mc:Fallback>
+  </mc:AlternateContent>
+  <p:timing>
+    <p:tnLst>
+      <p:par>
+        <p:cTn xmlns:p14="http://schemas.microsoft.com/office/powerpoint/2010/main" id="1" dur="indefinite" restart="never" nodeType="tmRoot">
+          <p:childTnLst>
+            <p:seq>
+              <p:cTn id="2" nodeType="mainSeq"/>
+              <p:prevCondLst>
+                <p:cond evt="onPrev" delay="0">
+                  <p:tgtEl>
+                    <p:sldTgt/>
+                  </p:tgtEl>
+                </p:cond>
+              </p:prevCondLst>
+              <p:nextCondLst>
+                <p:cond evt="onNext" delay="0">
+                  <p:tgtEl>
+                    <p:sldTgt/>
+                  </p:tgtEl>
+                </p:cond>
+              </p:nextCondLst>
+            </p:seq>
+          </p:childTnLst>
+        </p:cTn>
+      </p:par>
+    </p:tnLst>
+  </p:timing>
+</p:sld>
+</file>
+
+<file path=ppt/slides/slide16.xml><?xml version="1.0" encoding="utf-8"?>
 <p:sld xmlns:a="http://schemas.openxmlformats.org/drawingml/2006/main" xmlns:r="http://schemas.openxmlformats.org/officeDocument/2006/relationships" xmlns:p="http://schemas.openxmlformats.org/presentationml/2006/main">
   <p:cSld>
     <p:spTree>
@@ -6016,6 +6390,134 @@
       </p:grpSpPr>
       <p:sp>
         <p:nvSpPr>
+          <p:cNvPr id="137" name="TextShape 1"/>
+          <p:cNvSpPr txBox="1"/>
+          <p:nvPr/>
+        </p:nvSpPr>
+        <p:spPr>
+          <a:xfrm>
+            <a:off x="416160" y="182880"/>
+            <a:ext cx="9143640" cy="1097280"/>
+          </a:xfrm>
+          <a:prstGeom prst="rect">
+            <a:avLst/>
+          </a:prstGeom>
+          <a:noFill/>
+          <a:ln>
+            <a:noFill/>
+          </a:ln>
+        </p:spPr>
+        <p:txBody>
+          <a:bodyPr lIns="0" tIns="0" rIns="0" bIns="0" anchor="ctr"/>
+          <a:lstStyle/>
+          <a:p>
+            <a:r>
+              <a:rPr lang="en-US" sz="4000" b="1" strike="noStrike" spc="-1">
+                <a:solidFill>
+                  <a:srgbClr val="000000"/>
+                </a:solidFill>
+                <a:uFill>
+                  <a:solidFill>
+                    <a:srgbClr val="FFFFFF"/>
+                  </a:solidFill>
+                </a:uFill>
+                <a:latin typeface="Calibri"/>
+              </a:rPr>
+              <a:t>Simulation with Toy Dataset</a:t>
+            </a:r>
+          </a:p>
+        </p:txBody>
+      </p:sp>
+    </p:spTree>
+    <p:extLst>
+      <p:ext uri="{BB962C8B-B14F-4D97-AF65-F5344CB8AC3E}">
+        <p14:creationId xmlns:p14="http://schemas.microsoft.com/office/powerpoint/2010/main" val="1304894274"/>
+      </p:ext>
+    </p:extLst>
+  </p:cSld>
+  <p:clrMapOvr>
+    <a:masterClrMapping/>
+  </p:clrMapOvr>
+</p:sld>
+</file>
+
+<file path=ppt/slides/slide17.xml><?xml version="1.0" encoding="utf-8"?>
+<p:sld xmlns:a="http://schemas.openxmlformats.org/drawingml/2006/main" xmlns:r="http://schemas.openxmlformats.org/officeDocument/2006/relationships" xmlns:p="http://schemas.openxmlformats.org/presentationml/2006/main">
+  <p:cSld>
+    <p:spTree>
+      <p:nvGrpSpPr>
+        <p:cNvPr id="1" name=""/>
+        <p:cNvGrpSpPr/>
+        <p:nvPr/>
+      </p:nvGrpSpPr>
+      <p:grpSpPr>
+        <a:xfrm>
+          <a:off x="0" y="0"/>
+          <a:ext cx="0" cy="0"/>
+          <a:chOff x="0" y="0"/>
+          <a:chExt cx="0" cy="0"/>
+        </a:xfrm>
+      </p:grpSpPr>
+      <p:sp>
+        <p:nvSpPr>
+          <p:cNvPr id="2" name="Title 1"/>
+          <p:cNvSpPr>
+            <a:spLocks noGrp="1"/>
+          </p:cNvSpPr>
+          <p:nvPr>
+            <p:ph type="title"/>
+          </p:nvPr>
+        </p:nvSpPr>
+        <p:spPr>
+          <a:xfrm>
+            <a:off x="0" y="0"/>
+            <a:ext cx="9144000" cy="5943600"/>
+          </a:xfrm>
+        </p:spPr>
+        <p:txBody>
+          <a:bodyPr/>
+          <a:lstStyle/>
+          <a:p>
+            <a:r>
+              <a:rPr lang="en-US" dirty="0" smtClean="0"/>
+              <a:t>Data preprocessing</a:t>
+            </a:r>
+            <a:endParaRPr lang="en-US" dirty="0"/>
+          </a:p>
+        </p:txBody>
+      </p:sp>
+    </p:spTree>
+    <p:extLst>
+      <p:ext uri="{BB962C8B-B14F-4D97-AF65-F5344CB8AC3E}">
+        <p14:creationId xmlns:p14="http://schemas.microsoft.com/office/powerpoint/2010/main" val="1127324524"/>
+      </p:ext>
+    </p:extLst>
+  </p:cSld>
+  <p:clrMapOvr>
+    <a:masterClrMapping/>
+  </p:clrMapOvr>
+</p:sld>
+</file>
+
+<file path=ppt/slides/slide18.xml><?xml version="1.0" encoding="utf-8"?>
+<p:sld xmlns:a="http://schemas.openxmlformats.org/drawingml/2006/main" xmlns:r="http://schemas.openxmlformats.org/officeDocument/2006/relationships" xmlns:p="http://schemas.openxmlformats.org/presentationml/2006/main">
+  <p:cSld>
+    <p:spTree>
+      <p:nvGrpSpPr>
+        <p:cNvPr id="1" name=""/>
+        <p:cNvGrpSpPr/>
+        <p:nvPr/>
+      </p:nvGrpSpPr>
+      <p:grpSpPr>
+        <a:xfrm>
+          <a:off x="0" y="0"/>
+          <a:ext cx="0" cy="0"/>
+          <a:chOff x="0" y="0"/>
+          <a:chExt cx="0" cy="0"/>
+        </a:xfrm>
+      </p:grpSpPr>
+      <p:sp>
+        <p:nvSpPr>
           <p:cNvPr id="2" name="Title 1"/>
           <p:cNvSpPr>
             <a:spLocks noGrp="1"/>
@@ -6112,7 +6614,7 @@
             <a:fld id="{106E12CD-FCB1-464E-A775-0B83FDDACE03}" type="slidenum">
               <a:rPr lang="en-US" smtClean="0"/>
               <a:pPr/>
-              <a:t>14</a:t>
+              <a:t>17</a:t>
             </a:fld>
             <a:endParaRPr lang="en-US" dirty="0"/>
           </a:p>
@@ -6745,15 +7247,7 @@
                   <a:schemeClr val="tx1"/>
                 </a:solidFill>
               </a:rPr>
-              <a:t> turned into hour of day, day of week quantitative variables</a:t>
-            </a:r>
-            <a:r>
-              <a:rPr lang="en-US" sz="2000" dirty="0" smtClean="0">
-                <a:solidFill>
-                  <a:schemeClr val="tx1"/>
-                </a:solidFill>
-              </a:rPr>
-              <a:t>.</a:t>
+              <a:t> turned into hour of day, day of week quantitative variables.</a:t>
             </a:r>
           </a:p>
           <a:p>
@@ -6823,11 +7317,6 @@
               </a:rPr>
               <a:t> variables (too categorical)</a:t>
             </a:r>
-            <a:endParaRPr lang="en-US" sz="2000" dirty="0" smtClean="0">
-              <a:solidFill>
-                <a:schemeClr val="tx1"/>
-              </a:solidFill>
-            </a:endParaRPr>
           </a:p>
           <a:p>
             <a:pPr marL="342900" indent="-342900" algn="l">
@@ -6868,23 +7357,7 @@
                   <a:schemeClr val="tx1"/>
                 </a:solidFill>
               </a:rPr>
-              <a:t>For plain Lasso model, </a:t>
-            </a:r>
-            <a:r>
-              <a:rPr lang="en-US" sz="2000" dirty="0" smtClean="0">
-                <a:solidFill>
-                  <a:schemeClr val="tx1"/>
-                </a:solidFill>
-              </a:rPr>
-              <a:t>impute</a:t>
-            </a:r>
-            <a:r>
-              <a:rPr lang="en-US" sz="2000" dirty="0" smtClean="0">
-                <a:solidFill>
-                  <a:schemeClr val="tx1"/>
-                </a:solidFill>
-              </a:rPr>
-              <a:t> </a:t>
+              <a:t>For plain Lasso model, impute </a:t>
             </a:r>
             <a:r>
               <a:rPr lang="en-US" sz="2000" dirty="0" smtClean="0">
@@ -6904,11 +7377,6 @@
               </a:rPr>
               <a:t> variable’s missing values with mean</a:t>
             </a:r>
-            <a:endParaRPr lang="en-US" sz="2000" dirty="0" smtClean="0">
-              <a:solidFill>
-                <a:schemeClr val="tx1"/>
-              </a:solidFill>
-            </a:endParaRPr>
           </a:p>
         </p:txBody>
       </p:sp>
@@ -6925,7 +7393,7 @@
 </p:sld>
 </file>
 
-<file path=ppt/slides/slide16.xml><?xml version="1.0" encoding="utf-8"?>
+<file path=ppt/slides/slide19.xml><?xml version="1.0" encoding="utf-8"?>
 <p:sld xmlns:a="http://schemas.openxmlformats.org/drawingml/2006/main" xmlns:r="http://schemas.openxmlformats.org/officeDocument/2006/relationships" xmlns:p="http://schemas.openxmlformats.org/presentationml/2006/main">
   <p:cSld>
     <p:spTree>
@@ -6991,7 +7459,7 @@
             <a:fld id="{106E12CD-FCB1-464E-A775-0B83FDDACE03}" type="slidenum">
               <a:rPr lang="en-US" smtClean="0"/>
               <a:pPr/>
-              <a:t>15</a:t>
+              <a:t>18</a:t>
             </a:fld>
             <a:endParaRPr lang="en-US" dirty="0"/>
           </a:p>
@@ -7348,7 +7816,7 @@
 </p:sld>
 </file>
 
-<file path=ppt/slides/slide17.xml><?xml version="1.0" encoding="utf-8"?>
+<file path=ppt/slides/slide2.xml><?xml version="1.0" encoding="utf-8"?>
 <p:sld xmlns:a="http://schemas.openxmlformats.org/drawingml/2006/main" xmlns:r="http://schemas.openxmlformats.org/officeDocument/2006/relationships" xmlns:p="http://schemas.openxmlformats.org/presentationml/2006/main">
   <p:cSld>
     <p:spTree>
@@ -7387,7 +7855,7 @@
           <a:p>
             <a:r>
               <a:rPr lang="en-US" dirty="0" smtClean="0"/>
-              <a:t>Results</a:t>
+              <a:t>The data</a:t>
             </a:r>
             <a:endParaRPr lang="en-US" dirty="0"/>
           </a:p>
@@ -7396,7 +7864,7 @@
     </p:spTree>
     <p:extLst>
       <p:ext uri="{BB962C8B-B14F-4D97-AF65-F5344CB8AC3E}">
-        <p14:creationId xmlns:p14="http://schemas.microsoft.com/office/powerpoint/2010/main" val="4136664160"/>
+        <p14:creationId xmlns:p14="http://schemas.microsoft.com/office/powerpoint/2010/main" val="2342043198"/>
       </p:ext>
     </p:extLst>
   </p:cSld>
@@ -7406,7 +7874,7 @@
 </p:sld>
 </file>
 
-<file path=ppt/slides/slide18.xml><?xml version="1.0" encoding="utf-8"?>
+<file path=ppt/slides/slide20.xml><?xml version="1.0" encoding="utf-8"?>
 <p:sld xmlns:a="http://schemas.openxmlformats.org/drawingml/2006/main" xmlns:r="http://schemas.openxmlformats.org/officeDocument/2006/relationships" xmlns:p="http://schemas.openxmlformats.org/presentationml/2006/main">
   <p:cSld>
     <p:spTree>
@@ -7430,6 +7898,64 @@
             <a:spLocks noGrp="1"/>
           </p:cNvSpPr>
           <p:nvPr>
+            <p:ph type="title"/>
+          </p:nvPr>
+        </p:nvSpPr>
+        <p:spPr>
+          <a:xfrm>
+            <a:off x="0" y="0"/>
+            <a:ext cx="9144000" cy="5943600"/>
+          </a:xfrm>
+        </p:spPr>
+        <p:txBody>
+          <a:bodyPr/>
+          <a:lstStyle/>
+          <a:p>
+            <a:r>
+              <a:rPr lang="en-US" dirty="0" smtClean="0"/>
+              <a:t>Results</a:t>
+            </a:r>
+            <a:endParaRPr lang="en-US" dirty="0"/>
+          </a:p>
+        </p:txBody>
+      </p:sp>
+    </p:spTree>
+    <p:extLst>
+      <p:ext uri="{BB962C8B-B14F-4D97-AF65-F5344CB8AC3E}">
+        <p14:creationId xmlns:p14="http://schemas.microsoft.com/office/powerpoint/2010/main" val="4136664160"/>
+      </p:ext>
+    </p:extLst>
+  </p:cSld>
+  <p:clrMapOvr>
+    <a:masterClrMapping/>
+  </p:clrMapOvr>
+</p:sld>
+</file>
+
+<file path=ppt/slides/slide21.xml><?xml version="1.0" encoding="utf-8"?>
+<p:sld xmlns:a="http://schemas.openxmlformats.org/drawingml/2006/main" xmlns:r="http://schemas.openxmlformats.org/officeDocument/2006/relationships" xmlns:p="http://schemas.openxmlformats.org/presentationml/2006/main">
+  <p:cSld>
+    <p:spTree>
+      <p:nvGrpSpPr>
+        <p:cNvPr id="1" name=""/>
+        <p:cNvGrpSpPr/>
+        <p:nvPr/>
+      </p:nvGrpSpPr>
+      <p:grpSpPr>
+        <a:xfrm>
+          <a:off x="0" y="0"/>
+          <a:ext cx="0" cy="0"/>
+          <a:chOff x="0" y="0"/>
+          <a:chExt cx="0" cy="0"/>
+        </a:xfrm>
+      </p:grpSpPr>
+      <p:sp>
+        <p:nvSpPr>
+          <p:cNvPr id="2" name="Title 1"/>
+          <p:cNvSpPr>
+            <a:spLocks noGrp="1"/>
+          </p:cNvSpPr>
+          <p:nvPr>
             <p:ph type="ctrTitle"/>
           </p:nvPr>
         </p:nvSpPr>
@@ -7476,7 +8002,7 @@
             <a:fld id="{106E12CD-FCB1-464E-A775-0B83FDDACE03}" type="slidenum">
               <a:rPr lang="en-US" smtClean="0"/>
               <a:pPr/>
-              <a:t>17</a:t>
+              <a:t>20</a:t>
             </a:fld>
             <a:endParaRPr lang="en-US" dirty="0"/>
           </a:p>
@@ -7516,64 +8042,6 @@
     <p:extLst>
       <p:ext uri="{BB962C8B-B14F-4D97-AF65-F5344CB8AC3E}">
         <p14:creationId xmlns:p14="http://schemas.microsoft.com/office/powerpoint/2010/main" val="2081112436"/>
-      </p:ext>
-    </p:extLst>
-  </p:cSld>
-  <p:clrMapOvr>
-    <a:masterClrMapping/>
-  </p:clrMapOvr>
-</p:sld>
-</file>
-
-<file path=ppt/slides/slide2.xml><?xml version="1.0" encoding="utf-8"?>
-<p:sld xmlns:a="http://schemas.openxmlformats.org/drawingml/2006/main" xmlns:r="http://schemas.openxmlformats.org/officeDocument/2006/relationships" xmlns:p="http://schemas.openxmlformats.org/presentationml/2006/main">
-  <p:cSld>
-    <p:spTree>
-      <p:nvGrpSpPr>
-        <p:cNvPr id="1" name=""/>
-        <p:cNvGrpSpPr/>
-        <p:nvPr/>
-      </p:nvGrpSpPr>
-      <p:grpSpPr>
-        <a:xfrm>
-          <a:off x="0" y="0"/>
-          <a:ext cx="0" cy="0"/>
-          <a:chOff x="0" y="0"/>
-          <a:chExt cx="0" cy="0"/>
-        </a:xfrm>
-      </p:grpSpPr>
-      <p:sp>
-        <p:nvSpPr>
-          <p:cNvPr id="2" name="Title 1"/>
-          <p:cNvSpPr>
-            <a:spLocks noGrp="1"/>
-          </p:cNvSpPr>
-          <p:nvPr>
-            <p:ph type="title"/>
-          </p:nvPr>
-        </p:nvSpPr>
-        <p:spPr>
-          <a:xfrm>
-            <a:off x="0" y="0"/>
-            <a:ext cx="9144000" cy="5943600"/>
-          </a:xfrm>
-        </p:spPr>
-        <p:txBody>
-          <a:bodyPr/>
-          <a:lstStyle/>
-          <a:p>
-            <a:r>
-              <a:rPr lang="en-US" dirty="0" smtClean="0"/>
-              <a:t>The data</a:t>
-            </a:r>
-            <a:endParaRPr lang="en-US" dirty="0"/>
-          </a:p>
-        </p:txBody>
-      </p:sp>
-    </p:spTree>
-    <p:extLst>
-      <p:ext uri="{BB962C8B-B14F-4D97-AF65-F5344CB8AC3E}">
-        <p14:creationId xmlns:p14="http://schemas.microsoft.com/office/powerpoint/2010/main" val="2342043198"/>
       </p:ext>
     </p:extLst>
   </p:cSld>
@@ -8029,11 +8497,7 @@
             </a:r>
             <a:r>
               <a:rPr lang="en-US" sz="2700" b="1" dirty="0" smtClean="0"/>
-              <a:t>rutally </a:t>
-            </a:r>
-            <a:r>
-              <a:rPr lang="en-US" sz="2700" b="1" dirty="0" smtClean="0"/>
-              <a:t>categorical” features</a:t>
+              <a:t>rutally categorical” features</a:t>
             </a:r>
             <a:r>
               <a:rPr lang="en-US" sz="3200" b="1" dirty="0" smtClean="0"/>
@@ -8752,50 +9216,23 @@
             <a:spLocks noGrp="1"/>
           </p:cNvSpPr>
           <p:nvPr>
-            <p:ph type="ctrTitle"/>
+            <p:ph type="title"/>
           </p:nvPr>
         </p:nvSpPr>
         <p:spPr>
           <a:xfrm>
-            <a:off x="184727" y="32328"/>
-            <a:ext cx="8001000" cy="925946"/>
+            <a:off x="0" y="0"/>
+            <a:ext cx="9144000" cy="5943600"/>
           </a:xfrm>
         </p:spPr>
         <p:txBody>
-          <a:bodyPr>
-            <a:normAutofit/>
-          </a:bodyPr>
-          <a:lstStyle/>
-          <a:p>
-            <a:pPr algn="l"/>
-            <a:r>
-              <a:rPr lang="en-US" sz="3200" b="1" dirty="0" smtClean="0"/>
-              <a:t>The data</a:t>
-            </a:r>
-            <a:endParaRPr lang="en-US" sz="3200" b="1" dirty="0"/>
-          </a:p>
-        </p:txBody>
-      </p:sp>
-      <p:sp>
-        <p:nvSpPr>
-          <p:cNvPr id="4" name="Slide Number Placeholder 3"/>
-          <p:cNvSpPr>
-            <a:spLocks noGrp="1"/>
-          </p:cNvSpPr>
-          <p:nvPr>
-            <p:ph type="sldNum" sz="quarter" idx="12"/>
-          </p:nvPr>
-        </p:nvSpPr>
-        <p:spPr/>
-        <p:txBody>
           <a:bodyPr/>
           <a:lstStyle/>
           <a:p>
-            <a:fld id="{106E12CD-FCB1-464E-A775-0B83FDDACE03}" type="slidenum">
-              <a:rPr lang="en-US" smtClean="0"/>
-              <a:pPr/>
-              <a:t>6</a:t>
-            </a:fld>
+            <a:r>
+              <a:rPr lang="en-US" dirty="0" smtClean="0"/>
+              <a:t>The models</a:t>
+            </a:r>
             <a:endParaRPr lang="en-US" dirty="0"/>
           </a:p>
         </p:txBody>
@@ -8803,7 +9240,7 @@
     </p:spTree>
     <p:extLst>
       <p:ext uri="{BB962C8B-B14F-4D97-AF65-F5344CB8AC3E}">
-        <p14:creationId xmlns:p14="http://schemas.microsoft.com/office/powerpoint/2010/main" val="2441667291"/>
+        <p14:creationId xmlns:p14="http://schemas.microsoft.com/office/powerpoint/2010/main" val="3290994532"/>
       </p:ext>
     </p:extLst>
   </p:cSld>
@@ -8837,31 +9274,735 @@
             <a:spLocks noGrp="1"/>
           </p:cNvSpPr>
           <p:nvPr>
-            <p:ph type="title"/>
+            <p:ph type="ctrTitle"/>
           </p:nvPr>
         </p:nvSpPr>
         <p:spPr>
           <a:xfrm>
-            <a:off x="0" y="0"/>
-            <a:ext cx="9144000" cy="5943600"/>
+            <a:off x="184727" y="32328"/>
+            <a:ext cx="8001000" cy="868217"/>
           </a:xfrm>
         </p:spPr>
         <p:txBody>
+          <a:bodyPr>
+            <a:normAutofit/>
+          </a:bodyPr>
+          <a:lstStyle/>
+          <a:p>
+            <a:pPr algn="l"/>
+            <a:r>
+              <a:rPr lang="en-US" sz="2400" b="1" dirty="0" smtClean="0"/>
+              <a:t>Generalized linear model with </a:t>
+            </a:r>
+            <a:r>
+              <a:rPr lang="en-US" sz="2400" b="1" dirty="0" err="1" smtClean="0"/>
+              <a:t>elasticnet</a:t>
+            </a:r>
+            <a:r>
+              <a:rPr lang="en-US" sz="2400" b="1" dirty="0" smtClean="0"/>
+              <a:t> penalty</a:t>
+            </a:r>
+            <a:endParaRPr lang="en-US" sz="2400" b="1" dirty="0"/>
+          </a:p>
+        </p:txBody>
+      </p:sp>
+      <p:sp>
+        <p:nvSpPr>
+          <p:cNvPr id="4" name="Slide Number Placeholder 3"/>
+          <p:cNvSpPr>
+            <a:spLocks noGrp="1"/>
+          </p:cNvSpPr>
+          <p:nvPr>
+            <p:ph type="sldNum" sz="quarter" idx="12"/>
+          </p:nvPr>
+        </p:nvSpPr>
+        <p:spPr/>
+        <p:txBody>
           <a:bodyPr/>
           <a:lstStyle/>
           <a:p>
-            <a:r>
-              <a:rPr lang="en-US" dirty="0" smtClean="0"/>
-              <a:t>The models</a:t>
-            </a:r>
+            <a:fld id="{106E12CD-FCB1-464E-A775-0B83FDDACE03}" type="slidenum">
+              <a:rPr lang="en-US" smtClean="0"/>
+              <a:pPr/>
+              <a:t>7</a:t>
+            </a:fld>
             <a:endParaRPr lang="en-US" dirty="0"/>
           </a:p>
         </p:txBody>
       </p:sp>
+      <p:sp>
+        <p:nvSpPr>
+          <p:cNvPr id="5" name="Title 1"/>
+          <p:cNvSpPr txBox="1">
+            <a:spLocks/>
+          </p:cNvSpPr>
+          <p:nvPr/>
+        </p:nvSpPr>
+        <p:spPr>
+          <a:xfrm>
+            <a:off x="184727" y="3198091"/>
+            <a:ext cx="8001000" cy="808181"/>
+          </a:xfrm>
+          <a:prstGeom prst="rect">
+            <a:avLst/>
+          </a:prstGeom>
+        </p:spPr>
+        <p:txBody>
+          <a:bodyPr vert="horz" lIns="91440" tIns="45720" rIns="91440" bIns="45720" rtlCol="0" anchor="ctr">
+            <a:normAutofit/>
+          </a:bodyPr>
+          <a:lstStyle>
+            <a:lvl1pPr algn="ctr" defTabSz="457200" rtl="0" eaLnBrk="1" latinLnBrk="0" hangingPunct="1">
+              <a:spcBef>
+                <a:spcPct val="0"/>
+              </a:spcBef>
+              <a:buNone/>
+              <a:defRPr sz="4400" kern="1200">
+                <a:solidFill>
+                  <a:schemeClr val="tx1"/>
+                </a:solidFill>
+                <a:latin typeface="Arial"/>
+                <a:ea typeface="+mj-ea"/>
+                <a:cs typeface="+mj-cs"/>
+              </a:defRPr>
+            </a:lvl1pPr>
+          </a:lstStyle>
+          <a:p>
+            <a:pPr algn="l"/>
+            <a:r>
+              <a:rPr lang="en-US" sz="2400" b="1" dirty="0" smtClean="0"/>
+              <a:t>Boosted decision trees</a:t>
+            </a:r>
+            <a:endParaRPr lang="en-US" sz="2400" b="1" dirty="0"/>
+          </a:p>
+        </p:txBody>
+      </p:sp>
+      <p:sp>
+        <p:nvSpPr>
+          <p:cNvPr id="7" name="Subtitle 2"/>
+          <p:cNvSpPr>
+            <a:spLocks noGrp="1"/>
+          </p:cNvSpPr>
+          <p:nvPr>
+            <p:ph type="subTitle" idx="1"/>
+          </p:nvPr>
+        </p:nvSpPr>
+        <p:spPr>
+          <a:xfrm>
+            <a:off x="309416" y="743527"/>
+            <a:ext cx="8834583" cy="2754745"/>
+          </a:xfrm>
+        </p:spPr>
+        <p:txBody>
+          <a:bodyPr>
+            <a:normAutofit lnSpcReduction="10000"/>
+          </a:bodyPr>
+          <a:lstStyle/>
+          <a:p>
+            <a:pPr marL="457200" indent="-457200" algn="l">
+              <a:buFont typeface="Arial"/>
+              <a:buChar char="•"/>
+            </a:pPr>
+            <a:r>
+              <a:rPr lang="en-US" sz="2000" dirty="0" smtClean="0">
+                <a:solidFill>
+                  <a:schemeClr val="tx1"/>
+                </a:solidFill>
+              </a:rPr>
+              <a:t>Solves</a:t>
+            </a:r>
+          </a:p>
+          <a:p>
+            <a:pPr marL="457200" indent="-457200" algn="l">
+              <a:buFont typeface="Arial"/>
+              <a:buChar char="•"/>
+            </a:pPr>
+            <a:endParaRPr lang="en-US" sz="2000" dirty="0">
+              <a:solidFill>
+                <a:schemeClr val="tx1"/>
+              </a:solidFill>
+            </a:endParaRPr>
+          </a:p>
+          <a:p>
+            <a:pPr marL="457200" indent="-457200" algn="l">
+              <a:buFont typeface="Arial"/>
+              <a:buChar char="•"/>
+            </a:pPr>
+            <a:endParaRPr lang="en-US" sz="2000" dirty="0" smtClean="0">
+              <a:solidFill>
+                <a:schemeClr val="tx1"/>
+              </a:solidFill>
+            </a:endParaRPr>
+          </a:p>
+          <a:p>
+            <a:pPr marL="457200" indent="-457200" algn="l">
+              <a:buFont typeface="Arial"/>
+              <a:buChar char="•"/>
+            </a:pPr>
+            <a:r>
+              <a:rPr lang="en-US" sz="2000" dirty="0" smtClean="0">
+                <a:solidFill>
+                  <a:schemeClr val="tx1"/>
+                </a:solidFill>
+              </a:rPr>
+              <a:t>Models fit with </a:t>
+            </a:r>
+            <a:r>
+              <a:rPr lang="en-US" sz="2000" dirty="0" err="1" smtClean="0">
+                <a:solidFill>
+                  <a:schemeClr val="tx1"/>
+                </a:solidFill>
+              </a:rPr>
+              <a:t>glmnet</a:t>
+            </a:r>
+            <a:r>
+              <a:rPr lang="en-US" sz="2000" dirty="0" smtClean="0">
+                <a:solidFill>
+                  <a:schemeClr val="tx1"/>
+                </a:solidFill>
+              </a:rPr>
+              <a:t> package in R.</a:t>
+            </a:r>
+          </a:p>
+          <a:p>
+            <a:pPr marL="457200" indent="-457200" algn="l">
+              <a:buFont typeface="Arial"/>
+              <a:buChar char="•"/>
+            </a:pPr>
+            <a:r>
+              <a:rPr lang="en-US" sz="2000" dirty="0" err="1" smtClean="0">
+                <a:solidFill>
+                  <a:schemeClr val="tx1"/>
+                </a:solidFill>
+              </a:rPr>
+              <a:t>λ</a:t>
+            </a:r>
+            <a:r>
+              <a:rPr lang="en-US" sz="2000" dirty="0" smtClean="0">
+                <a:solidFill>
+                  <a:schemeClr val="tx1"/>
+                </a:solidFill>
+              </a:rPr>
+              <a:t> controls overall coefficient norm penalty.</a:t>
+            </a:r>
+          </a:p>
+          <a:p>
+            <a:pPr marL="457200" indent="-457200" algn="l">
+              <a:buFont typeface="Arial"/>
+              <a:buChar char="•"/>
+            </a:pPr>
+            <a:r>
+              <a:rPr lang="en-US" sz="2000" dirty="0" smtClean="0">
+                <a:solidFill>
+                  <a:schemeClr val="tx1"/>
+                </a:solidFill>
+              </a:rPr>
+              <a:t>α controls L1 vs. L2 norm contribution to norm penalty.</a:t>
+            </a:r>
+          </a:p>
+          <a:p>
+            <a:pPr marL="457200" indent="-457200" algn="l">
+              <a:buFont typeface="Arial"/>
+              <a:buChar char="•"/>
+            </a:pPr>
+            <a:r>
+              <a:rPr lang="en-US" sz="2000" dirty="0" smtClean="0">
+                <a:solidFill>
+                  <a:schemeClr val="tx1"/>
+                </a:solidFill>
+              </a:rPr>
+              <a:t>Can train with gradient descent, online training. Missing data not allowed.</a:t>
+            </a:r>
+          </a:p>
+        </p:txBody>
+      </p:sp>
+      <p:sp>
+        <p:nvSpPr>
+          <p:cNvPr id="10" name="Subtitle 2"/>
+          <p:cNvSpPr txBox="1">
+            <a:spLocks/>
+          </p:cNvSpPr>
+          <p:nvPr/>
+        </p:nvSpPr>
+        <p:spPr>
+          <a:xfrm>
+            <a:off x="184727" y="3782292"/>
+            <a:ext cx="8684492" cy="2470149"/>
+          </a:xfrm>
+          <a:prstGeom prst="rect">
+            <a:avLst/>
+          </a:prstGeom>
+        </p:spPr>
+        <p:txBody>
+          <a:bodyPr vert="horz" lIns="91440" tIns="45720" rIns="91440" bIns="45720" rtlCol="0">
+            <a:normAutofit lnSpcReduction="10000"/>
+          </a:bodyPr>
+          <a:lstStyle>
+            <a:lvl1pPr marL="0" indent="0" algn="ctr" defTabSz="457200" rtl="0" eaLnBrk="1" latinLnBrk="0" hangingPunct="1">
+              <a:spcBef>
+                <a:spcPct val="20000"/>
+              </a:spcBef>
+              <a:buFont typeface="Arial"/>
+              <a:buNone/>
+              <a:defRPr sz="3200" kern="1200">
+                <a:solidFill>
+                  <a:schemeClr val="tx1">
+                    <a:tint val="75000"/>
+                  </a:schemeClr>
+                </a:solidFill>
+                <a:latin typeface="Arial"/>
+                <a:ea typeface="+mn-ea"/>
+                <a:cs typeface="+mn-cs"/>
+              </a:defRPr>
+            </a:lvl1pPr>
+            <a:lvl2pPr marL="457200" indent="0" algn="ctr" defTabSz="457200" rtl="0" eaLnBrk="1" latinLnBrk="0" hangingPunct="1">
+              <a:spcBef>
+                <a:spcPct val="20000"/>
+              </a:spcBef>
+              <a:buFont typeface="Arial"/>
+              <a:buNone/>
+              <a:defRPr sz="2800" kern="1200">
+                <a:solidFill>
+                  <a:schemeClr val="tx1">
+                    <a:tint val="75000"/>
+                  </a:schemeClr>
+                </a:solidFill>
+                <a:latin typeface="Arial"/>
+                <a:ea typeface="+mn-ea"/>
+                <a:cs typeface="+mn-cs"/>
+              </a:defRPr>
+            </a:lvl2pPr>
+            <a:lvl3pPr marL="914400" indent="0" algn="ctr" defTabSz="457200" rtl="0" eaLnBrk="1" latinLnBrk="0" hangingPunct="1">
+              <a:spcBef>
+                <a:spcPct val="20000"/>
+              </a:spcBef>
+              <a:buFont typeface="Arial"/>
+              <a:buNone/>
+              <a:defRPr sz="2400" kern="1200">
+                <a:solidFill>
+                  <a:schemeClr val="tx1">
+                    <a:tint val="75000"/>
+                  </a:schemeClr>
+                </a:solidFill>
+                <a:latin typeface="Arial"/>
+                <a:ea typeface="+mn-ea"/>
+                <a:cs typeface="+mn-cs"/>
+              </a:defRPr>
+            </a:lvl3pPr>
+            <a:lvl4pPr marL="1371600" indent="0" algn="ctr" defTabSz="457200" rtl="0" eaLnBrk="1" latinLnBrk="0" hangingPunct="1">
+              <a:spcBef>
+                <a:spcPct val="20000"/>
+              </a:spcBef>
+              <a:buFont typeface="Arial"/>
+              <a:buNone/>
+              <a:defRPr sz="2000" kern="1200">
+                <a:solidFill>
+                  <a:schemeClr val="tx1">
+                    <a:tint val="75000"/>
+                  </a:schemeClr>
+                </a:solidFill>
+                <a:latin typeface="Arial"/>
+                <a:ea typeface="+mn-ea"/>
+                <a:cs typeface="+mn-cs"/>
+              </a:defRPr>
+            </a:lvl4pPr>
+            <a:lvl5pPr marL="1828800" indent="0" algn="ctr" defTabSz="457200" rtl="0" eaLnBrk="1" latinLnBrk="0" hangingPunct="1">
+              <a:spcBef>
+                <a:spcPct val="20000"/>
+              </a:spcBef>
+              <a:buFont typeface="Arial"/>
+              <a:buNone/>
+              <a:defRPr sz="2000" kern="1200">
+                <a:solidFill>
+                  <a:schemeClr val="tx1">
+                    <a:tint val="75000"/>
+                  </a:schemeClr>
+                </a:solidFill>
+                <a:latin typeface="Arial"/>
+                <a:ea typeface="+mn-ea"/>
+                <a:cs typeface="+mn-cs"/>
+              </a:defRPr>
+            </a:lvl5pPr>
+            <a:lvl6pPr marL="2286000" indent="0" algn="ctr" defTabSz="457200" rtl="0" eaLnBrk="1" latinLnBrk="0" hangingPunct="1">
+              <a:spcBef>
+                <a:spcPct val="20000"/>
+              </a:spcBef>
+              <a:buFont typeface="Arial"/>
+              <a:buNone/>
+              <a:defRPr sz="2000" kern="1200">
+                <a:solidFill>
+                  <a:schemeClr val="tx1">
+                    <a:tint val="75000"/>
+                  </a:schemeClr>
+                </a:solidFill>
+                <a:latin typeface="+mn-lt"/>
+                <a:ea typeface="+mn-ea"/>
+                <a:cs typeface="+mn-cs"/>
+              </a:defRPr>
+            </a:lvl6pPr>
+            <a:lvl7pPr marL="2743200" indent="0" algn="ctr" defTabSz="457200" rtl="0" eaLnBrk="1" latinLnBrk="0" hangingPunct="1">
+              <a:spcBef>
+                <a:spcPct val="20000"/>
+              </a:spcBef>
+              <a:buFont typeface="Arial"/>
+              <a:buNone/>
+              <a:defRPr sz="2000" kern="1200">
+                <a:solidFill>
+                  <a:schemeClr val="tx1">
+                    <a:tint val="75000"/>
+                  </a:schemeClr>
+                </a:solidFill>
+                <a:latin typeface="+mn-lt"/>
+                <a:ea typeface="+mn-ea"/>
+                <a:cs typeface="+mn-cs"/>
+              </a:defRPr>
+            </a:lvl7pPr>
+            <a:lvl8pPr marL="3200400" indent="0" algn="ctr" defTabSz="457200" rtl="0" eaLnBrk="1" latinLnBrk="0" hangingPunct="1">
+              <a:spcBef>
+                <a:spcPct val="20000"/>
+              </a:spcBef>
+              <a:buFont typeface="Arial"/>
+              <a:buNone/>
+              <a:defRPr sz="2000" kern="1200">
+                <a:solidFill>
+                  <a:schemeClr val="tx1">
+                    <a:tint val="75000"/>
+                  </a:schemeClr>
+                </a:solidFill>
+                <a:latin typeface="+mn-lt"/>
+                <a:ea typeface="+mn-ea"/>
+                <a:cs typeface="+mn-cs"/>
+              </a:defRPr>
+            </a:lvl8pPr>
+            <a:lvl9pPr marL="3657600" indent="0" algn="ctr" defTabSz="457200" rtl="0" eaLnBrk="1" latinLnBrk="0" hangingPunct="1">
+              <a:spcBef>
+                <a:spcPct val="20000"/>
+              </a:spcBef>
+              <a:buFont typeface="Arial"/>
+              <a:buNone/>
+              <a:defRPr sz="2000" kern="1200">
+                <a:solidFill>
+                  <a:schemeClr val="tx1">
+                    <a:tint val="75000"/>
+                  </a:schemeClr>
+                </a:solidFill>
+                <a:latin typeface="+mn-lt"/>
+                <a:ea typeface="+mn-ea"/>
+                <a:cs typeface="+mn-cs"/>
+              </a:defRPr>
+            </a:lvl9pPr>
+          </a:lstStyle>
+          <a:p>
+            <a:pPr marL="457200" indent="-457200" algn="l">
+              <a:buFont typeface="Arial"/>
+              <a:buChar char="•"/>
+            </a:pPr>
+            <a:r>
+              <a:rPr lang="en-US" sz="2000" dirty="0" smtClean="0">
+                <a:solidFill>
+                  <a:schemeClr val="tx1"/>
+                </a:solidFill>
+              </a:rPr>
+              <a:t>Additive decision tree model: at the end of one iteration, add the next tree that fits the residual at the current iteration, h(x) = y </a:t>
+            </a:r>
+            <a:r>
+              <a:rPr lang="mr-IN" sz="2000" dirty="0" smtClean="0">
+                <a:solidFill>
+                  <a:schemeClr val="tx1"/>
+                </a:solidFill>
+              </a:rPr>
+              <a:t>–</a:t>
+            </a:r>
+            <a:r>
+              <a:rPr lang="en-US" sz="2000" dirty="0" smtClean="0">
+                <a:solidFill>
+                  <a:schemeClr val="tx1"/>
+                </a:solidFill>
+              </a:rPr>
+              <a:t> </a:t>
+            </a:r>
+            <a:r>
+              <a:rPr lang="en-US" sz="2000" dirty="0" err="1" smtClean="0">
+                <a:solidFill>
+                  <a:schemeClr val="tx1"/>
+                </a:solidFill>
+              </a:rPr>
+              <a:t>F</a:t>
+            </a:r>
+            <a:r>
+              <a:rPr lang="en-US" sz="2000" baseline="-25000" dirty="0" err="1" smtClean="0">
+                <a:solidFill>
+                  <a:schemeClr val="tx1"/>
+                </a:solidFill>
+              </a:rPr>
+              <a:t>m</a:t>
+            </a:r>
+            <a:r>
+              <a:rPr lang="en-US" sz="2000" dirty="0" smtClean="0">
+                <a:solidFill>
+                  <a:schemeClr val="tx1"/>
+                </a:solidFill>
+              </a:rPr>
+              <a:t>(x)</a:t>
+            </a:r>
+          </a:p>
+          <a:p>
+            <a:pPr lvl="1" algn="l"/>
+            <a:r>
+              <a:rPr lang="en-US" sz="1600" dirty="0" smtClean="0">
+                <a:solidFill>
+                  <a:schemeClr val="tx1"/>
+                </a:solidFill>
+              </a:rPr>
+              <a:t>				</a:t>
+            </a:r>
+          </a:p>
+          <a:p>
+            <a:pPr lvl="1" algn="l"/>
+            <a:r>
+              <a:rPr lang="en-US" sz="1600" dirty="0">
+                <a:solidFill>
+                  <a:schemeClr val="tx1"/>
+                </a:solidFill>
+              </a:rPr>
+              <a:t>	</a:t>
+            </a:r>
+            <a:r>
+              <a:rPr lang="en-US" sz="1600" dirty="0" smtClean="0">
+                <a:solidFill>
+                  <a:schemeClr val="tx1"/>
+                </a:solidFill>
+              </a:rPr>
+              <a:t>			F</a:t>
+            </a:r>
+            <a:r>
+              <a:rPr lang="en-US" sz="1600" baseline="-25000" dirty="0" smtClean="0">
+                <a:solidFill>
+                  <a:schemeClr val="tx1"/>
+                </a:solidFill>
+              </a:rPr>
+              <a:t>m+1</a:t>
+            </a:r>
+            <a:r>
+              <a:rPr lang="en-US" sz="1600" dirty="0" smtClean="0">
+                <a:solidFill>
+                  <a:schemeClr val="tx1"/>
+                </a:solidFill>
+              </a:rPr>
+              <a:t>(x) = </a:t>
+            </a:r>
+            <a:r>
+              <a:rPr lang="en-US" sz="1600" dirty="0" err="1" smtClean="0">
+                <a:solidFill>
+                  <a:schemeClr val="tx1"/>
+                </a:solidFill>
+              </a:rPr>
+              <a:t>F</a:t>
+            </a:r>
+            <a:r>
+              <a:rPr lang="en-US" sz="1600" baseline="-25000" dirty="0" err="1" smtClean="0">
+                <a:solidFill>
+                  <a:schemeClr val="tx1"/>
+                </a:solidFill>
+              </a:rPr>
+              <a:t>m</a:t>
+            </a:r>
+            <a:r>
+              <a:rPr lang="en-US" sz="1600" dirty="0" smtClean="0">
+                <a:solidFill>
+                  <a:schemeClr val="tx1"/>
+                </a:solidFill>
+              </a:rPr>
+              <a:t>(x) + h(x) = y		(update step)</a:t>
+            </a:r>
+          </a:p>
+          <a:p>
+            <a:pPr lvl="1" algn="l"/>
+            <a:r>
+              <a:rPr lang="en-US" sz="1600" dirty="0">
+                <a:solidFill>
+                  <a:schemeClr val="tx1"/>
+                </a:solidFill>
+              </a:rPr>
+              <a:t>	</a:t>
+            </a:r>
+            <a:r>
+              <a:rPr lang="en-US" sz="1600" dirty="0" smtClean="0">
+                <a:solidFill>
+                  <a:schemeClr val="tx1"/>
+                </a:solidFill>
+              </a:rPr>
+              <a:t>			F</a:t>
+            </a:r>
+            <a:r>
+              <a:rPr lang="en-US" sz="1600" baseline="-25000" dirty="0" smtClean="0">
+                <a:solidFill>
+                  <a:schemeClr val="tx1"/>
+                </a:solidFill>
+              </a:rPr>
+              <a:t>M</a:t>
+            </a:r>
+            <a:r>
+              <a:rPr lang="en-US" sz="1600" dirty="0" smtClean="0">
+                <a:solidFill>
+                  <a:schemeClr val="tx1"/>
+                </a:solidFill>
+              </a:rPr>
+              <a:t>(x) = </a:t>
+            </a:r>
+            <a:r>
+              <a:rPr lang="en-US" sz="1600" dirty="0" err="1" smtClean="0">
+                <a:solidFill>
+                  <a:schemeClr val="tx1"/>
+                </a:solidFill>
+              </a:rPr>
+              <a:t>Σγ</a:t>
+            </a:r>
+            <a:r>
+              <a:rPr lang="en-US" sz="1600" baseline="-25000" dirty="0" err="1" smtClean="0">
+                <a:solidFill>
+                  <a:schemeClr val="tx1"/>
+                </a:solidFill>
+              </a:rPr>
+              <a:t>i</a:t>
+            </a:r>
+            <a:r>
+              <a:rPr lang="en-US" sz="1600" dirty="0" err="1" smtClean="0">
+                <a:solidFill>
+                  <a:schemeClr val="tx1"/>
+                </a:solidFill>
+              </a:rPr>
+              <a:t>h</a:t>
+            </a:r>
+            <a:r>
+              <a:rPr lang="en-US" sz="1600" baseline="-25000" dirty="0" err="1" smtClean="0">
+                <a:solidFill>
+                  <a:schemeClr val="tx1"/>
+                </a:solidFill>
+              </a:rPr>
+              <a:t>i</a:t>
+            </a:r>
+            <a:r>
+              <a:rPr lang="en-US" sz="1600" dirty="0" smtClean="0">
+                <a:solidFill>
+                  <a:schemeClr val="tx1"/>
+                </a:solidFill>
+              </a:rPr>
+              <a:t>(x) + c			(final model)</a:t>
+            </a:r>
+          </a:p>
+          <a:p>
+            <a:pPr marL="457200" indent="-457200" algn="l">
+              <a:buFont typeface="Arial"/>
+              <a:buChar char="•"/>
+            </a:pPr>
+            <a:endParaRPr lang="en-US" sz="2000" dirty="0" smtClean="0">
+              <a:solidFill>
+                <a:schemeClr val="tx1"/>
+              </a:solidFill>
+            </a:endParaRPr>
+          </a:p>
+          <a:p>
+            <a:pPr marL="457200" indent="-457200" algn="l">
+              <a:buFont typeface="Arial"/>
+              <a:buChar char="•"/>
+            </a:pPr>
+            <a:r>
+              <a:rPr lang="en-US" sz="2000" dirty="0" smtClean="0">
+                <a:solidFill>
+                  <a:schemeClr val="tx1"/>
+                </a:solidFill>
+              </a:rPr>
+              <a:t>h</a:t>
+            </a:r>
+            <a:r>
+              <a:rPr lang="en-US" sz="2000" baseline="-25000" dirty="0" smtClean="0">
+                <a:solidFill>
+                  <a:schemeClr val="tx1"/>
+                </a:solidFill>
+              </a:rPr>
+              <a:t>i</a:t>
+            </a:r>
+            <a:r>
+              <a:rPr lang="en-US" sz="2000" dirty="0" smtClean="0">
+                <a:solidFill>
+                  <a:schemeClr val="tx1"/>
+                </a:solidFill>
+              </a:rPr>
+              <a:t>(x) models are called “weak learners.” Are “shallow” decision trees.</a:t>
+            </a:r>
+            <a:endParaRPr lang="en-US" sz="2000" dirty="0">
+              <a:solidFill>
+                <a:schemeClr val="tx1"/>
+              </a:solidFill>
+            </a:endParaRPr>
+          </a:p>
+          <a:p>
+            <a:pPr marL="457200" indent="-457200" algn="l">
+              <a:buFont typeface="Arial"/>
+              <a:buChar char="•"/>
+            </a:pPr>
+            <a:r>
+              <a:rPr lang="en-US" sz="2000" dirty="0" smtClean="0">
+                <a:solidFill>
+                  <a:schemeClr val="tx1"/>
+                </a:solidFill>
+              </a:rPr>
+              <a:t>Cannot train in online fashion. But can handle missing data!</a:t>
+            </a:r>
+            <a:endParaRPr lang="en-US" sz="2000" dirty="0">
+              <a:solidFill>
+                <a:schemeClr val="tx1"/>
+              </a:solidFill>
+            </a:endParaRPr>
+          </a:p>
+          <a:p>
+            <a:pPr marL="457200" indent="-457200" algn="l">
+              <a:buFont typeface="Arial"/>
+              <a:buChar char="•"/>
+            </a:pPr>
+            <a:endParaRPr lang="en-US" sz="2000" dirty="0" smtClean="0">
+              <a:solidFill>
+                <a:schemeClr val="tx1"/>
+              </a:solidFill>
+            </a:endParaRPr>
+          </a:p>
+        </p:txBody>
+      </p:sp>
+      <p:pic>
+        <p:nvPicPr>
+          <p:cNvPr id="6" name="Picture 5" descr="elasticnet_loss.png"/>
+          <p:cNvPicPr>
+            <a:picLocks noChangeAspect="1"/>
+          </p:cNvPicPr>
+          <p:nvPr/>
+        </p:nvPicPr>
+        <p:blipFill>
+          <a:blip r:embed="rId2">
+            <a:extLst>
+              <a:ext uri="{28A0092B-C50C-407E-A947-70E740481C1C}">
+                <a14:useLocalDpi xmlns:a14="http://schemas.microsoft.com/office/drawing/2010/main" val="0"/>
+              </a:ext>
+            </a:extLst>
+          </a:blip>
+          <a:stretch>
+            <a:fillRect/>
+          </a:stretch>
+        </p:blipFill>
+        <p:spPr>
+          <a:xfrm>
+            <a:off x="1736090" y="1061720"/>
+            <a:ext cx="5143500" cy="660400"/>
+          </a:xfrm>
+          <a:prstGeom prst="rect">
+            <a:avLst/>
+          </a:prstGeom>
+        </p:spPr>
+      </p:pic>
     </p:spTree>
     <p:extLst>
       <p:ext uri="{BB962C8B-B14F-4D97-AF65-F5344CB8AC3E}">
-        <p14:creationId xmlns:p14="http://schemas.microsoft.com/office/powerpoint/2010/main" val="3290994532"/>
+        <p14:creationId xmlns:p14="http://schemas.microsoft.com/office/powerpoint/2010/main" val="2543980552"/>
       </p:ext>
     </p:extLst>
   </p:cSld>
@@ -8888,258 +10029,9 @@
           <a:chExt cx="0" cy="0"/>
         </a:xfrm>
       </p:grpSpPr>
-      <p:sp>
-        <p:nvSpPr>
-          <p:cNvPr id="2" name="Title 1"/>
-          <p:cNvSpPr>
-            <a:spLocks noGrp="1"/>
-          </p:cNvSpPr>
-          <p:nvPr>
-            <p:ph type="ctrTitle"/>
-          </p:nvPr>
-        </p:nvSpPr>
-        <p:spPr>
-          <a:xfrm>
-            <a:off x="184727" y="32328"/>
-            <a:ext cx="8001000" cy="868217"/>
-          </a:xfrm>
-        </p:spPr>
-        <p:txBody>
-          <a:bodyPr>
-            <a:normAutofit/>
-          </a:bodyPr>
-          <a:lstStyle/>
-          <a:p>
-            <a:pPr algn="l"/>
-            <a:r>
-              <a:rPr lang="en-US" sz="2400" b="1" dirty="0" smtClean="0"/>
-              <a:t>Generalized linear model with </a:t>
-            </a:r>
-            <a:r>
-              <a:rPr lang="en-US" sz="2400" b="1" dirty="0" err="1" smtClean="0"/>
-              <a:t>elasticnet</a:t>
-            </a:r>
-            <a:r>
-              <a:rPr lang="en-US" sz="2400" b="1" dirty="0" smtClean="0"/>
-              <a:t> penalty</a:t>
-            </a:r>
-            <a:endParaRPr lang="en-US" sz="2400" b="1" dirty="0"/>
-          </a:p>
-        </p:txBody>
-      </p:sp>
-      <p:sp>
-        <p:nvSpPr>
-          <p:cNvPr id="4" name="Slide Number Placeholder 3"/>
-          <p:cNvSpPr>
-            <a:spLocks noGrp="1"/>
-          </p:cNvSpPr>
-          <p:nvPr>
-            <p:ph type="sldNum" sz="quarter" idx="12"/>
-          </p:nvPr>
-        </p:nvSpPr>
-        <p:spPr/>
-        <p:txBody>
-          <a:bodyPr/>
-          <a:lstStyle/>
-          <a:p>
-            <a:fld id="{106E12CD-FCB1-464E-A775-0B83FDDACE03}" type="slidenum">
-              <a:rPr lang="en-US" smtClean="0"/>
-              <a:pPr/>
-              <a:t>8</a:t>
-            </a:fld>
-            <a:endParaRPr lang="en-US" dirty="0"/>
-          </a:p>
-        </p:txBody>
-      </p:sp>
-      <p:sp>
-        <p:nvSpPr>
-          <p:cNvPr id="5" name="Title 1"/>
-          <p:cNvSpPr txBox="1">
-            <a:spLocks/>
-          </p:cNvSpPr>
-          <p:nvPr/>
-        </p:nvSpPr>
-        <p:spPr>
-          <a:xfrm>
-            <a:off x="184727" y="3198091"/>
-            <a:ext cx="8001000" cy="808181"/>
-          </a:xfrm>
-          <a:prstGeom prst="rect">
-            <a:avLst/>
-          </a:prstGeom>
-        </p:spPr>
-        <p:txBody>
-          <a:bodyPr vert="horz" lIns="91440" tIns="45720" rIns="91440" bIns="45720" rtlCol="0" anchor="ctr">
-            <a:normAutofit/>
-          </a:bodyPr>
-          <a:lstStyle>
-            <a:lvl1pPr algn="ctr" defTabSz="457200" rtl="0" eaLnBrk="1" latinLnBrk="0" hangingPunct="1">
-              <a:spcBef>
-                <a:spcPct val="0"/>
-              </a:spcBef>
-              <a:buNone/>
-              <a:defRPr sz="4400" kern="1200">
-                <a:solidFill>
-                  <a:schemeClr val="tx1"/>
-                </a:solidFill>
-                <a:latin typeface="Arial"/>
-                <a:ea typeface="+mj-ea"/>
-                <a:cs typeface="+mj-cs"/>
-              </a:defRPr>
-            </a:lvl1pPr>
-          </a:lstStyle>
-          <a:p>
-            <a:pPr algn="l"/>
-            <a:r>
-              <a:rPr lang="en-US" sz="2400" b="1" dirty="0" smtClean="0"/>
-              <a:t>Boosted decision trees</a:t>
-            </a:r>
-            <a:endParaRPr lang="en-US" sz="2400" b="1" dirty="0"/>
-          </a:p>
-        </p:txBody>
-      </p:sp>
-      <p:sp>
-        <p:nvSpPr>
-          <p:cNvPr id="7" name="Subtitle 2"/>
-          <p:cNvSpPr>
-            <a:spLocks noGrp="1"/>
-          </p:cNvSpPr>
-          <p:nvPr>
-            <p:ph type="subTitle" idx="1"/>
-          </p:nvPr>
-        </p:nvSpPr>
-        <p:spPr>
-          <a:xfrm>
-            <a:off x="309416" y="743527"/>
-            <a:ext cx="8834583" cy="2754745"/>
-          </a:xfrm>
-        </p:spPr>
-        <p:txBody>
-          <a:bodyPr>
-            <a:normAutofit lnSpcReduction="10000"/>
-          </a:bodyPr>
-          <a:lstStyle/>
-          <a:p>
-            <a:pPr marL="457200" indent="-457200" algn="l">
-              <a:buFont typeface="Arial"/>
-              <a:buChar char="•"/>
-            </a:pPr>
-            <a:r>
-              <a:rPr lang="en-US" sz="2000" dirty="0" smtClean="0">
-                <a:solidFill>
-                  <a:schemeClr val="tx1"/>
-                </a:solidFill>
-              </a:rPr>
-              <a:t>Solves</a:t>
-            </a:r>
-          </a:p>
-          <a:p>
-            <a:pPr marL="457200" indent="-457200" algn="l">
-              <a:buFont typeface="Arial"/>
-              <a:buChar char="•"/>
-            </a:pPr>
-            <a:endParaRPr lang="en-US" sz="2000" dirty="0">
-              <a:solidFill>
-                <a:schemeClr val="tx1"/>
-              </a:solidFill>
-            </a:endParaRPr>
-          </a:p>
-          <a:p>
-            <a:pPr marL="457200" indent="-457200" algn="l">
-              <a:buFont typeface="Arial"/>
-              <a:buChar char="•"/>
-            </a:pPr>
-            <a:endParaRPr lang="en-US" sz="2000" dirty="0" smtClean="0">
-              <a:solidFill>
-                <a:schemeClr val="tx1"/>
-              </a:solidFill>
-            </a:endParaRPr>
-          </a:p>
-          <a:p>
-            <a:pPr marL="457200" indent="-457200" algn="l">
-              <a:buFont typeface="Arial"/>
-              <a:buChar char="•"/>
-            </a:pPr>
-            <a:r>
-              <a:rPr lang="en-US" sz="2000" dirty="0" smtClean="0">
-                <a:solidFill>
-                  <a:schemeClr val="tx1"/>
-                </a:solidFill>
-              </a:rPr>
-              <a:t>Models fit with </a:t>
-            </a:r>
-            <a:r>
-              <a:rPr lang="en-US" sz="2000" dirty="0" err="1" smtClean="0">
-                <a:solidFill>
-                  <a:schemeClr val="tx1"/>
-                </a:solidFill>
-              </a:rPr>
-              <a:t>glmnet</a:t>
-            </a:r>
-            <a:r>
-              <a:rPr lang="en-US" sz="2000" dirty="0" smtClean="0">
-                <a:solidFill>
-                  <a:schemeClr val="tx1"/>
-                </a:solidFill>
-              </a:rPr>
-              <a:t> package in R.</a:t>
-            </a:r>
-          </a:p>
-          <a:p>
-            <a:pPr marL="457200" indent="-457200" algn="l">
-              <a:buFont typeface="Arial"/>
-              <a:buChar char="•"/>
-            </a:pPr>
-            <a:r>
-              <a:rPr lang="en-US" sz="2000" dirty="0" err="1" smtClean="0">
-                <a:solidFill>
-                  <a:schemeClr val="tx1"/>
-                </a:solidFill>
-              </a:rPr>
-              <a:t>λ</a:t>
-            </a:r>
-            <a:r>
-              <a:rPr lang="en-US" sz="2000" dirty="0" smtClean="0">
-                <a:solidFill>
-                  <a:schemeClr val="tx1"/>
-                </a:solidFill>
-              </a:rPr>
-              <a:t> controls overall coefficient norm penalty.</a:t>
-            </a:r>
-          </a:p>
-          <a:p>
-            <a:pPr marL="457200" indent="-457200" algn="l">
-              <a:buFont typeface="Arial"/>
-              <a:buChar char="•"/>
-            </a:pPr>
-            <a:r>
-              <a:rPr lang="en-US" sz="2000" dirty="0" smtClean="0">
-                <a:solidFill>
-                  <a:schemeClr val="tx1"/>
-                </a:solidFill>
-              </a:rPr>
-              <a:t>α controls L1 vs. L2 norm contribution to norm penalty.</a:t>
-            </a:r>
-          </a:p>
-          <a:p>
-            <a:pPr marL="457200" indent="-457200" algn="l">
-              <a:buFont typeface="Arial"/>
-              <a:buChar char="•"/>
-            </a:pPr>
-            <a:r>
-              <a:rPr lang="en-US" sz="2000" dirty="0" smtClean="0">
-                <a:solidFill>
-                  <a:schemeClr val="tx1"/>
-                </a:solidFill>
-              </a:rPr>
-              <a:t>Can train with gradient descent, online training. Missing data not allowed.</a:t>
-            </a:r>
-          </a:p>
-        </p:txBody>
-      </p:sp>
       <p:pic>
         <p:nvPicPr>
-          <p:cNvPr id="3" name="Picture 2" descr="elasticnet_loss.png"/>
+          <p:cNvPr id="3" name="Picture 2" descr="decision_tree_example.png"/>
           <p:cNvPicPr>
             <a:picLocks noChangeAspect="1"/>
           </p:cNvPicPr>
@@ -9159,17 +10051,216 @@
         </p:blipFill>
         <p:spPr>
           <a:xfrm>
-            <a:off x="1746250" y="1002148"/>
-            <a:ext cx="5608204" cy="720066"/>
+            <a:off x="2087028" y="1381990"/>
+            <a:ext cx="5143500" cy="2959100"/>
           </a:xfrm>
           <a:prstGeom prst="rect">
             <a:avLst/>
           </a:prstGeom>
         </p:spPr>
       </p:pic>
-      <p:sp>
-        <p:nvSpPr>
-          <p:cNvPr id="10" name="Subtitle 2"/>
+      <p:cxnSp>
+        <p:nvCxnSpPr>
+          <p:cNvPr id="11" name="Straight Arrow Connector 10"/>
+          <p:cNvCxnSpPr/>
+          <p:nvPr/>
+        </p:nvCxnSpPr>
+        <p:spPr>
+          <a:xfrm>
+            <a:off x="2267902" y="1650999"/>
+            <a:ext cx="2112818" cy="57726"/>
+          </a:xfrm>
+          <a:prstGeom prst="straightConnector1">
+            <a:avLst/>
+          </a:prstGeom>
+          <a:ln>
+            <a:tailEnd type="arrow"/>
+          </a:ln>
+        </p:spPr>
+        <p:style>
+          <a:lnRef idx="2">
+            <a:schemeClr val="accent6"/>
+          </a:lnRef>
+          <a:fillRef idx="0">
+            <a:schemeClr val="accent6"/>
+          </a:fillRef>
+          <a:effectRef idx="1">
+            <a:schemeClr val="accent6"/>
+          </a:effectRef>
+          <a:fontRef idx="minor">
+            <a:schemeClr val="tx1"/>
+          </a:fontRef>
+        </p:style>
+      </p:cxnSp>
+      <p:cxnSp>
+        <p:nvCxnSpPr>
+          <p:cNvPr id="13" name="Straight Arrow Connector 12"/>
+          <p:cNvCxnSpPr/>
+          <p:nvPr/>
+        </p:nvCxnSpPr>
+        <p:spPr>
+          <a:xfrm>
+            <a:off x="1661765" y="1708725"/>
+            <a:ext cx="2158395" cy="892235"/>
+          </a:xfrm>
+          <a:prstGeom prst="straightConnector1">
+            <a:avLst/>
+          </a:prstGeom>
+          <a:ln>
+            <a:tailEnd type="arrow"/>
+          </a:ln>
+        </p:spPr>
+        <p:style>
+          <a:lnRef idx="2">
+            <a:schemeClr val="accent6"/>
+          </a:lnRef>
+          <a:fillRef idx="0">
+            <a:schemeClr val="accent6"/>
+          </a:fillRef>
+          <a:effectRef idx="1">
+            <a:schemeClr val="accent6"/>
+          </a:effectRef>
+          <a:fontRef idx="minor">
+            <a:schemeClr val="tx1"/>
+          </a:fontRef>
+        </p:style>
+      </p:cxnSp>
+      <p:sp>
+        <p:nvSpPr>
+          <p:cNvPr id="18" name="Subtitle 2"/>
+          <p:cNvSpPr>
+            <a:spLocks noGrp="1"/>
+          </p:cNvSpPr>
+          <p:nvPr>
+            <p:ph type="subTitle" idx="1"/>
+          </p:nvPr>
+        </p:nvSpPr>
+        <p:spPr>
+          <a:xfrm>
+            <a:off x="710233" y="1223816"/>
+            <a:ext cx="1924441" cy="484909"/>
+          </a:xfrm>
+        </p:spPr>
+        <p:txBody>
+          <a:bodyPr>
+            <a:normAutofit lnSpcReduction="10000"/>
+          </a:bodyPr>
+          <a:lstStyle/>
+          <a:p>
+            <a:pPr algn="l"/>
+            <a:r>
+              <a:rPr lang="en-US" sz="1400" dirty="0" smtClean="0">
+                <a:solidFill>
+                  <a:srgbClr val="FF6600"/>
+                </a:solidFill>
+              </a:rPr>
+              <a:t>Age and gender are the “split variables”</a:t>
+            </a:r>
+          </a:p>
+        </p:txBody>
+      </p:sp>
+      <p:cxnSp>
+        <p:nvCxnSpPr>
+          <p:cNvPr id="19" name="Straight Arrow Connector 18"/>
+          <p:cNvCxnSpPr/>
+          <p:nvPr/>
+        </p:nvCxnSpPr>
+        <p:spPr>
+          <a:xfrm flipH="1" flipV="1">
+            <a:off x="2857687" y="4341090"/>
+            <a:ext cx="1085273" cy="568038"/>
+          </a:xfrm>
+          <a:prstGeom prst="straightConnector1">
+            <a:avLst/>
+          </a:prstGeom>
+          <a:ln>
+            <a:tailEnd type="arrow"/>
+          </a:ln>
+        </p:spPr>
+        <p:style>
+          <a:lnRef idx="2">
+            <a:schemeClr val="accent6"/>
+          </a:lnRef>
+          <a:fillRef idx="0">
+            <a:schemeClr val="accent6"/>
+          </a:fillRef>
+          <a:effectRef idx="1">
+            <a:schemeClr val="accent6"/>
+          </a:effectRef>
+          <a:fontRef idx="minor">
+            <a:schemeClr val="tx1"/>
+          </a:fontRef>
+        </p:style>
+      </p:cxnSp>
+      <p:cxnSp>
+        <p:nvCxnSpPr>
+          <p:cNvPr id="22" name="Straight Arrow Connector 21"/>
+          <p:cNvCxnSpPr/>
+          <p:nvPr/>
+        </p:nvCxnSpPr>
+        <p:spPr>
+          <a:xfrm flipV="1">
+            <a:off x="4196960" y="4341090"/>
+            <a:ext cx="607486" cy="568038"/>
+          </a:xfrm>
+          <a:prstGeom prst="straightConnector1">
+            <a:avLst/>
+          </a:prstGeom>
+          <a:ln>
+            <a:tailEnd type="arrow"/>
+          </a:ln>
+        </p:spPr>
+        <p:style>
+          <a:lnRef idx="2">
+            <a:schemeClr val="accent6"/>
+          </a:lnRef>
+          <a:fillRef idx="0">
+            <a:schemeClr val="accent6"/>
+          </a:fillRef>
+          <a:effectRef idx="1">
+            <a:schemeClr val="accent6"/>
+          </a:effectRef>
+          <a:fontRef idx="minor">
+            <a:schemeClr val="tx1"/>
+          </a:fontRef>
+        </p:style>
+      </p:cxnSp>
+      <p:cxnSp>
+        <p:nvCxnSpPr>
+          <p:cNvPr id="25" name="Straight Arrow Connector 24"/>
+          <p:cNvCxnSpPr/>
+          <p:nvPr/>
+        </p:nvCxnSpPr>
+        <p:spPr>
+          <a:xfrm flipV="1">
+            <a:off x="4879109" y="4193306"/>
+            <a:ext cx="1674091" cy="741220"/>
+          </a:xfrm>
+          <a:prstGeom prst="straightConnector1">
+            <a:avLst/>
+          </a:prstGeom>
+          <a:ln>
+            <a:tailEnd type="arrow"/>
+          </a:ln>
+        </p:spPr>
+        <p:style>
+          <a:lnRef idx="2">
+            <a:schemeClr val="accent6"/>
+          </a:lnRef>
+          <a:fillRef idx="0">
+            <a:schemeClr val="accent6"/>
+          </a:fillRef>
+          <a:effectRef idx="1">
+            <a:schemeClr val="accent6"/>
+          </a:effectRef>
+          <a:fontRef idx="minor">
+            <a:schemeClr val="tx1"/>
+          </a:fontRef>
+        </p:style>
+      </p:cxnSp>
+      <p:sp>
+        <p:nvSpPr>
+          <p:cNvPr id="28" name="Subtitle 2"/>
           <p:cNvSpPr txBox="1">
             <a:spLocks/>
           </p:cNvSpPr>
@@ -9177,8 +10268,8 @@
         </p:nvSpPr>
         <p:spPr>
           <a:xfrm>
-            <a:off x="184727" y="3782292"/>
-            <a:ext cx="8684492" cy="2470149"/>
+            <a:off x="3568887" y="4934526"/>
+            <a:ext cx="2018145" cy="607292"/>
           </a:xfrm>
           <a:prstGeom prst="rect">
             <a:avLst/>
@@ -9186,7 +10277,7 @@
         </p:spPr>
         <p:txBody>
           <a:bodyPr vert="horz" lIns="91440" tIns="45720" rIns="91440" bIns="45720" rtlCol="0">
-            <a:normAutofit lnSpcReduction="10000"/>
+            <a:normAutofit fontScale="92500"/>
           </a:bodyPr>
           <a:lstStyle>
             <a:lvl1pPr marL="0" indent="0" algn="ctr" defTabSz="457200" rtl="0" eaLnBrk="1" latinLnBrk="0" hangingPunct="1">
@@ -9344,286 +10435,77 @@
             </a:lvl9pPr>
           </a:lstStyle>
           <a:p>
-            <a:pPr marL="457200" indent="-457200" algn="l">
-              <a:buFont typeface="Arial"/>
-              <a:buChar char="•"/>
-            </a:pPr>
-            <a:r>
-              <a:rPr lang="en-US" sz="2000" dirty="0" smtClean="0">
-                <a:solidFill>
-                  <a:schemeClr val="tx1"/>
-                </a:solidFill>
-              </a:rPr>
-              <a:t>Additive decision tree model: at the end of one iteration, add the next tree that fits the residual at the current iteration, h(x) = y </a:t>
-            </a:r>
-            <a:r>
-              <a:rPr lang="mr-IN" sz="2000" dirty="0" smtClean="0">
-                <a:solidFill>
-                  <a:schemeClr val="tx1"/>
-                </a:solidFill>
-              </a:rPr>
-              <a:t>–</a:t>
-            </a:r>
-            <a:r>
-              <a:rPr lang="en-US" sz="2000" dirty="0" smtClean="0">
-                <a:solidFill>
-                  <a:schemeClr val="tx1"/>
-                </a:solidFill>
-              </a:rPr>
-              <a:t> </a:t>
-            </a:r>
-            <a:r>
-              <a:rPr lang="en-US" sz="2000" dirty="0" err="1" smtClean="0">
-                <a:solidFill>
-                  <a:schemeClr val="tx1"/>
-                </a:solidFill>
-              </a:rPr>
-              <a:t>F</a:t>
-            </a:r>
-            <a:r>
-              <a:rPr lang="en-US" sz="2000" baseline="-25000" dirty="0" err="1" smtClean="0">
-                <a:solidFill>
-                  <a:schemeClr val="tx1"/>
-                </a:solidFill>
-              </a:rPr>
-              <a:t>m</a:t>
-            </a:r>
-            <a:r>
-              <a:rPr lang="en-US" sz="2000" dirty="0" smtClean="0">
-                <a:solidFill>
-                  <a:schemeClr val="tx1"/>
-                </a:solidFill>
-              </a:rPr>
-              <a:t>(x)</a:t>
-            </a:r>
-          </a:p>
-          <a:p>
-            <a:pPr lvl="1" algn="l"/>
-            <a:r>
-              <a:rPr lang="en-US" sz="1600" dirty="0" smtClean="0">
-                <a:solidFill>
-                  <a:schemeClr val="tx1"/>
-                </a:solidFill>
-              </a:rPr>
-              <a:t>				</a:t>
-            </a:r>
-          </a:p>
-          <a:p>
-            <a:pPr lvl="1" algn="l"/>
-            <a:r>
-              <a:rPr lang="en-US" sz="1600" dirty="0">
-                <a:solidFill>
-                  <a:schemeClr val="tx1"/>
-                </a:solidFill>
-              </a:rPr>
-              <a:t>	</a:t>
-            </a:r>
-            <a:r>
-              <a:rPr lang="en-US" sz="1600" dirty="0" smtClean="0">
-                <a:solidFill>
-                  <a:schemeClr val="tx1"/>
-                </a:solidFill>
-              </a:rPr>
-              <a:t>			F</a:t>
-            </a:r>
-            <a:r>
-              <a:rPr lang="en-US" sz="1600" baseline="-25000" dirty="0" smtClean="0">
-                <a:solidFill>
-                  <a:schemeClr val="tx1"/>
-                </a:solidFill>
-              </a:rPr>
-              <a:t>m+1</a:t>
-            </a:r>
-            <a:r>
-              <a:rPr lang="en-US" sz="1600" dirty="0" smtClean="0">
-                <a:solidFill>
-                  <a:schemeClr val="tx1"/>
-                </a:solidFill>
-              </a:rPr>
-              <a:t>(x) = </a:t>
-            </a:r>
-            <a:r>
-              <a:rPr lang="en-US" sz="1600" dirty="0" err="1" smtClean="0">
-                <a:solidFill>
-                  <a:schemeClr val="tx1"/>
-                </a:solidFill>
-              </a:rPr>
-              <a:t>F</a:t>
-            </a:r>
-            <a:r>
-              <a:rPr lang="en-US" sz="1600" baseline="-25000" dirty="0" err="1" smtClean="0">
-                <a:solidFill>
-                  <a:schemeClr val="tx1"/>
-                </a:solidFill>
-              </a:rPr>
-              <a:t>m</a:t>
-            </a:r>
-            <a:r>
-              <a:rPr lang="en-US" sz="1600" dirty="0" smtClean="0">
-                <a:solidFill>
-                  <a:schemeClr val="tx1"/>
-                </a:solidFill>
-              </a:rPr>
-              <a:t>(x) + h(x) = y		(update step)</a:t>
-            </a:r>
-          </a:p>
-          <a:p>
-            <a:pPr lvl="1" algn="l"/>
-            <a:r>
-              <a:rPr lang="en-US" sz="1600" dirty="0">
-                <a:solidFill>
-                  <a:schemeClr val="tx1"/>
-                </a:solidFill>
-              </a:rPr>
-              <a:t>	</a:t>
-            </a:r>
-            <a:r>
-              <a:rPr lang="en-US" sz="1600" dirty="0" smtClean="0">
-                <a:solidFill>
-                  <a:schemeClr val="tx1"/>
-                </a:solidFill>
-              </a:rPr>
-              <a:t>			F</a:t>
-            </a:r>
-            <a:r>
-              <a:rPr lang="en-US" sz="1600" baseline="-25000" dirty="0" smtClean="0">
-                <a:solidFill>
-                  <a:schemeClr val="tx1"/>
-                </a:solidFill>
-              </a:rPr>
-              <a:t>M</a:t>
-            </a:r>
-            <a:r>
-              <a:rPr lang="en-US" sz="1600" dirty="0" smtClean="0">
-                <a:solidFill>
-                  <a:schemeClr val="tx1"/>
-                </a:solidFill>
-              </a:rPr>
-              <a:t>(x) = </a:t>
-            </a:r>
-            <a:r>
-              <a:rPr lang="en-US" sz="1600" dirty="0" err="1" smtClean="0">
-                <a:solidFill>
-                  <a:schemeClr val="tx1"/>
-                </a:solidFill>
-              </a:rPr>
-              <a:t>Σγ</a:t>
-            </a:r>
-            <a:r>
-              <a:rPr lang="en-US" sz="1600" baseline="-25000" dirty="0" err="1" smtClean="0">
-                <a:solidFill>
-                  <a:schemeClr val="tx1"/>
-                </a:solidFill>
-              </a:rPr>
-              <a:t>i</a:t>
-            </a:r>
-            <a:r>
-              <a:rPr lang="en-US" sz="1600" dirty="0" err="1" smtClean="0">
-                <a:solidFill>
-                  <a:schemeClr val="tx1"/>
-                </a:solidFill>
-              </a:rPr>
-              <a:t>h</a:t>
-            </a:r>
-            <a:r>
-              <a:rPr lang="en-US" sz="1600" baseline="-25000" dirty="0" err="1" smtClean="0">
-                <a:solidFill>
-                  <a:schemeClr val="tx1"/>
-                </a:solidFill>
-              </a:rPr>
-              <a:t>i</a:t>
-            </a:r>
-            <a:r>
-              <a:rPr lang="en-US" sz="1600" dirty="0" smtClean="0">
-                <a:solidFill>
-                  <a:schemeClr val="tx1"/>
-                </a:solidFill>
-              </a:rPr>
-              <a:t>(x) + c			(final model)</a:t>
-            </a:r>
-          </a:p>
-          <a:p>
-            <a:pPr marL="457200" indent="-457200" algn="l">
-              <a:buFont typeface="Arial"/>
-              <a:buChar char="•"/>
-            </a:pPr>
-            <a:endParaRPr lang="en-US" sz="2000" dirty="0" smtClean="0">
-              <a:solidFill>
-                <a:schemeClr val="tx1"/>
-              </a:solidFill>
-            </a:endParaRPr>
-          </a:p>
-          <a:p>
-            <a:pPr marL="457200" indent="-457200" algn="l">
-              <a:buFont typeface="Arial"/>
-              <a:buChar char="•"/>
-            </a:pPr>
-            <a:r>
-              <a:rPr lang="en-US" sz="2000" dirty="0" smtClean="0">
-                <a:solidFill>
-                  <a:schemeClr val="tx1"/>
-                </a:solidFill>
-              </a:rPr>
-              <a:t>h</a:t>
-            </a:r>
-            <a:r>
-              <a:rPr lang="en-US" sz="2000" baseline="-25000" dirty="0" smtClean="0">
-                <a:solidFill>
-                  <a:schemeClr val="tx1"/>
-                </a:solidFill>
-              </a:rPr>
-              <a:t>i</a:t>
-            </a:r>
-            <a:r>
-              <a:rPr lang="en-US" sz="2000" dirty="0" smtClean="0">
-                <a:solidFill>
-                  <a:schemeClr val="tx1"/>
-                </a:solidFill>
-              </a:rPr>
-              <a:t>(x) models are called “weak learners.” Are “shallow” decision trees.</a:t>
-            </a:r>
-            <a:endParaRPr lang="en-US" sz="2000" dirty="0">
-              <a:solidFill>
-                <a:schemeClr val="tx1"/>
-              </a:solidFill>
-            </a:endParaRPr>
-          </a:p>
-          <a:p>
-            <a:pPr marL="457200" indent="-457200" algn="l">
-              <a:buFont typeface="Arial"/>
-              <a:buChar char="•"/>
-            </a:pPr>
-            <a:r>
-              <a:rPr lang="en-US" sz="2000" dirty="0" smtClean="0">
-                <a:solidFill>
-                  <a:schemeClr val="tx1"/>
-                </a:solidFill>
-              </a:rPr>
-              <a:t>Cannot train in online fashion. But can handle missing data!</a:t>
-            </a:r>
-            <a:endParaRPr lang="en-US" sz="2000" dirty="0">
-              <a:solidFill>
-                <a:schemeClr val="tx1"/>
-              </a:solidFill>
-            </a:endParaRPr>
-          </a:p>
-          <a:p>
-            <a:pPr marL="457200" indent="-457200" algn="l">
-              <a:buFont typeface="Arial"/>
-              <a:buChar char="•"/>
-            </a:pPr>
-            <a:endParaRPr lang="en-US" sz="2000" dirty="0" smtClean="0">
-              <a:solidFill>
-                <a:schemeClr val="tx1"/>
-              </a:solidFill>
-            </a:endParaRPr>
+            <a:pPr algn="l"/>
+            <a:r>
+              <a:rPr lang="en-US" sz="1400" dirty="0" smtClean="0">
+                <a:solidFill>
+                  <a:srgbClr val="FF6600"/>
+                </a:solidFill>
+              </a:rPr>
+              <a:t>This tree has 3 terminal nodes (leaves)</a:t>
+            </a:r>
+          </a:p>
+        </p:txBody>
+      </p:sp>
+      <p:sp>
+        <p:nvSpPr>
+          <p:cNvPr id="2" name="Title 1"/>
+          <p:cNvSpPr>
+            <a:spLocks noGrp="1"/>
+          </p:cNvSpPr>
+          <p:nvPr>
+            <p:ph type="ctrTitle"/>
+          </p:nvPr>
+        </p:nvSpPr>
+        <p:spPr>
+          <a:xfrm>
+            <a:off x="184727" y="32328"/>
+            <a:ext cx="8001000" cy="868217"/>
+          </a:xfrm>
+        </p:spPr>
+        <p:txBody>
+          <a:bodyPr>
+            <a:normAutofit/>
+          </a:bodyPr>
+          <a:lstStyle/>
+          <a:p>
+            <a:pPr algn="l"/>
+            <a:r>
+              <a:rPr lang="en-US" sz="2400" b="1" dirty="0" smtClean="0"/>
+              <a:t>Example of a decision tree</a:t>
+            </a:r>
+            <a:endParaRPr lang="en-US" sz="2400" b="1" dirty="0"/>
+          </a:p>
+        </p:txBody>
+      </p:sp>
+      <p:sp>
+        <p:nvSpPr>
+          <p:cNvPr id="4" name="Slide Number Placeholder 3"/>
+          <p:cNvSpPr>
+            <a:spLocks noGrp="1"/>
+          </p:cNvSpPr>
+          <p:nvPr>
+            <p:ph type="sldNum" sz="quarter" idx="12"/>
+          </p:nvPr>
+        </p:nvSpPr>
+        <p:spPr/>
+        <p:txBody>
+          <a:bodyPr/>
+          <a:lstStyle/>
+          <a:p>
+            <a:fld id="{106E12CD-FCB1-464E-A775-0B83FDDACE03}" type="slidenum">
+              <a:rPr lang="en-US" smtClean="0"/>
+              <a:pPr/>
+              <a:t>8</a:t>
+            </a:fld>
+            <a:endParaRPr lang="en-US" dirty="0"/>
           </a:p>
         </p:txBody>
       </p:sp>
     </p:spTree>
     <p:extLst>
       <p:ext uri="{BB962C8B-B14F-4D97-AF65-F5344CB8AC3E}">
-        <p14:creationId xmlns:p14="http://schemas.microsoft.com/office/powerpoint/2010/main" val="2543980552"/>
+        <p14:creationId xmlns:p14="http://schemas.microsoft.com/office/powerpoint/2010/main" val="2389167023"/>
       </p:ext>
     </p:extLst>
   </p:cSld>

</xml_diff>